<commit_message>
Added slides to the python pres.
</commit_message>
<xml_diff>
--- a/DETERMINED2022/Python and scikit-learn/DETERMINED2022-toelt-Introduction Python and Scikit-learn.pptx
+++ b/DETERMINED2022/Python and scikit-learn/DETERMINED2022-toelt-Introduction Python and Scikit-learn.pptx
@@ -5,7 +5,7 @@
     <p:sldMasterId id="2147483663" r:id="rId1"/>
   </p:sldMasterIdLst>
   <p:notesMasterIdLst>
-    <p:notesMasterId r:id="rId45"/>
+    <p:notesMasterId r:id="rId48"/>
   </p:notesMasterIdLst>
   <p:sldIdLst>
     <p:sldId id="256" r:id="rId2"/>
@@ -42,32 +42,35 @@
     <p:sldId id="296" r:id="rId33"/>
     <p:sldId id="295" r:id="rId34"/>
     <p:sldId id="297" r:id="rId35"/>
-    <p:sldId id="298" r:id="rId36"/>
-    <p:sldId id="299" r:id="rId37"/>
-    <p:sldId id="262" r:id="rId38"/>
-    <p:sldId id="263" r:id="rId39"/>
-    <p:sldId id="264" r:id="rId40"/>
-    <p:sldId id="265" r:id="rId41"/>
-    <p:sldId id="266" r:id="rId42"/>
-    <p:sldId id="267" r:id="rId43"/>
-    <p:sldId id="268" r:id="rId44"/>
+    <p:sldId id="300" r:id="rId36"/>
+    <p:sldId id="301" r:id="rId37"/>
+    <p:sldId id="302" r:id="rId38"/>
+    <p:sldId id="298" r:id="rId39"/>
+    <p:sldId id="299" r:id="rId40"/>
+    <p:sldId id="262" r:id="rId41"/>
+    <p:sldId id="263" r:id="rId42"/>
+    <p:sldId id="264" r:id="rId43"/>
+    <p:sldId id="265" r:id="rId44"/>
+    <p:sldId id="266" r:id="rId45"/>
+    <p:sldId id="267" r:id="rId46"/>
+    <p:sldId id="268" r:id="rId47"/>
   </p:sldIdLst>
   <p:sldSz cx="9144000" cy="5143500" type="screen16x9"/>
   <p:notesSz cx="6858000" cy="9144000"/>
   <p:embeddedFontLst>
     <p:embeddedFont>
       <p:font typeface="Calibri" panose="020F0502020204030204" pitchFamily="34" charset="0"/>
-      <p:regular r:id="rId46"/>
-      <p:bold r:id="rId47"/>
-      <p:italic r:id="rId48"/>
-      <p:boldItalic r:id="rId49"/>
+      <p:regular r:id="rId49"/>
+      <p:bold r:id="rId50"/>
+      <p:italic r:id="rId51"/>
+      <p:boldItalic r:id="rId52"/>
     </p:embeddedFont>
     <p:embeddedFont>
       <p:font typeface="Consolas" panose="020B0609020204030204" pitchFamily="49" charset="0"/>
-      <p:regular r:id="rId50"/>
-      <p:bold r:id="rId51"/>
-      <p:italic r:id="rId52"/>
-      <p:boldItalic r:id="rId53"/>
+      <p:regular r:id="rId53"/>
+      <p:bold r:id="rId54"/>
+      <p:italic r:id="rId55"/>
+      <p:boldItalic r:id="rId56"/>
     </p:embeddedFont>
   </p:embeddedFontLst>
   <p:defaultTextStyle>
@@ -18007,6 +18010,97 @@
   <p:clrMapOvr>
     <a:masterClrMapping/>
   </p:clrMapOvr>
+  <p:timing>
+    <p:tnLst>
+      <p:par>
+        <p:cTn id="1" dur="indefinite" restart="never" nodeType="tmRoot">
+          <p:childTnLst>
+            <p:seq concurrent="1" nextAc="seek">
+              <p:cTn id="2" dur="indefinite" nodeType="mainSeq">
+                <p:childTnLst>
+                  <p:par>
+                    <p:cTn id="3" fill="hold">
+                      <p:stCondLst>
+                        <p:cond delay="indefinite"/>
+                      </p:stCondLst>
+                      <p:childTnLst>
+                        <p:par>
+                          <p:cTn id="4" fill="hold">
+                            <p:stCondLst>
+                              <p:cond delay="0"/>
+                            </p:stCondLst>
+                            <p:childTnLst>
+                              <p:par>
+                                <p:cTn id="5" presetID="10" presetClass="entr" presetSubtype="0" fill="hold" nodeType="clickEffect">
+                                  <p:stCondLst>
+                                    <p:cond delay="0"/>
+                                  </p:stCondLst>
+                                  <p:childTnLst>
+                                    <p:set>
+                                      <p:cBhvr>
+                                        <p:cTn id="6" dur="1" fill="hold">
+                                          <p:stCondLst>
+                                            <p:cond delay="0"/>
+                                          </p:stCondLst>
+                                        </p:cTn>
+                                        <p:tgtEl>
+                                          <p:spTgt spid="3">
+                                            <p:txEl>
+                                              <p:pRg st="4" end="4"/>
+                                            </p:txEl>
+                                          </p:spTgt>
+                                        </p:tgtEl>
+                                        <p:attrNameLst>
+                                          <p:attrName>style.visibility</p:attrName>
+                                        </p:attrNameLst>
+                                      </p:cBhvr>
+                                      <p:to>
+                                        <p:strVal val="visible"/>
+                                      </p:to>
+                                    </p:set>
+                                    <p:animEffect transition="in" filter="fade">
+                                      <p:cBhvr>
+                                        <p:cTn id="7" dur="500"/>
+                                        <p:tgtEl>
+                                          <p:spTgt spid="3">
+                                            <p:txEl>
+                                              <p:pRg st="4" end="4"/>
+                                            </p:txEl>
+                                          </p:spTgt>
+                                        </p:tgtEl>
+                                      </p:cBhvr>
+                                    </p:animEffect>
+                                  </p:childTnLst>
+                                </p:cTn>
+                              </p:par>
+                            </p:childTnLst>
+                          </p:cTn>
+                        </p:par>
+                      </p:childTnLst>
+                    </p:cTn>
+                  </p:par>
+                </p:childTnLst>
+              </p:cTn>
+              <p:prevCondLst>
+                <p:cond evt="onPrev" delay="0">
+                  <p:tgtEl>
+                    <p:sldTgt/>
+                  </p:tgtEl>
+                </p:cond>
+              </p:prevCondLst>
+              <p:nextCondLst>
+                <p:cond evt="onNext" delay="0">
+                  <p:tgtEl>
+                    <p:sldTgt/>
+                  </p:tgtEl>
+                </p:cond>
+              </p:nextCondLst>
+            </p:seq>
+          </p:childTnLst>
+        </p:cTn>
+      </p:par>
+    </p:tnLst>
+  </p:timing>
 </p:sld>
 </file>
 
@@ -18027,6 +18121,418 @@
           <a:chExt cx="0" cy="0"/>
         </a:xfrm>
       </p:grpSpPr>
+      <p:pic>
+        <p:nvPicPr>
+          <p:cNvPr id="4" name="Picture 3">
+            <a:extLst>
+              <a:ext uri="{FF2B5EF4-FFF2-40B4-BE49-F238E27FC236}">
+                <a16:creationId xmlns:a16="http://schemas.microsoft.com/office/drawing/2014/main" id="{445E7228-A074-DE37-F9D1-999F30A2D7D9}"/>
+              </a:ext>
+            </a:extLst>
+          </p:cNvPr>
+          <p:cNvPicPr>
+            <a:picLocks noChangeAspect="1"/>
+          </p:cNvPicPr>
+          <p:nvPr/>
+        </p:nvPicPr>
+        <p:blipFill>
+          <a:blip r:embed="rId2">
+            <a:clrChange>
+              <a:clrFrom>
+                <a:srgbClr val="F7F7F7"/>
+              </a:clrFrom>
+              <a:clrTo>
+                <a:srgbClr val="F7F7F7">
+                  <a:alpha val="0"/>
+                </a:srgbClr>
+              </a:clrTo>
+            </a:clrChange>
+          </a:blip>
+          <a:stretch>
+            <a:fillRect/>
+          </a:stretch>
+        </p:blipFill>
+        <p:spPr>
+          <a:xfrm>
+            <a:off x="799072" y="1729066"/>
+            <a:ext cx="3898433" cy="1949217"/>
+          </a:xfrm>
+          <a:prstGeom prst="rect">
+            <a:avLst/>
+          </a:prstGeom>
+        </p:spPr>
+      </p:pic>
+    </p:spTree>
+    <p:extLst>
+      <p:ext uri="{BB962C8B-B14F-4D97-AF65-F5344CB8AC3E}">
+        <p14:creationId xmlns:p14="http://schemas.microsoft.com/office/powerpoint/2010/main" val="1098273355"/>
+      </p:ext>
+    </p:extLst>
+  </p:cSld>
+  <p:clrMapOvr>
+    <a:masterClrMapping/>
+  </p:clrMapOvr>
+</p:sld>
+</file>
+
+<file path=ppt/slides/slide36.xml><?xml version="1.0" encoding="utf-8"?>
+<p:sld xmlns:a="http://schemas.openxmlformats.org/drawingml/2006/main" xmlns:r="http://schemas.openxmlformats.org/officeDocument/2006/relationships" xmlns:p="http://schemas.openxmlformats.org/presentationml/2006/main">
+  <p:cSld>
+    <p:spTree>
+      <p:nvGrpSpPr>
+        <p:cNvPr id="1" name=""/>
+        <p:cNvGrpSpPr/>
+        <p:nvPr/>
+      </p:nvGrpSpPr>
+      <p:grpSpPr>
+        <a:xfrm>
+          <a:off x="0" y="0"/>
+          <a:ext cx="0" cy="0"/>
+          <a:chOff x="0" y="0"/>
+          <a:chExt cx="0" cy="0"/>
+        </a:xfrm>
+      </p:grpSpPr>
+      <p:sp>
+        <p:nvSpPr>
+          <p:cNvPr id="2" name="Title 1">
+            <a:extLst>
+              <a:ext uri="{FF2B5EF4-FFF2-40B4-BE49-F238E27FC236}">
+                <a16:creationId xmlns:a16="http://schemas.microsoft.com/office/drawing/2014/main" id="{B1C9E3AB-CA02-437C-CFF8-D2AE428DD8D7}"/>
+              </a:ext>
+            </a:extLst>
+          </p:cNvPr>
+          <p:cNvSpPr>
+            <a:spLocks noGrp="1"/>
+          </p:cNvSpPr>
+          <p:nvPr>
+            <p:ph type="title"/>
+          </p:nvPr>
+        </p:nvSpPr>
+        <p:spPr/>
+        <p:txBody>
+          <a:bodyPr/>
+          <a:lstStyle/>
+          <a:p>
+            <a:r>
+              <a:rPr lang="en-CH"/>
+              <a:t>What is numpy (and scipy)</a:t>
+            </a:r>
+          </a:p>
+        </p:txBody>
+      </p:sp>
+      <p:sp>
+        <p:nvSpPr>
+          <p:cNvPr id="3" name="Content Placeholder 2">
+            <a:extLst>
+              <a:ext uri="{FF2B5EF4-FFF2-40B4-BE49-F238E27FC236}">
+                <a16:creationId xmlns:a16="http://schemas.microsoft.com/office/drawing/2014/main" id="{19588855-A23E-1C52-E91E-9F3C6A2D0D3D}"/>
+              </a:ext>
+            </a:extLst>
+          </p:cNvPr>
+          <p:cNvSpPr>
+            <a:spLocks noGrp="1"/>
+          </p:cNvSpPr>
+          <p:nvPr>
+            <p:ph idx="1"/>
+          </p:nvPr>
+        </p:nvSpPr>
+        <p:spPr>
+          <a:xfrm>
+            <a:off x="628650" y="1268016"/>
+            <a:ext cx="7886700" cy="3601639"/>
+          </a:xfrm>
+        </p:spPr>
+        <p:txBody>
+          <a:bodyPr>
+            <a:normAutofit lnSpcReduction="10000"/>
+          </a:bodyPr>
+          <a:lstStyle/>
+          <a:p>
+            <a:r>
+              <a:rPr lang="en-GB" sz="2000" b="1"/>
+              <a:t>NumPy</a:t>
+            </a:r>
+            <a:r>
+              <a:rPr lang="en-GB" sz="2000"/>
+              <a:t> is a module for Python. The name is an acronym for "Numeric Python" or "Numerical Python” (mostly written in C)</a:t>
+            </a:r>
+          </a:p>
+          <a:p>
+            <a:r>
+              <a:rPr lang="en-GB" sz="2000" b="1"/>
+              <a:t>NumPy</a:t>
+            </a:r>
+            <a:r>
+              <a:rPr lang="en-GB" sz="2000"/>
+              <a:t> enriches the programming language Python with powerful data structures, implementing multi-dimensional arrays and matrices.</a:t>
+            </a:r>
+          </a:p>
+          <a:p>
+            <a:r>
+              <a:rPr lang="en-GB" sz="2000"/>
+              <a:t>The implementation is even aiming at huge matrices and arrays, better know under the heading of "big data”</a:t>
+            </a:r>
+          </a:p>
+          <a:p>
+            <a:r>
+              <a:rPr lang="en-GB" sz="2000" b="1"/>
+              <a:t>SciPy</a:t>
+            </a:r>
+            <a:r>
+              <a:rPr lang="en-GB" sz="2000"/>
+              <a:t> (Scientific Python) needs Numpy, as it is based on the data structures of Numpy and furthermore its basic creation and manipulation functions. It extends the capabilities of NumPy with further useful functions for minimization, regression, Fourier-transformation and many others.</a:t>
+            </a:r>
+          </a:p>
+          <a:p>
+            <a:endParaRPr lang="en-CH" sz="2000"/>
+          </a:p>
+        </p:txBody>
+      </p:sp>
+      <p:sp>
+        <p:nvSpPr>
+          <p:cNvPr id="4" name="TextBox 3">
+            <a:extLst>
+              <a:ext uri="{FF2B5EF4-FFF2-40B4-BE49-F238E27FC236}">
+                <a16:creationId xmlns:a16="http://schemas.microsoft.com/office/drawing/2014/main" id="{7DFACA7E-1139-6728-3192-9E08D7AD8CA7}"/>
+              </a:ext>
+            </a:extLst>
+          </p:cNvPr>
+          <p:cNvSpPr txBox="1"/>
+          <p:nvPr/>
+        </p:nvSpPr>
+        <p:spPr>
+          <a:xfrm>
+            <a:off x="43703" y="4866501"/>
+            <a:ext cx="8471647" cy="276999"/>
+          </a:xfrm>
+          <a:prstGeom prst="rect">
+            <a:avLst/>
+          </a:prstGeom>
+          <a:noFill/>
+        </p:spPr>
+        <p:txBody>
+          <a:bodyPr wrap="square" rtlCol="0">
+            <a:spAutoFit/>
+          </a:bodyPr>
+          <a:lstStyle/>
+          <a:p>
+            <a:r>
+              <a:rPr lang="en-CH" sz="1200"/>
+              <a:t>Source: </a:t>
+            </a:r>
+            <a:r>
+              <a:rPr lang="en-GB" sz="1200"/>
+              <a:t>https://python-course.eu/numerical-programming/introduction-to-numpy.php</a:t>
+            </a:r>
+            <a:endParaRPr lang="en-CH" sz="1200"/>
+          </a:p>
+        </p:txBody>
+      </p:sp>
+    </p:spTree>
+    <p:extLst>
+      <p:ext uri="{BB962C8B-B14F-4D97-AF65-F5344CB8AC3E}">
+        <p14:creationId xmlns:p14="http://schemas.microsoft.com/office/powerpoint/2010/main" val="1165536882"/>
+      </p:ext>
+    </p:extLst>
+  </p:cSld>
+  <p:clrMapOvr>
+    <a:masterClrMapping/>
+  </p:clrMapOvr>
+</p:sld>
+</file>
+
+<file path=ppt/slides/slide37.xml><?xml version="1.0" encoding="utf-8"?>
+<p:sld xmlns:a="http://schemas.openxmlformats.org/drawingml/2006/main" xmlns:r="http://schemas.openxmlformats.org/officeDocument/2006/relationships" xmlns:p="http://schemas.openxmlformats.org/presentationml/2006/main">
+  <p:cSld>
+    <p:spTree>
+      <p:nvGrpSpPr>
+        <p:cNvPr id="1" name=""/>
+        <p:cNvGrpSpPr/>
+        <p:nvPr/>
+      </p:nvGrpSpPr>
+      <p:grpSpPr>
+        <a:xfrm>
+          <a:off x="0" y="0"/>
+          <a:ext cx="0" cy="0"/>
+          <a:chOff x="0" y="0"/>
+          <a:chExt cx="0" cy="0"/>
+        </a:xfrm>
+      </p:grpSpPr>
+      <p:sp>
+        <p:nvSpPr>
+          <p:cNvPr id="2" name="Title 1">
+            <a:extLst>
+              <a:ext uri="{FF2B5EF4-FFF2-40B4-BE49-F238E27FC236}">
+                <a16:creationId xmlns:a16="http://schemas.microsoft.com/office/drawing/2014/main" id="{EB60A15C-E06B-AE26-088C-94D0AACF841E}"/>
+              </a:ext>
+            </a:extLst>
+          </p:cNvPr>
+          <p:cNvSpPr>
+            <a:spLocks noGrp="1"/>
+          </p:cNvSpPr>
+          <p:nvPr>
+            <p:ph type="title"/>
+          </p:nvPr>
+        </p:nvSpPr>
+        <p:spPr/>
+        <p:txBody>
+          <a:bodyPr/>
+          <a:lstStyle/>
+          <a:p>
+            <a:r>
+              <a:rPr lang="en-GB"/>
+              <a:t>N</a:t>
+            </a:r>
+            <a:r>
+              <a:rPr lang="en-CH"/>
+              <a:t>umpy vs. code python</a:t>
+            </a:r>
+          </a:p>
+        </p:txBody>
+      </p:sp>
+      <p:sp>
+        <p:nvSpPr>
+          <p:cNvPr id="3" name="Content Placeholder 2">
+            <a:extLst>
+              <a:ext uri="{FF2B5EF4-FFF2-40B4-BE49-F238E27FC236}">
+                <a16:creationId xmlns:a16="http://schemas.microsoft.com/office/drawing/2014/main" id="{ED19F422-0176-04A1-8051-0E58DD13CE27}"/>
+              </a:ext>
+            </a:extLst>
+          </p:cNvPr>
+          <p:cNvSpPr>
+            <a:spLocks noGrp="1"/>
+          </p:cNvSpPr>
+          <p:nvPr>
+            <p:ph idx="1"/>
+          </p:nvPr>
+        </p:nvSpPr>
+        <p:spPr/>
+        <p:txBody>
+          <a:bodyPr/>
+          <a:lstStyle/>
+          <a:p>
+            <a:pPr marL="0" indent="0">
+              <a:buNone/>
+            </a:pPr>
+            <a:r>
+              <a:rPr lang="en-GB"/>
+              <a:t>The advantages of Core Python:</a:t>
+            </a:r>
+          </a:p>
+          <a:p>
+            <a:r>
+              <a:rPr lang="en-GB"/>
+              <a:t>high-level number objects: integers, floating point</a:t>
+            </a:r>
+          </a:p>
+          <a:p>
+            <a:r>
+              <a:rPr lang="en-GB"/>
+              <a:t>containers: lists with cheap insertion and append methods, dictionaries with fast lookup</a:t>
+            </a:r>
+          </a:p>
+          <a:p>
+            <a:pPr marL="0" indent="0">
+              <a:buNone/>
+            </a:pPr>
+            <a:r>
+              <a:rPr lang="en-GB"/>
+              <a:t>Advantages of using Numpy with Python:</a:t>
+            </a:r>
+          </a:p>
+          <a:p>
+            <a:r>
+              <a:rPr lang="en-GB"/>
+              <a:t>array oriented computing</a:t>
+            </a:r>
+          </a:p>
+          <a:p>
+            <a:r>
+              <a:rPr lang="en-GB"/>
+              <a:t>efficiently implemented multi-dimensional arrays</a:t>
+            </a:r>
+          </a:p>
+          <a:p>
+            <a:r>
+              <a:rPr lang="en-GB"/>
+              <a:t>designed for scientific computation</a:t>
+            </a:r>
+          </a:p>
+          <a:p>
+            <a:endParaRPr lang="en-CH"/>
+          </a:p>
+        </p:txBody>
+      </p:sp>
+      <p:sp>
+        <p:nvSpPr>
+          <p:cNvPr id="4" name="TextBox 3">
+            <a:extLst>
+              <a:ext uri="{FF2B5EF4-FFF2-40B4-BE49-F238E27FC236}">
+                <a16:creationId xmlns:a16="http://schemas.microsoft.com/office/drawing/2014/main" id="{52899488-7D5A-CD80-29C6-B7DF1C9F867E}"/>
+              </a:ext>
+            </a:extLst>
+          </p:cNvPr>
+          <p:cNvSpPr txBox="1"/>
+          <p:nvPr/>
+        </p:nvSpPr>
+        <p:spPr>
+          <a:xfrm>
+            <a:off x="43703" y="4866501"/>
+            <a:ext cx="8471647" cy="276999"/>
+          </a:xfrm>
+          <a:prstGeom prst="rect">
+            <a:avLst/>
+          </a:prstGeom>
+          <a:noFill/>
+        </p:spPr>
+        <p:txBody>
+          <a:bodyPr wrap="square" rtlCol="0">
+            <a:spAutoFit/>
+          </a:bodyPr>
+          <a:lstStyle/>
+          <a:p>
+            <a:r>
+              <a:rPr lang="en-CH" sz="1200"/>
+              <a:t>Source: </a:t>
+            </a:r>
+            <a:r>
+              <a:rPr lang="en-GB" sz="1200"/>
+              <a:t>https://python-course.eu/numerical-programming/introduction-to-numpy.php</a:t>
+            </a:r>
+            <a:endParaRPr lang="en-CH" sz="1200"/>
+          </a:p>
+        </p:txBody>
+      </p:sp>
+    </p:spTree>
+    <p:extLst>
+      <p:ext uri="{BB962C8B-B14F-4D97-AF65-F5344CB8AC3E}">
+        <p14:creationId xmlns:p14="http://schemas.microsoft.com/office/powerpoint/2010/main" val="33953978"/>
+      </p:ext>
+    </p:extLst>
+  </p:cSld>
+  <p:clrMapOvr>
+    <a:masterClrMapping/>
+  </p:clrMapOvr>
+</p:sld>
+</file>
+
+<file path=ppt/slides/slide38.xml><?xml version="1.0" encoding="utf-8"?>
+<p:sld xmlns:a="http://schemas.openxmlformats.org/drawingml/2006/main" xmlns:r="http://schemas.openxmlformats.org/officeDocument/2006/relationships" xmlns:p="http://schemas.openxmlformats.org/presentationml/2006/main">
+  <p:cSld>
+    <p:spTree>
+      <p:nvGrpSpPr>
+        <p:cNvPr id="1" name=""/>
+        <p:cNvGrpSpPr/>
+        <p:nvPr/>
+      </p:nvGrpSpPr>
+      <p:grpSpPr>
+        <a:xfrm>
+          <a:off x="0" y="0"/>
+          <a:ext cx="0" cy="0"/>
+          <a:chOff x="0" y="0"/>
+          <a:chExt cx="0" cy="0"/>
+        </a:xfrm>
+      </p:grpSpPr>
       <p:sp>
         <p:nvSpPr>
           <p:cNvPr id="2" name="Title 1">
@@ -18221,10 +18727,144 @@
   <p:clrMapOvr>
     <a:masterClrMapping/>
   </p:clrMapOvr>
+  <p:timing>
+    <p:tnLst>
+      <p:par>
+        <p:cTn id="1" dur="indefinite" restart="never" nodeType="tmRoot">
+          <p:childTnLst>
+            <p:seq concurrent="1" nextAc="seek">
+              <p:cTn id="2" dur="indefinite" nodeType="mainSeq">
+                <p:childTnLst>
+                  <p:par>
+                    <p:cTn id="3" fill="hold">
+                      <p:stCondLst>
+                        <p:cond delay="indefinite"/>
+                      </p:stCondLst>
+                      <p:childTnLst>
+                        <p:par>
+                          <p:cTn id="4" fill="hold">
+                            <p:stCondLst>
+                              <p:cond delay="0"/>
+                            </p:stCondLst>
+                            <p:childTnLst>
+                              <p:par>
+                                <p:cTn id="5" presetID="10" presetClass="entr" presetSubtype="0" fill="hold" nodeType="clickEffect">
+                                  <p:stCondLst>
+                                    <p:cond delay="0"/>
+                                  </p:stCondLst>
+                                  <p:childTnLst>
+                                    <p:set>
+                                      <p:cBhvr>
+                                        <p:cTn id="6" dur="1" fill="hold">
+                                          <p:stCondLst>
+                                            <p:cond delay="0"/>
+                                          </p:stCondLst>
+                                        </p:cTn>
+                                        <p:tgtEl>
+                                          <p:spTgt spid="3">
+                                            <p:txEl>
+                                              <p:pRg st="2" end="2"/>
+                                            </p:txEl>
+                                          </p:spTgt>
+                                        </p:tgtEl>
+                                        <p:attrNameLst>
+                                          <p:attrName>style.visibility</p:attrName>
+                                        </p:attrNameLst>
+                                      </p:cBhvr>
+                                      <p:to>
+                                        <p:strVal val="visible"/>
+                                      </p:to>
+                                    </p:set>
+                                    <p:animEffect transition="in" filter="fade">
+                                      <p:cBhvr>
+                                        <p:cTn id="7" dur="500"/>
+                                        <p:tgtEl>
+                                          <p:spTgt spid="3">
+                                            <p:txEl>
+                                              <p:pRg st="2" end="2"/>
+                                            </p:txEl>
+                                          </p:spTgt>
+                                        </p:tgtEl>
+                                      </p:cBhvr>
+                                    </p:animEffect>
+                                  </p:childTnLst>
+                                </p:cTn>
+                              </p:par>
+                              <p:par>
+                                <p:cTn id="8" presetID="10" presetClass="entr" presetSubtype="0" fill="hold" nodeType="withEffect">
+                                  <p:stCondLst>
+                                    <p:cond delay="0"/>
+                                  </p:stCondLst>
+                                  <p:childTnLst>
+                                    <p:set>
+                                      <p:cBhvr>
+                                        <p:cTn id="9" dur="1" fill="hold">
+                                          <p:stCondLst>
+                                            <p:cond delay="0"/>
+                                          </p:stCondLst>
+                                        </p:cTn>
+                                        <p:tgtEl>
+                                          <p:spTgt spid="3">
+                                            <p:txEl>
+                                              <p:pRg st="4" end="4"/>
+                                            </p:txEl>
+                                          </p:spTgt>
+                                        </p:tgtEl>
+                                        <p:attrNameLst>
+                                          <p:attrName>style.visibility</p:attrName>
+                                        </p:attrNameLst>
+                                      </p:cBhvr>
+                                      <p:to>
+                                        <p:strVal val="visible"/>
+                                      </p:to>
+                                    </p:set>
+                                    <p:animEffect transition="in" filter="fade">
+                                      <p:cBhvr>
+                                        <p:cTn id="10" dur="500"/>
+                                        <p:tgtEl>
+                                          <p:spTgt spid="3">
+                                            <p:txEl>
+                                              <p:pRg st="4" end="4"/>
+                                            </p:txEl>
+                                          </p:spTgt>
+                                        </p:tgtEl>
+                                      </p:cBhvr>
+                                    </p:animEffect>
+                                  </p:childTnLst>
+                                </p:cTn>
+                              </p:par>
+                            </p:childTnLst>
+                          </p:cTn>
+                        </p:par>
+                      </p:childTnLst>
+                    </p:cTn>
+                  </p:par>
+                </p:childTnLst>
+              </p:cTn>
+              <p:prevCondLst>
+                <p:cond evt="onPrev" delay="0">
+                  <p:tgtEl>
+                    <p:sldTgt/>
+                  </p:tgtEl>
+                </p:cond>
+              </p:prevCondLst>
+              <p:nextCondLst>
+                <p:cond evt="onNext" delay="0">
+                  <p:tgtEl>
+                    <p:sldTgt/>
+                  </p:tgtEl>
+                </p:cond>
+              </p:nextCondLst>
+            </p:seq>
+          </p:childTnLst>
+        </p:cTn>
+      </p:par>
+    </p:tnLst>
+  </p:timing>
 </p:sld>
 </file>
 
-<file path=ppt/slides/slide36.xml><?xml version="1.0" encoding="utf-8"?>
+<file path=ppt/slides/slide39.xml><?xml version="1.0" encoding="utf-8"?>
 <p:sld xmlns:a="http://schemas.openxmlformats.org/drawingml/2006/main" xmlns:r="http://schemas.openxmlformats.org/officeDocument/2006/relationships" xmlns:p="http://schemas.openxmlformats.org/presentationml/2006/main">
   <p:cSld>
     <p:spTree>
@@ -18314,301 +18954,6 @@
 </p:sld>
 </file>
 
-<file path=ppt/slides/slide37.xml><?xml version="1.0" encoding="utf-8"?>
-<p:sld xmlns:a="http://schemas.openxmlformats.org/drawingml/2006/main" xmlns:r="http://schemas.openxmlformats.org/officeDocument/2006/relationships" xmlns:p="http://schemas.openxmlformats.org/presentationml/2006/main">
-  <p:cSld>
-    <p:spTree>
-      <p:nvGrpSpPr>
-        <p:cNvPr id="1" name=""/>
-        <p:cNvGrpSpPr/>
-        <p:nvPr/>
-      </p:nvGrpSpPr>
-      <p:grpSpPr>
-        <a:xfrm>
-          <a:off x="0" y="0"/>
-          <a:ext cx="0" cy="0"/>
-          <a:chOff x="0" y="0"/>
-          <a:chExt cx="0" cy="0"/>
-        </a:xfrm>
-      </p:grpSpPr>
-      <p:sp>
-        <p:nvSpPr>
-          <p:cNvPr id="2" name="Title 1">
-            <a:extLst>
-              <a:ext uri="{FF2B5EF4-FFF2-40B4-BE49-F238E27FC236}">
-                <a16:creationId xmlns:a16="http://schemas.microsoft.com/office/drawing/2014/main" id="{4D26FBD0-B455-1317-85FC-7DB1E420BE8F}"/>
-              </a:ext>
-            </a:extLst>
-          </p:cNvPr>
-          <p:cNvSpPr>
-            <a:spLocks noGrp="1"/>
-          </p:cNvSpPr>
-          <p:nvPr>
-            <p:ph type="title"/>
-          </p:nvPr>
-        </p:nvSpPr>
-        <p:spPr/>
-        <p:txBody>
-          <a:bodyPr/>
-          <a:lstStyle/>
-          <a:p>
-            <a:endParaRPr lang="en-CH"/>
-          </a:p>
-        </p:txBody>
-      </p:sp>
-      <p:sp>
-        <p:nvSpPr>
-          <p:cNvPr id="3" name="Content Placeholder 2">
-            <a:extLst>
-              <a:ext uri="{FF2B5EF4-FFF2-40B4-BE49-F238E27FC236}">
-                <a16:creationId xmlns:a16="http://schemas.microsoft.com/office/drawing/2014/main" id="{63FD0781-599E-4F4F-F687-ECC4BB7E4373}"/>
-              </a:ext>
-            </a:extLst>
-          </p:cNvPr>
-          <p:cNvSpPr>
-            <a:spLocks noGrp="1"/>
-          </p:cNvSpPr>
-          <p:nvPr>
-            <p:ph idx="1"/>
-          </p:nvPr>
-        </p:nvSpPr>
-        <p:spPr/>
-        <p:txBody>
-          <a:bodyPr/>
-          <a:lstStyle/>
-          <a:p>
-            <a:r>
-              <a:rPr lang="en-US"/>
-              <a:t>Selecting elements from lists (subsetting)</a:t>
-            </a:r>
-          </a:p>
-          <a:p>
-            <a:endParaRPr lang="en-CH"/>
-          </a:p>
-        </p:txBody>
-      </p:sp>
-      <p:sp>
-        <p:nvSpPr>
-          <p:cNvPr id="4" name="TextBox 3">
-            <a:extLst>
-              <a:ext uri="{FF2B5EF4-FFF2-40B4-BE49-F238E27FC236}">
-                <a16:creationId xmlns:a16="http://schemas.microsoft.com/office/drawing/2014/main" id="{18B1B5EA-79E0-3506-F1BE-F5B646A38573}"/>
-              </a:ext>
-            </a:extLst>
-          </p:cNvPr>
-          <p:cNvSpPr txBox="1"/>
-          <p:nvPr/>
-        </p:nvSpPr>
-        <p:spPr>
-          <a:xfrm>
-            <a:off x="7162800" y="4866501"/>
-            <a:ext cx="2108200" cy="276999"/>
-          </a:xfrm>
-          <a:prstGeom prst="rect">
-            <a:avLst/>
-          </a:prstGeom>
-          <a:noFill/>
-        </p:spPr>
-        <p:txBody>
-          <a:bodyPr wrap="square" rtlCol="0">
-            <a:spAutoFit/>
-          </a:bodyPr>
-          <a:lstStyle/>
-          <a:p>
-            <a:r>
-              <a:rPr lang="en-CH" sz="1200"/>
-              <a:t>Adapted from </a:t>
-            </a:r>
-            <a:r>
-              <a:rPr lang="en-GB" sz="1200"/>
-              <a:t>www.py4e.com</a:t>
-            </a:r>
-          </a:p>
-        </p:txBody>
-      </p:sp>
-    </p:spTree>
-    <p:extLst>
-      <p:ext uri="{BB962C8B-B14F-4D97-AF65-F5344CB8AC3E}">
-        <p14:creationId xmlns:p14="http://schemas.microsoft.com/office/powerpoint/2010/main" val="1478207972"/>
-      </p:ext>
-    </p:extLst>
-  </p:cSld>
-  <p:clrMapOvr>
-    <a:masterClrMapping/>
-  </p:clrMapOvr>
-</p:sld>
-</file>
-
-<file path=ppt/slides/slide38.xml><?xml version="1.0" encoding="utf-8"?>
-<p:sld xmlns:a="http://schemas.openxmlformats.org/drawingml/2006/main" xmlns:r="http://schemas.openxmlformats.org/officeDocument/2006/relationships" xmlns:p="http://schemas.openxmlformats.org/presentationml/2006/main">
-  <p:cSld>
-    <p:spTree>
-      <p:nvGrpSpPr>
-        <p:cNvPr id="1" name=""/>
-        <p:cNvGrpSpPr/>
-        <p:nvPr/>
-      </p:nvGrpSpPr>
-      <p:grpSpPr>
-        <a:xfrm>
-          <a:off x="0" y="0"/>
-          <a:ext cx="0" cy="0"/>
-          <a:chOff x="0" y="0"/>
-          <a:chExt cx="0" cy="0"/>
-        </a:xfrm>
-      </p:grpSpPr>
-      <p:sp>
-        <p:nvSpPr>
-          <p:cNvPr id="2" name="Title 1">
-            <a:extLst>
-              <a:ext uri="{FF2B5EF4-FFF2-40B4-BE49-F238E27FC236}">
-                <a16:creationId xmlns:a16="http://schemas.microsoft.com/office/drawing/2014/main" id="{082C0C09-969B-2F64-C262-889B52837A97}"/>
-              </a:ext>
-            </a:extLst>
-          </p:cNvPr>
-          <p:cNvSpPr>
-            <a:spLocks noGrp="1"/>
-          </p:cNvSpPr>
-          <p:nvPr>
-            <p:ph type="title"/>
-          </p:nvPr>
-        </p:nvSpPr>
-        <p:spPr/>
-        <p:txBody>
-          <a:bodyPr/>
-          <a:lstStyle/>
-          <a:p>
-            <a:endParaRPr lang="en-CH"/>
-          </a:p>
-        </p:txBody>
-      </p:sp>
-      <p:sp>
-        <p:nvSpPr>
-          <p:cNvPr id="3" name="Content Placeholder 2">
-            <a:extLst>
-              <a:ext uri="{FF2B5EF4-FFF2-40B4-BE49-F238E27FC236}">
-                <a16:creationId xmlns:a16="http://schemas.microsoft.com/office/drawing/2014/main" id="{5C2826F4-7C18-2376-334F-AA46F703B594}"/>
-              </a:ext>
-            </a:extLst>
-          </p:cNvPr>
-          <p:cNvSpPr>
-            <a:spLocks noGrp="1"/>
-          </p:cNvSpPr>
-          <p:nvPr>
-            <p:ph idx="1"/>
-          </p:nvPr>
-        </p:nvSpPr>
-        <p:spPr/>
-        <p:txBody>
-          <a:bodyPr/>
-          <a:lstStyle/>
-          <a:p>
-            <a:r>
-              <a:rPr lang="en-GB"/>
-              <a:t>Importance of understanding algorithms (example with loops)</a:t>
-            </a:r>
-            <a:endParaRPr lang="en-CH"/>
-          </a:p>
-        </p:txBody>
-      </p:sp>
-    </p:spTree>
-    <p:extLst>
-      <p:ext uri="{BB962C8B-B14F-4D97-AF65-F5344CB8AC3E}">
-        <p14:creationId xmlns:p14="http://schemas.microsoft.com/office/powerpoint/2010/main" val="3436984283"/>
-      </p:ext>
-    </p:extLst>
-  </p:cSld>
-  <p:clrMapOvr>
-    <a:masterClrMapping/>
-  </p:clrMapOvr>
-</p:sld>
-</file>
-
-<file path=ppt/slides/slide39.xml><?xml version="1.0" encoding="utf-8"?>
-<p:sld xmlns:a="http://schemas.openxmlformats.org/drawingml/2006/main" xmlns:r="http://schemas.openxmlformats.org/officeDocument/2006/relationships" xmlns:p="http://schemas.openxmlformats.org/presentationml/2006/main">
-  <p:cSld>
-    <p:spTree>
-      <p:nvGrpSpPr>
-        <p:cNvPr id="1" name=""/>
-        <p:cNvGrpSpPr/>
-        <p:nvPr/>
-      </p:nvGrpSpPr>
-      <p:grpSpPr>
-        <a:xfrm>
-          <a:off x="0" y="0"/>
-          <a:ext cx="0" cy="0"/>
-          <a:chOff x="0" y="0"/>
-          <a:chExt cx="0" cy="0"/>
-        </a:xfrm>
-      </p:grpSpPr>
-      <p:sp>
-        <p:nvSpPr>
-          <p:cNvPr id="2" name="Title 1">
-            <a:extLst>
-              <a:ext uri="{FF2B5EF4-FFF2-40B4-BE49-F238E27FC236}">
-                <a16:creationId xmlns:a16="http://schemas.microsoft.com/office/drawing/2014/main" id="{9EDF0BE2-EAA3-2233-DDF0-CF1EDB291AC2}"/>
-              </a:ext>
-            </a:extLst>
-          </p:cNvPr>
-          <p:cNvSpPr>
-            <a:spLocks noGrp="1"/>
-          </p:cNvSpPr>
-          <p:nvPr>
-            <p:ph type="title"/>
-          </p:nvPr>
-        </p:nvSpPr>
-        <p:spPr/>
-        <p:txBody>
-          <a:bodyPr/>
-          <a:lstStyle/>
-          <a:p>
-            <a:endParaRPr lang="en-CH"/>
-          </a:p>
-        </p:txBody>
-      </p:sp>
-      <p:sp>
-        <p:nvSpPr>
-          <p:cNvPr id="3" name="Content Placeholder 2">
-            <a:extLst>
-              <a:ext uri="{FF2B5EF4-FFF2-40B4-BE49-F238E27FC236}">
-                <a16:creationId xmlns:a16="http://schemas.microsoft.com/office/drawing/2014/main" id="{762A862A-B827-0A17-89DA-BF47C739F4AF}"/>
-              </a:ext>
-            </a:extLst>
-          </p:cNvPr>
-          <p:cNvSpPr>
-            <a:spLocks noGrp="1"/>
-          </p:cNvSpPr>
-          <p:nvPr>
-            <p:ph idx="1"/>
-          </p:nvPr>
-        </p:nvSpPr>
-        <p:spPr/>
-        <p:txBody>
-          <a:bodyPr/>
-          <a:lstStyle/>
-          <a:p>
-            <a:r>
-              <a:rPr lang="en-US"/>
-              <a:t>Advantages of numpy (dealing with data) and of pandas (why use it?) (for example aggregations)</a:t>
-            </a:r>
-          </a:p>
-          <a:p>
-            <a:endParaRPr lang="en-CH"/>
-          </a:p>
-        </p:txBody>
-      </p:sp>
-    </p:spTree>
-    <p:extLst>
-      <p:ext uri="{BB962C8B-B14F-4D97-AF65-F5344CB8AC3E}">
-        <p14:creationId xmlns:p14="http://schemas.microsoft.com/office/powerpoint/2010/main" val="881716956"/>
-      </p:ext>
-    </p:extLst>
-  </p:cSld>
-  <p:clrMapOvr>
-    <a:masterClrMapping/>
-  </p:clrMapOvr>
-</p:sld>
-</file>
-
 <file path=ppt/slides/slide4.xml><?xml version="1.0" encoding="utf-8"?>
 <p:sld xmlns:a="http://schemas.openxmlformats.org/drawingml/2006/main" xmlns:r="http://schemas.openxmlformats.org/officeDocument/2006/relationships" xmlns:p="http://schemas.openxmlformats.org/presentationml/2006/main">
   <p:cSld>
@@ -18823,7 +19168,7 @@
           <p:cNvPr id="2" name="Title 1">
             <a:extLst>
               <a:ext uri="{FF2B5EF4-FFF2-40B4-BE49-F238E27FC236}">
-                <a16:creationId xmlns:a16="http://schemas.microsoft.com/office/drawing/2014/main" id="{4014F513-29B0-27F8-E25C-1BF67FD82B38}"/>
+                <a16:creationId xmlns:a16="http://schemas.microsoft.com/office/drawing/2014/main" id="{4D26FBD0-B455-1317-85FC-7DB1E420BE8F}"/>
               </a:ext>
             </a:extLst>
           </p:cNvPr>
@@ -18848,7 +19193,7 @@
           <p:cNvPr id="3" name="Content Placeholder 2">
             <a:extLst>
               <a:ext uri="{FF2B5EF4-FFF2-40B4-BE49-F238E27FC236}">
-                <a16:creationId xmlns:a16="http://schemas.microsoft.com/office/drawing/2014/main" id="{D60B97D1-8E53-25BC-B706-C8B1D0030E02}"/>
+                <a16:creationId xmlns:a16="http://schemas.microsoft.com/office/drawing/2014/main" id="{63FD0781-599E-4F4F-F687-ECC4BB7E4373}"/>
               </a:ext>
             </a:extLst>
           </p:cNvPr>
@@ -18866,18 +19211,57 @@
           <a:p>
             <a:r>
               <a:rPr lang="en-US"/>
-              <a:t>Examples of importance of good code (how to write loops) (see my book)</a:t>
+              <a:t>Selecting elements from lists (subsetting)</a:t>
             </a:r>
           </a:p>
           <a:p>
             <a:endParaRPr lang="en-CH"/>
+          </a:p>
+        </p:txBody>
+      </p:sp>
+      <p:sp>
+        <p:nvSpPr>
+          <p:cNvPr id="4" name="TextBox 3">
+            <a:extLst>
+              <a:ext uri="{FF2B5EF4-FFF2-40B4-BE49-F238E27FC236}">
+                <a16:creationId xmlns:a16="http://schemas.microsoft.com/office/drawing/2014/main" id="{18B1B5EA-79E0-3506-F1BE-F5B646A38573}"/>
+              </a:ext>
+            </a:extLst>
+          </p:cNvPr>
+          <p:cNvSpPr txBox="1"/>
+          <p:nvPr/>
+        </p:nvSpPr>
+        <p:spPr>
+          <a:xfrm>
+            <a:off x="7162800" y="4866501"/>
+            <a:ext cx="2108200" cy="276999"/>
+          </a:xfrm>
+          <a:prstGeom prst="rect">
+            <a:avLst/>
+          </a:prstGeom>
+          <a:noFill/>
+        </p:spPr>
+        <p:txBody>
+          <a:bodyPr wrap="square" rtlCol="0">
+            <a:spAutoFit/>
+          </a:bodyPr>
+          <a:lstStyle/>
+          <a:p>
+            <a:r>
+              <a:rPr lang="en-CH" sz="1200"/>
+              <a:t>Adapted from </a:t>
+            </a:r>
+            <a:r>
+              <a:rPr lang="en-GB" sz="1200"/>
+              <a:t>www.py4e.com</a:t>
+            </a:r>
           </a:p>
         </p:txBody>
       </p:sp>
     </p:spTree>
     <p:extLst>
       <p:ext uri="{BB962C8B-B14F-4D97-AF65-F5344CB8AC3E}">
-        <p14:creationId xmlns:p14="http://schemas.microsoft.com/office/powerpoint/2010/main" val="1543972822"/>
+        <p14:creationId xmlns:p14="http://schemas.microsoft.com/office/powerpoint/2010/main" val="1478207972"/>
       </p:ext>
     </p:extLst>
   </p:cSld>
@@ -18909,7 +19293,7 @@
           <p:cNvPr id="2" name="Title 1">
             <a:extLst>
               <a:ext uri="{FF2B5EF4-FFF2-40B4-BE49-F238E27FC236}">
-                <a16:creationId xmlns:a16="http://schemas.microsoft.com/office/drawing/2014/main" id="{8C6CE813-C017-5CDE-1919-D9818FF0F759}"/>
+                <a16:creationId xmlns:a16="http://schemas.microsoft.com/office/drawing/2014/main" id="{082C0C09-969B-2F64-C262-889B52837A97}"/>
               </a:ext>
             </a:extLst>
           </p:cNvPr>
@@ -18934,7 +19318,7 @@
           <p:cNvPr id="3" name="Content Placeholder 2">
             <a:extLst>
               <a:ext uri="{FF2B5EF4-FFF2-40B4-BE49-F238E27FC236}">
-                <a16:creationId xmlns:a16="http://schemas.microsoft.com/office/drawing/2014/main" id="{F01315A3-5B3E-618E-2A8C-B6804002837E}"/>
+                <a16:creationId xmlns:a16="http://schemas.microsoft.com/office/drawing/2014/main" id="{5C2826F4-7C18-2376-334F-AA46F703B594}"/>
               </a:ext>
             </a:extLst>
           </p:cNvPr>
@@ -18951,23 +19335,9 @@
           <a:lstStyle/>
           <a:p>
             <a:r>
-              <a:rPr lang="en-US"/>
-              <a:t>Information about scikit-learn and examples (linear regression and maybe logistic regression)</a:t>
-            </a:r>
-          </a:p>
-          <a:p>
-            <a:r>
-              <a:rPr lang="en-US"/>
-              <a:t>Scikit-learn for things like model validation, stratified sampling, etc.</a:t>
-            </a:r>
-          </a:p>
-          <a:p>
-            <a:r>
-              <a:rPr lang="en-US"/>
-              <a:t>Importance of good documentation (examples with scikit-learn docs)</a:t>
-            </a:r>
-          </a:p>
-          <a:p>
+              <a:rPr lang="en-GB"/>
+              <a:t>Importance of understanding algorithms (example with loops)</a:t>
+            </a:r>
             <a:endParaRPr lang="en-CH"/>
           </a:p>
         </p:txBody>
@@ -18975,7 +19345,7 @@
     </p:spTree>
     <p:extLst>
       <p:ext uri="{BB962C8B-B14F-4D97-AF65-F5344CB8AC3E}">
-        <p14:creationId xmlns:p14="http://schemas.microsoft.com/office/powerpoint/2010/main" val="2514658733"/>
+        <p14:creationId xmlns:p14="http://schemas.microsoft.com/office/powerpoint/2010/main" val="3436984283"/>
       </p:ext>
     </p:extLst>
   </p:cSld>
@@ -19007,6 +19377,276 @@
           <p:cNvPr id="2" name="Title 1">
             <a:extLst>
               <a:ext uri="{FF2B5EF4-FFF2-40B4-BE49-F238E27FC236}">
+                <a16:creationId xmlns:a16="http://schemas.microsoft.com/office/drawing/2014/main" id="{9EDF0BE2-EAA3-2233-DDF0-CF1EDB291AC2}"/>
+              </a:ext>
+            </a:extLst>
+          </p:cNvPr>
+          <p:cNvSpPr>
+            <a:spLocks noGrp="1"/>
+          </p:cNvSpPr>
+          <p:nvPr>
+            <p:ph type="title"/>
+          </p:nvPr>
+        </p:nvSpPr>
+        <p:spPr/>
+        <p:txBody>
+          <a:bodyPr/>
+          <a:lstStyle/>
+          <a:p>
+            <a:endParaRPr lang="en-CH"/>
+          </a:p>
+        </p:txBody>
+      </p:sp>
+      <p:sp>
+        <p:nvSpPr>
+          <p:cNvPr id="3" name="Content Placeholder 2">
+            <a:extLst>
+              <a:ext uri="{FF2B5EF4-FFF2-40B4-BE49-F238E27FC236}">
+                <a16:creationId xmlns:a16="http://schemas.microsoft.com/office/drawing/2014/main" id="{762A862A-B827-0A17-89DA-BF47C739F4AF}"/>
+              </a:ext>
+            </a:extLst>
+          </p:cNvPr>
+          <p:cNvSpPr>
+            <a:spLocks noGrp="1"/>
+          </p:cNvSpPr>
+          <p:nvPr>
+            <p:ph idx="1"/>
+          </p:nvPr>
+        </p:nvSpPr>
+        <p:spPr/>
+        <p:txBody>
+          <a:bodyPr/>
+          <a:lstStyle/>
+          <a:p>
+            <a:r>
+              <a:rPr lang="en-US"/>
+              <a:t>Advantages of numpy (dealing with data) and of pandas (why use it?) (for example aggregations)</a:t>
+            </a:r>
+          </a:p>
+          <a:p>
+            <a:endParaRPr lang="en-CH"/>
+          </a:p>
+        </p:txBody>
+      </p:sp>
+    </p:spTree>
+    <p:extLst>
+      <p:ext uri="{BB962C8B-B14F-4D97-AF65-F5344CB8AC3E}">
+        <p14:creationId xmlns:p14="http://schemas.microsoft.com/office/powerpoint/2010/main" val="881716956"/>
+      </p:ext>
+    </p:extLst>
+  </p:cSld>
+  <p:clrMapOvr>
+    <a:masterClrMapping/>
+  </p:clrMapOvr>
+</p:sld>
+</file>
+
+<file path=ppt/slides/slide43.xml><?xml version="1.0" encoding="utf-8"?>
+<p:sld xmlns:a="http://schemas.openxmlformats.org/drawingml/2006/main" xmlns:r="http://schemas.openxmlformats.org/officeDocument/2006/relationships" xmlns:p="http://schemas.openxmlformats.org/presentationml/2006/main">
+  <p:cSld>
+    <p:spTree>
+      <p:nvGrpSpPr>
+        <p:cNvPr id="1" name=""/>
+        <p:cNvGrpSpPr/>
+        <p:nvPr/>
+      </p:nvGrpSpPr>
+      <p:grpSpPr>
+        <a:xfrm>
+          <a:off x="0" y="0"/>
+          <a:ext cx="0" cy="0"/>
+          <a:chOff x="0" y="0"/>
+          <a:chExt cx="0" cy="0"/>
+        </a:xfrm>
+      </p:grpSpPr>
+      <p:sp>
+        <p:nvSpPr>
+          <p:cNvPr id="2" name="Title 1">
+            <a:extLst>
+              <a:ext uri="{FF2B5EF4-FFF2-40B4-BE49-F238E27FC236}">
+                <a16:creationId xmlns:a16="http://schemas.microsoft.com/office/drawing/2014/main" id="{4014F513-29B0-27F8-E25C-1BF67FD82B38}"/>
+              </a:ext>
+            </a:extLst>
+          </p:cNvPr>
+          <p:cNvSpPr>
+            <a:spLocks noGrp="1"/>
+          </p:cNvSpPr>
+          <p:nvPr>
+            <p:ph type="title"/>
+          </p:nvPr>
+        </p:nvSpPr>
+        <p:spPr/>
+        <p:txBody>
+          <a:bodyPr/>
+          <a:lstStyle/>
+          <a:p>
+            <a:endParaRPr lang="en-CH"/>
+          </a:p>
+        </p:txBody>
+      </p:sp>
+      <p:sp>
+        <p:nvSpPr>
+          <p:cNvPr id="3" name="Content Placeholder 2">
+            <a:extLst>
+              <a:ext uri="{FF2B5EF4-FFF2-40B4-BE49-F238E27FC236}">
+                <a16:creationId xmlns:a16="http://schemas.microsoft.com/office/drawing/2014/main" id="{D60B97D1-8E53-25BC-B706-C8B1D0030E02}"/>
+              </a:ext>
+            </a:extLst>
+          </p:cNvPr>
+          <p:cNvSpPr>
+            <a:spLocks noGrp="1"/>
+          </p:cNvSpPr>
+          <p:nvPr>
+            <p:ph idx="1"/>
+          </p:nvPr>
+        </p:nvSpPr>
+        <p:spPr/>
+        <p:txBody>
+          <a:bodyPr/>
+          <a:lstStyle/>
+          <a:p>
+            <a:r>
+              <a:rPr lang="en-US"/>
+              <a:t>Examples of importance of good code (how to write loops) (see my book)</a:t>
+            </a:r>
+          </a:p>
+          <a:p>
+            <a:endParaRPr lang="en-CH"/>
+          </a:p>
+        </p:txBody>
+      </p:sp>
+    </p:spTree>
+    <p:extLst>
+      <p:ext uri="{BB962C8B-B14F-4D97-AF65-F5344CB8AC3E}">
+        <p14:creationId xmlns:p14="http://schemas.microsoft.com/office/powerpoint/2010/main" val="1543972822"/>
+      </p:ext>
+    </p:extLst>
+  </p:cSld>
+  <p:clrMapOvr>
+    <a:masterClrMapping/>
+  </p:clrMapOvr>
+</p:sld>
+</file>
+
+<file path=ppt/slides/slide44.xml><?xml version="1.0" encoding="utf-8"?>
+<p:sld xmlns:a="http://schemas.openxmlformats.org/drawingml/2006/main" xmlns:r="http://schemas.openxmlformats.org/officeDocument/2006/relationships" xmlns:p="http://schemas.openxmlformats.org/presentationml/2006/main">
+  <p:cSld>
+    <p:spTree>
+      <p:nvGrpSpPr>
+        <p:cNvPr id="1" name=""/>
+        <p:cNvGrpSpPr/>
+        <p:nvPr/>
+      </p:nvGrpSpPr>
+      <p:grpSpPr>
+        <a:xfrm>
+          <a:off x="0" y="0"/>
+          <a:ext cx="0" cy="0"/>
+          <a:chOff x="0" y="0"/>
+          <a:chExt cx="0" cy="0"/>
+        </a:xfrm>
+      </p:grpSpPr>
+      <p:sp>
+        <p:nvSpPr>
+          <p:cNvPr id="2" name="Title 1">
+            <a:extLst>
+              <a:ext uri="{FF2B5EF4-FFF2-40B4-BE49-F238E27FC236}">
+                <a16:creationId xmlns:a16="http://schemas.microsoft.com/office/drawing/2014/main" id="{8C6CE813-C017-5CDE-1919-D9818FF0F759}"/>
+              </a:ext>
+            </a:extLst>
+          </p:cNvPr>
+          <p:cNvSpPr>
+            <a:spLocks noGrp="1"/>
+          </p:cNvSpPr>
+          <p:nvPr>
+            <p:ph type="title"/>
+          </p:nvPr>
+        </p:nvSpPr>
+        <p:spPr/>
+        <p:txBody>
+          <a:bodyPr/>
+          <a:lstStyle/>
+          <a:p>
+            <a:endParaRPr lang="en-CH"/>
+          </a:p>
+        </p:txBody>
+      </p:sp>
+      <p:sp>
+        <p:nvSpPr>
+          <p:cNvPr id="3" name="Content Placeholder 2">
+            <a:extLst>
+              <a:ext uri="{FF2B5EF4-FFF2-40B4-BE49-F238E27FC236}">
+                <a16:creationId xmlns:a16="http://schemas.microsoft.com/office/drawing/2014/main" id="{F01315A3-5B3E-618E-2A8C-B6804002837E}"/>
+              </a:ext>
+            </a:extLst>
+          </p:cNvPr>
+          <p:cNvSpPr>
+            <a:spLocks noGrp="1"/>
+          </p:cNvSpPr>
+          <p:nvPr>
+            <p:ph idx="1"/>
+          </p:nvPr>
+        </p:nvSpPr>
+        <p:spPr/>
+        <p:txBody>
+          <a:bodyPr/>
+          <a:lstStyle/>
+          <a:p>
+            <a:r>
+              <a:rPr lang="en-US"/>
+              <a:t>Information about scikit-learn and examples (linear regression and maybe logistic regression)</a:t>
+            </a:r>
+          </a:p>
+          <a:p>
+            <a:r>
+              <a:rPr lang="en-US"/>
+              <a:t>Scikit-learn for things like model validation, stratified sampling, etc.</a:t>
+            </a:r>
+          </a:p>
+          <a:p>
+            <a:r>
+              <a:rPr lang="en-US"/>
+              <a:t>Importance of good documentation (examples with scikit-learn docs)</a:t>
+            </a:r>
+          </a:p>
+          <a:p>
+            <a:endParaRPr lang="en-CH"/>
+          </a:p>
+        </p:txBody>
+      </p:sp>
+    </p:spTree>
+    <p:extLst>
+      <p:ext uri="{BB962C8B-B14F-4D97-AF65-F5344CB8AC3E}">
+        <p14:creationId xmlns:p14="http://schemas.microsoft.com/office/powerpoint/2010/main" val="2514658733"/>
+      </p:ext>
+    </p:extLst>
+  </p:cSld>
+  <p:clrMapOvr>
+    <a:masterClrMapping/>
+  </p:clrMapOvr>
+</p:sld>
+</file>
+
+<file path=ppt/slides/slide45.xml><?xml version="1.0" encoding="utf-8"?>
+<p:sld xmlns:a="http://schemas.openxmlformats.org/drawingml/2006/main" xmlns:r="http://schemas.openxmlformats.org/officeDocument/2006/relationships" xmlns:p="http://schemas.openxmlformats.org/presentationml/2006/main">
+  <p:cSld>
+    <p:spTree>
+      <p:nvGrpSpPr>
+        <p:cNvPr id="1" name=""/>
+        <p:cNvGrpSpPr/>
+        <p:nvPr/>
+      </p:nvGrpSpPr>
+      <p:grpSpPr>
+        <a:xfrm>
+          <a:off x="0" y="0"/>
+          <a:ext cx="0" cy="0"/>
+          <a:chOff x="0" y="0"/>
+          <a:chExt cx="0" cy="0"/>
+        </a:xfrm>
+      </p:grpSpPr>
+      <p:sp>
+        <p:nvSpPr>
+          <p:cNvPr id="2" name="Title 1">
+            <a:extLst>
+              <a:ext uri="{FF2B5EF4-FFF2-40B4-BE49-F238E27FC236}">
                 <a16:creationId xmlns:a16="http://schemas.microsoft.com/office/drawing/2014/main" id="{6A305D43-587E-2D7F-BFEF-A2108DF6554F}"/>
               </a:ext>
             </a:extLst>
@@ -19071,7 +19711,7 @@
 </p:sld>
 </file>
 
-<file path=ppt/slides/slide43.xml><?xml version="1.0" encoding="utf-8"?>
+<file path=ppt/slides/slide46.xml><?xml version="1.0" encoding="utf-8"?>
 <p:sld xmlns:a="http://schemas.openxmlformats.org/drawingml/2006/main" xmlns:r="http://schemas.openxmlformats.org/officeDocument/2006/relationships" xmlns:p="http://schemas.openxmlformats.org/presentationml/2006/main">
   <p:cSld>
     <p:spTree>

</xml_diff>

<commit_message>
Updated notebook on Python
</commit_message>
<xml_diff>
--- a/DETERMINED2022/Python and scikit-learn/DETERMINED2022-toelt-Introduction Python and Scikit-learn.pptx
+++ b/DETERMINED2022/Python and scikit-learn/DETERMINED2022-toelt-Introduction Python and Scikit-learn.pptx
@@ -44,15 +44,15 @@
     <p:sldId id="300" r:id="rId35"/>
     <p:sldId id="301" r:id="rId36"/>
     <p:sldId id="302" r:id="rId37"/>
-    <p:sldId id="298" r:id="rId38"/>
-    <p:sldId id="299" r:id="rId39"/>
-    <p:sldId id="304" r:id="rId40"/>
-    <p:sldId id="305" r:id="rId41"/>
-    <p:sldId id="306" r:id="rId42"/>
-    <p:sldId id="307" r:id="rId43"/>
-    <p:sldId id="309" r:id="rId44"/>
-    <p:sldId id="263" r:id="rId45"/>
-    <p:sldId id="266" r:id="rId46"/>
+    <p:sldId id="312" r:id="rId38"/>
+    <p:sldId id="298" r:id="rId39"/>
+    <p:sldId id="299" r:id="rId40"/>
+    <p:sldId id="304" r:id="rId41"/>
+    <p:sldId id="305" r:id="rId42"/>
+    <p:sldId id="306" r:id="rId43"/>
+    <p:sldId id="307" r:id="rId44"/>
+    <p:sldId id="309" r:id="rId45"/>
+    <p:sldId id="263" r:id="rId46"/>
     <p:sldId id="267" r:id="rId47"/>
   </p:sldIdLst>
   <p:sldSz cx="9144000" cy="5143500" type="screen16x9"/>
@@ -21592,6 +21592,64 @@
           <p:cNvPr id="2" name="Title 1">
             <a:extLst>
               <a:ext uri="{FF2B5EF4-FFF2-40B4-BE49-F238E27FC236}">
+                <a16:creationId xmlns:a16="http://schemas.microsoft.com/office/drawing/2014/main" id="{5244984A-3B80-977B-21D5-79204628047B}"/>
+              </a:ext>
+            </a:extLst>
+          </p:cNvPr>
+          <p:cNvSpPr>
+            <a:spLocks noGrp="1"/>
+          </p:cNvSpPr>
+          <p:nvPr>
+            <p:ph type="title"/>
+          </p:nvPr>
+        </p:nvSpPr>
+        <p:spPr/>
+        <p:txBody>
+          <a:bodyPr/>
+          <a:lstStyle/>
+          <a:p>
+            <a:r>
+              <a:rPr lang="en-CH"/>
+              <a:t>Hands-on</a:t>
+            </a:r>
+          </a:p>
+        </p:txBody>
+      </p:sp>
+    </p:spTree>
+    <p:extLst>
+      <p:ext uri="{BB962C8B-B14F-4D97-AF65-F5344CB8AC3E}">
+        <p14:creationId xmlns:p14="http://schemas.microsoft.com/office/powerpoint/2010/main" val="3093679030"/>
+      </p:ext>
+    </p:extLst>
+  </p:cSld>
+  <p:clrMapOvr>
+    <a:masterClrMapping/>
+  </p:clrMapOvr>
+</p:sld>
+</file>
+
+<file path=ppt/slides/slide38.xml><?xml version="1.0" encoding="utf-8"?>
+<p:sld xmlns:a="http://schemas.openxmlformats.org/drawingml/2006/main" xmlns:r="http://schemas.openxmlformats.org/officeDocument/2006/relationships" xmlns:p="http://schemas.openxmlformats.org/presentationml/2006/main">
+  <p:cSld>
+    <p:spTree>
+      <p:nvGrpSpPr>
+        <p:cNvPr id="1" name=""/>
+        <p:cNvGrpSpPr/>
+        <p:nvPr/>
+      </p:nvGrpSpPr>
+      <p:grpSpPr>
+        <a:xfrm>
+          <a:off x="0" y="0"/>
+          <a:ext cx="0" cy="0"/>
+          <a:chOff x="0" y="0"/>
+          <a:chExt cx="0" cy="0"/>
+        </a:xfrm>
+      </p:grpSpPr>
+      <p:sp>
+        <p:nvSpPr>
+          <p:cNvPr id="2" name="Title 1">
+            <a:extLst>
+              <a:ext uri="{FF2B5EF4-FFF2-40B4-BE49-F238E27FC236}">
                 <a16:creationId xmlns:a16="http://schemas.microsoft.com/office/drawing/2014/main" id="{0B8D8E31-EAF5-1A38-945C-A6214E13FA84}"/>
               </a:ext>
             </a:extLst>
@@ -21918,7 +21976,7 @@
 </p:sld>
 </file>
 
-<file path=ppt/slides/slide38.xml><?xml version="1.0" encoding="utf-8"?>
+<file path=ppt/slides/slide39.xml><?xml version="1.0" encoding="utf-8"?>
 <p:sld xmlns:a="http://schemas.openxmlformats.org/drawingml/2006/main" xmlns:r="http://schemas.openxmlformats.org/officeDocument/2006/relationships" xmlns:p="http://schemas.openxmlformats.org/presentationml/2006/main">
   <p:cSld>
     <p:spTree>
@@ -22008,7 +22066,199 @@
 </p:sld>
 </file>
 
-<file path=ppt/slides/slide39.xml><?xml version="1.0" encoding="utf-8"?>
+<file path=ppt/slides/slide4.xml><?xml version="1.0" encoding="utf-8"?>
+<p:sld xmlns:a="http://schemas.openxmlformats.org/drawingml/2006/main" xmlns:r="http://schemas.openxmlformats.org/officeDocument/2006/relationships" xmlns:p="http://schemas.openxmlformats.org/presentationml/2006/main">
+  <p:cSld>
+    <p:spTree>
+      <p:nvGrpSpPr>
+        <p:cNvPr id="1" name=""/>
+        <p:cNvGrpSpPr/>
+        <p:nvPr/>
+      </p:nvGrpSpPr>
+      <p:grpSpPr>
+        <a:xfrm>
+          <a:off x="0" y="0"/>
+          <a:ext cx="0" cy="0"/>
+          <a:chOff x="0" y="0"/>
+          <a:chExt cx="0" cy="0"/>
+        </a:xfrm>
+      </p:grpSpPr>
+      <p:sp>
+        <p:nvSpPr>
+          <p:cNvPr id="2" name="Title 1">
+            <a:extLst>
+              <a:ext uri="{FF2B5EF4-FFF2-40B4-BE49-F238E27FC236}">
+                <a16:creationId xmlns:a16="http://schemas.microsoft.com/office/drawing/2014/main" id="{8C5A40C9-E01D-BEFC-1D9B-DA8A27C238F1}"/>
+              </a:ext>
+            </a:extLst>
+          </p:cNvPr>
+          <p:cNvSpPr>
+            <a:spLocks noGrp="1"/>
+          </p:cNvSpPr>
+          <p:nvPr>
+            <p:ph type="title"/>
+          </p:nvPr>
+        </p:nvSpPr>
+        <p:spPr>
+          <a:xfrm>
+            <a:off x="628650" y="202822"/>
+            <a:ext cx="7886700" cy="994172"/>
+          </a:xfrm>
+        </p:spPr>
+        <p:txBody>
+          <a:bodyPr>
+            <a:normAutofit fontScale="90000"/>
+          </a:bodyPr>
+          <a:lstStyle/>
+          <a:p>
+            <a:r>
+              <a:rPr lang="en-CH"/>
+              <a:t>Reproducibility and Replicability (two opposite definitions)</a:t>
+            </a:r>
+          </a:p>
+        </p:txBody>
+      </p:sp>
+      <p:sp>
+        <p:nvSpPr>
+          <p:cNvPr id="3" name="Content Placeholder 2">
+            <a:extLst>
+              <a:ext uri="{FF2B5EF4-FFF2-40B4-BE49-F238E27FC236}">
+                <a16:creationId xmlns:a16="http://schemas.microsoft.com/office/drawing/2014/main" id="{68D3CDD2-F5AD-E43A-CB56-D2496532D05D}"/>
+              </a:ext>
+            </a:extLst>
+          </p:cNvPr>
+          <p:cNvSpPr>
+            <a:spLocks noGrp="1"/>
+          </p:cNvSpPr>
+          <p:nvPr>
+            <p:ph idx="1"/>
+          </p:nvPr>
+        </p:nvSpPr>
+        <p:spPr>
+          <a:xfrm>
+            <a:off x="628650" y="1369219"/>
+            <a:ext cx="7886700" cy="3380334"/>
+          </a:xfrm>
+        </p:spPr>
+        <p:txBody>
+          <a:bodyPr>
+            <a:normAutofit/>
+          </a:bodyPr>
+          <a:lstStyle/>
+          <a:p>
+            <a:pPr marL="0" indent="0">
+              <a:buNone/>
+            </a:pPr>
+            <a:r>
+              <a:rPr lang="en-GB"/>
+              <a:t>“</a:t>
+            </a:r>
+            <a:r>
+              <a:rPr lang="en-GB" b="1" u="sng"/>
+              <a:t>Reproducibility</a:t>
+            </a:r>
+            <a:r>
+              <a:rPr lang="en-GB"/>
+              <a:t>” refers to instances in which the original researcher's data and computer codes are used to regenerate the results, while “</a:t>
+            </a:r>
+            <a:r>
+              <a:rPr lang="en-GB" b="1" u="sng"/>
+              <a:t>replicability</a:t>
+            </a:r>
+            <a:r>
+              <a:rPr lang="en-GB"/>
+              <a:t>” refers to instances in which a researcher collects new data to arrive at the same scientific findings as a previous study.</a:t>
+            </a:r>
+          </a:p>
+          <a:p>
+            <a:pPr marL="0" indent="0">
+              <a:buNone/>
+            </a:pPr>
+            <a:endParaRPr lang="en-GB"/>
+          </a:p>
+          <a:p>
+            <a:pPr marL="0" indent="0">
+              <a:buNone/>
+            </a:pPr>
+            <a:r>
+              <a:rPr lang="en-GB"/>
+              <a:t>“</a:t>
+            </a:r>
+            <a:r>
+              <a:rPr lang="en-GB" b="1" u="sng"/>
+              <a:t>Reproducibility</a:t>
+            </a:r>
+            <a:r>
+              <a:rPr lang="en-GB"/>
+              <a:t>” refers to independent researchers arriving at the same results using their own data and methods, while “</a:t>
+            </a:r>
+            <a:r>
+              <a:rPr lang="en-GB" b="1" u="sng"/>
+              <a:t>replicability</a:t>
+            </a:r>
+            <a:r>
+              <a:rPr lang="en-GB"/>
+              <a:t>” refers to a different team arriving at the same results using the original author's artifacts.</a:t>
+            </a:r>
+          </a:p>
+        </p:txBody>
+      </p:sp>
+      <p:sp>
+        <p:nvSpPr>
+          <p:cNvPr id="5" name="TextBox 4">
+            <a:extLst>
+              <a:ext uri="{FF2B5EF4-FFF2-40B4-BE49-F238E27FC236}">
+                <a16:creationId xmlns:a16="http://schemas.microsoft.com/office/drawing/2014/main" id="{2E509B11-116E-5BD6-E871-852E55315C0B}"/>
+              </a:ext>
+            </a:extLst>
+          </p:cNvPr>
+          <p:cNvSpPr txBox="1"/>
+          <p:nvPr/>
+        </p:nvSpPr>
+        <p:spPr>
+          <a:xfrm>
+            <a:off x="317376" y="4802178"/>
+            <a:ext cx="8509247" cy="276999"/>
+          </a:xfrm>
+          <a:prstGeom prst="rect">
+            <a:avLst/>
+          </a:prstGeom>
+          <a:noFill/>
+        </p:spPr>
+        <p:txBody>
+          <a:bodyPr wrap="square">
+            <a:spAutoFit/>
+          </a:bodyPr>
+          <a:lstStyle/>
+          <a:p>
+            <a:r>
+              <a:rPr lang="en-GB" sz="1200">
+                <a:latin typeface="Arial" panose="020B0604020202020204" pitchFamily="34" charset="0"/>
+                <a:cs typeface="Arial" panose="020B0604020202020204" pitchFamily="34" charset="0"/>
+              </a:rPr>
+              <a:t>National Academies of Sciences, Engineering, and Medicine. "Reproducibility and replicability in science." (2019).</a:t>
+            </a:r>
+            <a:endParaRPr lang="en-CH" sz="1200">
+              <a:latin typeface="Arial" panose="020B0604020202020204" pitchFamily="34" charset="0"/>
+              <a:cs typeface="Arial" panose="020B0604020202020204" pitchFamily="34" charset="0"/>
+            </a:endParaRPr>
+          </a:p>
+        </p:txBody>
+      </p:sp>
+    </p:spTree>
+    <p:extLst>
+      <p:ext uri="{BB962C8B-B14F-4D97-AF65-F5344CB8AC3E}">
+        <p14:creationId xmlns:p14="http://schemas.microsoft.com/office/powerpoint/2010/main" val="2606564281"/>
+      </p:ext>
+    </p:extLst>
+  </p:cSld>
+  <p:clrMapOvr>
+    <a:masterClrMapping/>
+  </p:clrMapOvr>
+</p:sld>
+</file>
+
+<file path=ppt/slides/slide40.xml><?xml version="1.0" encoding="utf-8"?>
 <p:sld xmlns:a="http://schemas.openxmlformats.org/drawingml/2006/main" xmlns:r="http://schemas.openxmlformats.org/officeDocument/2006/relationships" xmlns:p="http://schemas.openxmlformats.org/presentationml/2006/main">
   <p:cSld>
     <p:spTree>
@@ -22145,314 +22395,6 @@
 </p:sld>
 </file>
 
-<file path=ppt/slides/slide4.xml><?xml version="1.0" encoding="utf-8"?>
-<p:sld xmlns:a="http://schemas.openxmlformats.org/drawingml/2006/main" xmlns:r="http://schemas.openxmlformats.org/officeDocument/2006/relationships" xmlns:p="http://schemas.openxmlformats.org/presentationml/2006/main">
-  <p:cSld>
-    <p:spTree>
-      <p:nvGrpSpPr>
-        <p:cNvPr id="1" name=""/>
-        <p:cNvGrpSpPr/>
-        <p:nvPr/>
-      </p:nvGrpSpPr>
-      <p:grpSpPr>
-        <a:xfrm>
-          <a:off x="0" y="0"/>
-          <a:ext cx="0" cy="0"/>
-          <a:chOff x="0" y="0"/>
-          <a:chExt cx="0" cy="0"/>
-        </a:xfrm>
-      </p:grpSpPr>
-      <p:sp>
-        <p:nvSpPr>
-          <p:cNvPr id="2" name="Title 1">
-            <a:extLst>
-              <a:ext uri="{FF2B5EF4-FFF2-40B4-BE49-F238E27FC236}">
-                <a16:creationId xmlns:a16="http://schemas.microsoft.com/office/drawing/2014/main" id="{8C5A40C9-E01D-BEFC-1D9B-DA8A27C238F1}"/>
-              </a:ext>
-            </a:extLst>
-          </p:cNvPr>
-          <p:cNvSpPr>
-            <a:spLocks noGrp="1"/>
-          </p:cNvSpPr>
-          <p:nvPr>
-            <p:ph type="title"/>
-          </p:nvPr>
-        </p:nvSpPr>
-        <p:spPr>
-          <a:xfrm>
-            <a:off x="628650" y="202822"/>
-            <a:ext cx="7886700" cy="994172"/>
-          </a:xfrm>
-        </p:spPr>
-        <p:txBody>
-          <a:bodyPr>
-            <a:normAutofit fontScale="90000"/>
-          </a:bodyPr>
-          <a:lstStyle/>
-          <a:p>
-            <a:r>
-              <a:rPr lang="en-CH"/>
-              <a:t>Reproducibility and Replicability (two opposite definitions)</a:t>
-            </a:r>
-          </a:p>
-        </p:txBody>
-      </p:sp>
-      <p:sp>
-        <p:nvSpPr>
-          <p:cNvPr id="3" name="Content Placeholder 2">
-            <a:extLst>
-              <a:ext uri="{FF2B5EF4-FFF2-40B4-BE49-F238E27FC236}">
-                <a16:creationId xmlns:a16="http://schemas.microsoft.com/office/drawing/2014/main" id="{68D3CDD2-F5AD-E43A-CB56-D2496532D05D}"/>
-              </a:ext>
-            </a:extLst>
-          </p:cNvPr>
-          <p:cNvSpPr>
-            <a:spLocks noGrp="1"/>
-          </p:cNvSpPr>
-          <p:nvPr>
-            <p:ph idx="1"/>
-          </p:nvPr>
-        </p:nvSpPr>
-        <p:spPr>
-          <a:xfrm>
-            <a:off x="628650" y="1369219"/>
-            <a:ext cx="7886700" cy="3380334"/>
-          </a:xfrm>
-        </p:spPr>
-        <p:txBody>
-          <a:bodyPr>
-            <a:normAutofit/>
-          </a:bodyPr>
-          <a:lstStyle/>
-          <a:p>
-            <a:pPr marL="0" indent="0">
-              <a:buNone/>
-            </a:pPr>
-            <a:r>
-              <a:rPr lang="en-GB"/>
-              <a:t>“</a:t>
-            </a:r>
-            <a:r>
-              <a:rPr lang="en-GB" b="1" u="sng"/>
-              <a:t>Reproducibility</a:t>
-            </a:r>
-            <a:r>
-              <a:rPr lang="en-GB"/>
-              <a:t>” refers to instances in which the original researcher's data and computer codes are used to regenerate the results, while “</a:t>
-            </a:r>
-            <a:r>
-              <a:rPr lang="en-GB" b="1" u="sng"/>
-              <a:t>replicability</a:t>
-            </a:r>
-            <a:r>
-              <a:rPr lang="en-GB"/>
-              <a:t>” refers to instances in which a researcher collects new data to arrive at the same scientific findings as a previous study.</a:t>
-            </a:r>
-          </a:p>
-          <a:p>
-            <a:pPr marL="0" indent="0">
-              <a:buNone/>
-            </a:pPr>
-            <a:endParaRPr lang="en-GB"/>
-          </a:p>
-          <a:p>
-            <a:pPr marL="0" indent="0">
-              <a:buNone/>
-            </a:pPr>
-            <a:r>
-              <a:rPr lang="en-GB"/>
-              <a:t>“</a:t>
-            </a:r>
-            <a:r>
-              <a:rPr lang="en-GB" b="1" u="sng"/>
-              <a:t>Reproducibility</a:t>
-            </a:r>
-            <a:r>
-              <a:rPr lang="en-GB"/>
-              <a:t>” refers to independent researchers arriving at the same results using their own data and methods, while “</a:t>
-            </a:r>
-            <a:r>
-              <a:rPr lang="en-GB" b="1" u="sng"/>
-              <a:t>replicability</a:t>
-            </a:r>
-            <a:r>
-              <a:rPr lang="en-GB"/>
-              <a:t>” refers to a different team arriving at the same results using the original author's artifacts.</a:t>
-            </a:r>
-          </a:p>
-        </p:txBody>
-      </p:sp>
-      <p:sp>
-        <p:nvSpPr>
-          <p:cNvPr id="5" name="TextBox 4">
-            <a:extLst>
-              <a:ext uri="{FF2B5EF4-FFF2-40B4-BE49-F238E27FC236}">
-                <a16:creationId xmlns:a16="http://schemas.microsoft.com/office/drawing/2014/main" id="{2E509B11-116E-5BD6-E871-852E55315C0B}"/>
-              </a:ext>
-            </a:extLst>
-          </p:cNvPr>
-          <p:cNvSpPr txBox="1"/>
-          <p:nvPr/>
-        </p:nvSpPr>
-        <p:spPr>
-          <a:xfrm>
-            <a:off x="317376" y="4802178"/>
-            <a:ext cx="8509247" cy="276999"/>
-          </a:xfrm>
-          <a:prstGeom prst="rect">
-            <a:avLst/>
-          </a:prstGeom>
-          <a:noFill/>
-        </p:spPr>
-        <p:txBody>
-          <a:bodyPr wrap="square">
-            <a:spAutoFit/>
-          </a:bodyPr>
-          <a:lstStyle/>
-          <a:p>
-            <a:r>
-              <a:rPr lang="en-GB" sz="1200">
-                <a:latin typeface="Arial" panose="020B0604020202020204" pitchFamily="34" charset="0"/>
-                <a:cs typeface="Arial" panose="020B0604020202020204" pitchFamily="34" charset="0"/>
-              </a:rPr>
-              <a:t>National Academies of Sciences, Engineering, and Medicine. "Reproducibility and replicability in science." (2019).</a:t>
-            </a:r>
-            <a:endParaRPr lang="en-CH" sz="1200">
-              <a:latin typeface="Arial" panose="020B0604020202020204" pitchFamily="34" charset="0"/>
-              <a:cs typeface="Arial" panose="020B0604020202020204" pitchFamily="34" charset="0"/>
-            </a:endParaRPr>
-          </a:p>
-        </p:txBody>
-      </p:sp>
-    </p:spTree>
-    <p:extLst>
-      <p:ext uri="{BB962C8B-B14F-4D97-AF65-F5344CB8AC3E}">
-        <p14:creationId xmlns:p14="http://schemas.microsoft.com/office/powerpoint/2010/main" val="2606564281"/>
-      </p:ext>
-    </p:extLst>
-  </p:cSld>
-  <p:clrMapOvr>
-    <a:masterClrMapping/>
-  </p:clrMapOvr>
-</p:sld>
-</file>
-
-<file path=ppt/slides/slide40.xml><?xml version="1.0" encoding="utf-8"?>
-<p:sld xmlns:a="http://schemas.openxmlformats.org/drawingml/2006/main" xmlns:r="http://schemas.openxmlformats.org/officeDocument/2006/relationships" xmlns:p="http://schemas.openxmlformats.org/presentationml/2006/main">
-  <p:cSld>
-    <p:spTree>
-      <p:nvGrpSpPr>
-        <p:cNvPr id="1" name=""/>
-        <p:cNvGrpSpPr/>
-        <p:nvPr/>
-      </p:nvGrpSpPr>
-      <p:grpSpPr>
-        <a:xfrm>
-          <a:off x="0" y="0"/>
-          <a:ext cx="0" cy="0"/>
-          <a:chOff x="0" y="0"/>
-          <a:chExt cx="0" cy="0"/>
-        </a:xfrm>
-      </p:grpSpPr>
-      <p:sp>
-        <p:nvSpPr>
-          <p:cNvPr id="2" name="Title 1">
-            <a:extLst>
-              <a:ext uri="{FF2B5EF4-FFF2-40B4-BE49-F238E27FC236}">
-                <a16:creationId xmlns:a16="http://schemas.microsoft.com/office/drawing/2014/main" id="{7DCAA898-ADE5-786B-3AB0-E918D836E358}"/>
-              </a:ext>
-            </a:extLst>
-          </p:cNvPr>
-          <p:cNvSpPr>
-            <a:spLocks noGrp="1"/>
-          </p:cNvSpPr>
-          <p:nvPr>
-            <p:ph type="title"/>
-          </p:nvPr>
-        </p:nvSpPr>
-        <p:spPr/>
-        <p:txBody>
-          <a:bodyPr/>
-          <a:lstStyle/>
-          <a:p>
-            <a:r>
-              <a:rPr lang="en-CH"/>
-              <a:t>An online resource</a:t>
-            </a:r>
-          </a:p>
-        </p:txBody>
-      </p:sp>
-      <p:sp>
-        <p:nvSpPr>
-          <p:cNvPr id="3" name="Content Placeholder 2">
-            <a:extLst>
-              <a:ext uri="{FF2B5EF4-FFF2-40B4-BE49-F238E27FC236}">
-                <a16:creationId xmlns:a16="http://schemas.microsoft.com/office/drawing/2014/main" id="{5EEE9A1C-8FEE-70D4-3B5C-BF48DE09BBF9}"/>
-              </a:ext>
-            </a:extLst>
-          </p:cNvPr>
-          <p:cNvSpPr>
-            <a:spLocks noGrp="1"/>
-          </p:cNvSpPr>
-          <p:nvPr>
-            <p:ph idx="1"/>
-          </p:nvPr>
-        </p:nvSpPr>
-        <p:spPr>
-          <a:xfrm>
-            <a:off x="628650" y="1698171"/>
-            <a:ext cx="7886700" cy="2934552"/>
-          </a:xfrm>
-        </p:spPr>
-        <p:txBody>
-          <a:bodyPr/>
-          <a:lstStyle/>
-          <a:p>
-            <a:pPr marL="0" indent="0">
-              <a:buNone/>
-            </a:pPr>
-            <a:r>
-              <a:rPr lang="en-CH"/>
-              <a:t>Nice online course</a:t>
-            </a:r>
-          </a:p>
-          <a:p>
-            <a:pPr marL="0" indent="0">
-              <a:buNone/>
-            </a:pPr>
-            <a:endParaRPr lang="en-CH"/>
-          </a:p>
-          <a:p>
-            <a:pPr marL="0" indent="0">
-              <a:buNone/>
-            </a:pPr>
-            <a:r>
-              <a:rPr lang="en-GB">
-                <a:hlinkClick r:id="rId2"/>
-              </a:rPr>
-              <a:t>https://inria.github.io/scikit-learn-mooc/index.html</a:t>
-            </a:r>
-            <a:r>
-              <a:rPr lang="en-GB"/>
-              <a:t> </a:t>
-            </a:r>
-            <a:endParaRPr lang="en-CH"/>
-          </a:p>
-        </p:txBody>
-      </p:sp>
-    </p:spTree>
-    <p:extLst>
-      <p:ext uri="{BB962C8B-B14F-4D97-AF65-F5344CB8AC3E}">
-        <p14:creationId xmlns:p14="http://schemas.microsoft.com/office/powerpoint/2010/main" val="1868986357"/>
-      </p:ext>
-    </p:extLst>
-  </p:cSld>
-  <p:clrMapOvr>
-    <a:masterClrMapping/>
-  </p:clrMapOvr>
-</p:sld>
-</file>
-
 <file path=ppt/slides/slide41.xml><?xml version="1.0" encoding="utf-8"?>
 <p:sld xmlns:a="http://schemas.openxmlformats.org/drawingml/2006/main" xmlns:r="http://schemas.openxmlformats.org/officeDocument/2006/relationships" xmlns:p="http://schemas.openxmlformats.org/presentationml/2006/main">
   <p:cSld>
@@ -22475,7 +22417,7 @@
           <p:cNvPr id="2" name="Title 1">
             <a:extLst>
               <a:ext uri="{FF2B5EF4-FFF2-40B4-BE49-F238E27FC236}">
-                <a16:creationId xmlns:a16="http://schemas.microsoft.com/office/drawing/2014/main" id="{D9CF36FC-C33C-0CB1-3484-D5E35894DE9F}"/>
+                <a16:creationId xmlns:a16="http://schemas.microsoft.com/office/drawing/2014/main" id="{7DCAA898-ADE5-786B-3AB0-E918D836E358}"/>
               </a:ext>
             </a:extLst>
           </p:cNvPr>
@@ -22493,7 +22435,7 @@
           <a:p>
             <a:r>
               <a:rPr lang="en-CH"/>
-              <a:t>Advantages of scikit-learn</a:t>
+              <a:t>An online resource</a:t>
             </a:r>
           </a:p>
         </p:txBody>
@@ -22503,7 +22445,7 @@
           <p:cNvPr id="3" name="Content Placeholder 2">
             <a:extLst>
               <a:ext uri="{FF2B5EF4-FFF2-40B4-BE49-F238E27FC236}">
-                <a16:creationId xmlns:a16="http://schemas.microsoft.com/office/drawing/2014/main" id="{A05611B5-42FC-B7FB-76DC-23852C0C1669}"/>
+                <a16:creationId xmlns:a16="http://schemas.microsoft.com/office/drawing/2014/main" id="{5EEE9A1C-8FEE-70D4-3B5C-BF48DE09BBF9}"/>
               </a:ext>
             </a:extLst>
           </p:cNvPr>
@@ -22516,51 +22458,40 @@
         </p:nvSpPr>
         <p:spPr>
           <a:xfrm>
-            <a:off x="628650" y="1643169"/>
-            <a:ext cx="7886700" cy="2989553"/>
+            <a:off x="628650" y="1698171"/>
+            <a:ext cx="7886700" cy="2934552"/>
           </a:xfrm>
         </p:spPr>
         <p:txBody>
           <a:bodyPr/>
           <a:lstStyle/>
           <a:p>
+            <a:pPr marL="0" indent="0">
+              <a:buNone/>
+            </a:pPr>
             <a:r>
               <a:rPr lang="en-CH"/>
-              <a:t>Scikit-learn covers all parts of a machine learning pipeline (except for neural networks)</a:t>
-            </a:r>
-          </a:p>
-          <a:p>
+              <a:t>Nice online course</a:t>
+            </a:r>
+          </a:p>
+          <a:p>
+            <a:pPr marL="0" indent="0">
+              <a:buNone/>
+            </a:pPr>
+            <a:endParaRPr lang="en-CH"/>
+          </a:p>
+          <a:p>
+            <a:pPr marL="0" indent="0">
+              <a:buNone/>
+            </a:pPr>
+            <a:r>
+              <a:rPr lang="en-GB">
+                <a:hlinkClick r:id="rId2"/>
+              </a:rPr>
+              <a:t>https://inria.github.io/scikit-learn-mooc/index.html</a:t>
+            </a:r>
             <a:r>
               <a:rPr lang="en-GB"/>
-              <a:t>S</a:t>
-            </a:r>
-            <a:r>
-              <a:rPr lang="en-CH"/>
-              <a:t>cikit-learn can be integrated and work well with other libraries (as TensorFlow)</a:t>
-            </a:r>
-          </a:p>
-          <a:p>
-            <a:r>
-              <a:rPr lang="en-CH"/>
-              <a:t>Scikit-learn has GREAT documentation that can be used in scientific publications </a:t>
-            </a:r>
-            <a:r>
-              <a:rPr lang="en-CH">
-                <a:sym typeface="Wingdings" pitchFamily="2" charset="2"/>
-              </a:rPr>
-              <a:t> Example: </a:t>
-            </a:r>
-            <a:r>
-              <a:rPr lang="en-GB">
-                <a:sym typeface="Wingdings" pitchFamily="2" charset="2"/>
-                <a:hlinkClick r:id="rId2"/>
-              </a:rPr>
-              <a:t>https://scikit-learn.org/stable/modules/linear_model.html#logistic-regression</a:t>
-            </a:r>
-            <a:r>
-              <a:rPr lang="en-GB">
-                <a:sym typeface="Wingdings" pitchFamily="2" charset="2"/>
-              </a:rPr>
               <a:t> </a:t>
             </a:r>
             <a:endParaRPr lang="en-CH"/>
@@ -22570,7 +22501,7 @@
     </p:spTree>
     <p:extLst>
       <p:ext uri="{BB962C8B-B14F-4D97-AF65-F5344CB8AC3E}">
-        <p14:creationId xmlns:p14="http://schemas.microsoft.com/office/powerpoint/2010/main" val="2049890017"/>
+        <p14:creationId xmlns:p14="http://schemas.microsoft.com/office/powerpoint/2010/main" val="1868986357"/>
       </p:ext>
     </p:extLst>
   </p:cSld>
@@ -22602,7 +22533,7 @@
           <p:cNvPr id="2" name="Title 1">
             <a:extLst>
               <a:ext uri="{FF2B5EF4-FFF2-40B4-BE49-F238E27FC236}">
-                <a16:creationId xmlns:a16="http://schemas.microsoft.com/office/drawing/2014/main" id="{3D5DD1EC-AAA1-5DAA-B455-CA266EBB46C3}"/>
+                <a16:creationId xmlns:a16="http://schemas.microsoft.com/office/drawing/2014/main" id="{D9CF36FC-C33C-0CB1-3484-D5E35894DE9F}"/>
               </a:ext>
             </a:extLst>
           </p:cNvPr>
@@ -22619,20 +22550,85 @@
           <a:lstStyle/>
           <a:p>
             <a:r>
+              <a:rPr lang="en-CH"/>
+              <a:t>Advantages of scikit-learn</a:t>
+            </a:r>
+          </a:p>
+        </p:txBody>
+      </p:sp>
+      <p:sp>
+        <p:nvSpPr>
+          <p:cNvPr id="3" name="Content Placeholder 2">
+            <a:extLst>
+              <a:ext uri="{FF2B5EF4-FFF2-40B4-BE49-F238E27FC236}">
+                <a16:creationId xmlns:a16="http://schemas.microsoft.com/office/drawing/2014/main" id="{A05611B5-42FC-B7FB-76DC-23852C0C1669}"/>
+              </a:ext>
+            </a:extLst>
+          </p:cNvPr>
+          <p:cNvSpPr>
+            <a:spLocks noGrp="1"/>
+          </p:cNvSpPr>
+          <p:nvPr>
+            <p:ph idx="1"/>
+          </p:nvPr>
+        </p:nvSpPr>
+        <p:spPr>
+          <a:xfrm>
+            <a:off x="628650" y="1643169"/>
+            <a:ext cx="7886700" cy="2989553"/>
+          </a:xfrm>
+        </p:spPr>
+        <p:txBody>
+          <a:bodyPr/>
+          <a:lstStyle/>
+          <a:p>
+            <a:r>
+              <a:rPr lang="en-CH"/>
+              <a:t>Scikit-learn covers all parts of a machine learning pipeline (except for neural networks)</a:t>
+            </a:r>
+          </a:p>
+          <a:p>
+            <a:r>
               <a:rPr lang="en-GB"/>
               <a:t>S</a:t>
             </a:r>
             <a:r>
               <a:rPr lang="en-CH"/>
-              <a:t>cikit-learn hands-on</a:t>
-            </a:r>
+              <a:t>cikit-learn can be integrated and work well with other libraries (as TensorFlow)</a:t>
+            </a:r>
+          </a:p>
+          <a:p>
+            <a:r>
+              <a:rPr lang="en-CH"/>
+              <a:t>Scikit-learn has GREAT documentation that can be used in scientific publications </a:t>
+            </a:r>
+            <a:r>
+              <a:rPr lang="en-CH">
+                <a:sym typeface="Wingdings" pitchFamily="2" charset="2"/>
+              </a:rPr>
+              <a:t> Example: </a:t>
+            </a:r>
+            <a:r>
+              <a:rPr lang="en-GB">
+                <a:sym typeface="Wingdings" pitchFamily="2" charset="2"/>
+                <a:hlinkClick r:id="rId2"/>
+              </a:rPr>
+              <a:t>https://scikit-learn.org/stable/modules/linear_model.html#logistic-regression</a:t>
+            </a:r>
+            <a:r>
+              <a:rPr lang="en-GB">
+                <a:sym typeface="Wingdings" pitchFamily="2" charset="2"/>
+              </a:rPr>
+              <a:t> </a:t>
+            </a:r>
+            <a:endParaRPr lang="en-CH"/>
           </a:p>
         </p:txBody>
       </p:sp>
     </p:spTree>
     <p:extLst>
       <p:ext uri="{BB962C8B-B14F-4D97-AF65-F5344CB8AC3E}">
-        <p14:creationId xmlns:p14="http://schemas.microsoft.com/office/powerpoint/2010/main" val="2093818250"/>
+        <p14:creationId xmlns:p14="http://schemas.microsoft.com/office/powerpoint/2010/main" val="2049890017"/>
       </p:ext>
     </p:extLst>
   </p:cSld>
@@ -22664,7 +22660,7 @@
           <p:cNvPr id="2" name="Title 1">
             <a:extLst>
               <a:ext uri="{FF2B5EF4-FFF2-40B4-BE49-F238E27FC236}">
-                <a16:creationId xmlns:a16="http://schemas.microsoft.com/office/drawing/2014/main" id="{DB593303-A13B-6651-B22A-A2CE7BE853DD}"/>
+                <a16:creationId xmlns:a16="http://schemas.microsoft.com/office/drawing/2014/main" id="{3D5DD1EC-AAA1-5DAA-B455-CA266EBB46C3}"/>
               </a:ext>
             </a:extLst>
           </p:cNvPr>
@@ -22681,58 +22677,12 @@
           <a:lstStyle/>
           <a:p>
             <a:r>
+              <a:rPr lang="en-GB"/>
+              <a:t>S</a:t>
+            </a:r>
+            <a:r>
               <a:rPr lang="en-CH"/>
-              <a:t>Some best practices</a:t>
-            </a:r>
-          </a:p>
-        </p:txBody>
-      </p:sp>
-      <p:sp>
-        <p:nvSpPr>
-          <p:cNvPr id="3" name="Content Placeholder 2">
-            <a:extLst>
-              <a:ext uri="{FF2B5EF4-FFF2-40B4-BE49-F238E27FC236}">
-                <a16:creationId xmlns:a16="http://schemas.microsoft.com/office/drawing/2014/main" id="{8438C190-DF45-8017-0829-34CA2F5A8D83}"/>
-              </a:ext>
-            </a:extLst>
-          </p:cNvPr>
-          <p:cNvSpPr>
-            <a:spLocks noGrp="1"/>
-          </p:cNvSpPr>
-          <p:nvPr>
-            <p:ph idx="1"/>
-          </p:nvPr>
-        </p:nvSpPr>
-        <p:spPr/>
-        <p:txBody>
-          <a:bodyPr/>
-          <a:lstStyle/>
-          <a:p>
-            <a:r>
-              <a:rPr lang="en-CH"/>
-              <a:t>Write functions only if you really need to re-use them</a:t>
-            </a:r>
-          </a:p>
-          <a:p>
-            <a:r>
-              <a:rPr lang="en-CH"/>
-              <a:t>Write a piece of code for </a:t>
-            </a:r>
-            <a:r>
-              <a:rPr lang="en-CH" b="1" u="sng"/>
-              <a:t>each</a:t>
-            </a:r>
-            <a:r>
-              <a:rPr lang="en-CH"/>
-              <a:t> experiment you perform. Do not modify existing code and note the results! Each experiments must be reproducible and documented (what happens after 6 months? Will you remember all details? </a:t>
-            </a:r>
-            <a:r>
-              <a:rPr lang="en-GB"/>
-              <a:t>A</a:t>
-            </a:r>
-            <a:r>
-              <a:rPr lang="en-CH"/>
-              <a:t>ll parameters?</a:t>
+              <a:t>cikit-learn hands-on</a:t>
             </a:r>
           </a:p>
         </p:txBody>
@@ -22740,7 +22690,7 @@
     </p:spTree>
     <p:extLst>
       <p:ext uri="{BB962C8B-B14F-4D97-AF65-F5344CB8AC3E}">
-        <p14:creationId xmlns:p14="http://schemas.microsoft.com/office/powerpoint/2010/main" val="3435977449"/>
+        <p14:creationId xmlns:p14="http://schemas.microsoft.com/office/powerpoint/2010/main" val="2093818250"/>
       </p:ext>
     </p:extLst>
   </p:cSld>
@@ -22772,7 +22722,7 @@
           <p:cNvPr id="2" name="Title 1">
             <a:extLst>
               <a:ext uri="{FF2B5EF4-FFF2-40B4-BE49-F238E27FC236}">
-                <a16:creationId xmlns:a16="http://schemas.microsoft.com/office/drawing/2014/main" id="{082C0C09-969B-2F64-C262-889B52837A97}"/>
+                <a16:creationId xmlns:a16="http://schemas.microsoft.com/office/drawing/2014/main" id="{DB593303-A13B-6651-B22A-A2CE7BE853DD}"/>
               </a:ext>
             </a:extLst>
           </p:cNvPr>
@@ -22790,7 +22740,7 @@
           <a:p>
             <a:r>
               <a:rPr lang="en-CH"/>
-              <a:t>Related topics – remarks I</a:t>
+              <a:t>Some best practices</a:t>
             </a:r>
           </a:p>
         </p:txBody>
@@ -22800,7 +22750,7 @@
           <p:cNvPr id="3" name="Content Placeholder 2">
             <a:extLst>
               <a:ext uri="{FF2B5EF4-FFF2-40B4-BE49-F238E27FC236}">
-                <a16:creationId xmlns:a16="http://schemas.microsoft.com/office/drawing/2014/main" id="{5C2826F4-7C18-2376-334F-AA46F703B594}"/>
+                <a16:creationId xmlns:a16="http://schemas.microsoft.com/office/drawing/2014/main" id="{8438C190-DF45-8017-0829-34CA2F5A8D83}"/>
               </a:ext>
             </a:extLst>
           </p:cNvPr>
@@ -22817,39 +22767,38 @@
           <a:lstStyle/>
           <a:p>
             <a:r>
+              <a:rPr lang="en-CH"/>
+              <a:t>Write functions only if you really need to re-use them</a:t>
+            </a:r>
+          </a:p>
+          <a:p>
+            <a:r>
+              <a:rPr lang="en-CH"/>
+              <a:t>Write a piece of code for </a:t>
+            </a:r>
+            <a:r>
+              <a:rPr lang="en-CH" b="1" u="sng"/>
+              <a:t>each</a:t>
+            </a:r>
+            <a:r>
+              <a:rPr lang="en-CH"/>
+              <a:t> experiment you perform. Do not modify existing code and note the results! Each experiments must be reproducible and documented (what happens after 6 months? Will you remember all details? </a:t>
+            </a:r>
+            <a:r>
               <a:rPr lang="en-GB"/>
-              <a:t>It is important to understand algorithms. Operations, especially in deep learning, are repeated millions of times </a:t>
-            </a:r>
-            <a:r>
-              <a:rPr lang="en-GB">
-                <a:sym typeface="Wingdings" pitchFamily="2" charset="2"/>
-              </a:rPr>
-              <a:t> thus saving time in each iteration is very important.</a:t>
-            </a:r>
-          </a:p>
-          <a:p>
-            <a:r>
-              <a:rPr lang="en-GB">
-                <a:sym typeface="Wingdings" pitchFamily="2" charset="2"/>
-              </a:rPr>
-              <a:t>Bad programming will have a huge impact on your code in terms of performance and stability. </a:t>
-            </a:r>
-          </a:p>
-          <a:p>
-            <a:r>
-              <a:rPr lang="en-GB">
-                <a:sym typeface="Wingdings" pitchFamily="2" charset="2"/>
-              </a:rPr>
-              <a:t>Over-engineering is always a bad idea. Your code must be as simple as possible and as complex as necessary  it is easy to loos control of what your code does. </a:t>
-            </a:r>
-            <a:endParaRPr lang="en-CH"/>
+              <a:t>A</a:t>
+            </a:r>
+            <a:r>
+              <a:rPr lang="en-CH"/>
+              <a:t>ll parameters?</a:t>
+            </a:r>
           </a:p>
         </p:txBody>
       </p:sp>
     </p:spTree>
     <p:extLst>
       <p:ext uri="{BB962C8B-B14F-4D97-AF65-F5344CB8AC3E}">
-        <p14:creationId xmlns:p14="http://schemas.microsoft.com/office/powerpoint/2010/main" val="3436984283"/>
+        <p14:creationId xmlns:p14="http://schemas.microsoft.com/office/powerpoint/2010/main" val="3435977449"/>
       </p:ext>
     </p:extLst>
   </p:cSld>
@@ -22881,7 +22830,7 @@
           <p:cNvPr id="2" name="Title 1">
             <a:extLst>
               <a:ext uri="{FF2B5EF4-FFF2-40B4-BE49-F238E27FC236}">
-                <a16:creationId xmlns:a16="http://schemas.microsoft.com/office/drawing/2014/main" id="{8C6CE813-C017-5CDE-1919-D9818FF0F759}"/>
+                <a16:creationId xmlns:a16="http://schemas.microsoft.com/office/drawing/2014/main" id="{082C0C09-969B-2F64-C262-889B52837A97}"/>
               </a:ext>
             </a:extLst>
           </p:cNvPr>
@@ -22897,7 +22846,10 @@
           <a:bodyPr/>
           <a:lstStyle/>
           <a:p>
-            <a:endParaRPr lang="en-CH"/>
+            <a:r>
+              <a:rPr lang="en-CH"/>
+              <a:t>Related topics – remarks I</a:t>
+            </a:r>
           </a:p>
         </p:txBody>
       </p:sp>
@@ -22906,7 +22858,7 @@
           <p:cNvPr id="3" name="Content Placeholder 2">
             <a:extLst>
               <a:ext uri="{FF2B5EF4-FFF2-40B4-BE49-F238E27FC236}">
-                <a16:creationId xmlns:a16="http://schemas.microsoft.com/office/drawing/2014/main" id="{F01315A3-5B3E-618E-2A8C-B6804002837E}"/>
+                <a16:creationId xmlns:a16="http://schemas.microsoft.com/office/drawing/2014/main" id="{5C2826F4-7C18-2376-334F-AA46F703B594}"/>
               </a:ext>
             </a:extLst>
           </p:cNvPr>
@@ -22923,23 +22875,31 @@
           <a:lstStyle/>
           <a:p>
             <a:r>
-              <a:rPr lang="en-US"/>
-              <a:t>Information about scikit-learn and examples (linear regression and maybe logistic regression)</a:t>
-            </a:r>
-          </a:p>
-          <a:p>
-            <a:r>
-              <a:rPr lang="en-US"/>
-              <a:t>Scikit-learn for things like model validation, stratified sampling, etc.</a:t>
-            </a:r>
-          </a:p>
-          <a:p>
-            <a:r>
-              <a:rPr lang="en-US"/>
-              <a:t>Importance of good documentation (examples with scikit-learn docs)</a:t>
-            </a:r>
-          </a:p>
-          <a:p>
+              <a:rPr lang="en-GB"/>
+              <a:t>It is important to understand algorithms. Operations, especially in deep learning, are repeated millions of times </a:t>
+            </a:r>
+            <a:r>
+              <a:rPr lang="en-GB">
+                <a:sym typeface="Wingdings" pitchFamily="2" charset="2"/>
+              </a:rPr>
+              <a:t> thus saving time in each iteration is very important.</a:t>
+            </a:r>
+          </a:p>
+          <a:p>
+            <a:r>
+              <a:rPr lang="en-GB">
+                <a:sym typeface="Wingdings" pitchFamily="2" charset="2"/>
+              </a:rPr>
+              <a:t>Bad programming will have a huge impact on your code in terms of performance and stability. </a:t>
+            </a:r>
+          </a:p>
+          <a:p>
+            <a:r>
+              <a:rPr lang="en-GB">
+                <a:sym typeface="Wingdings" pitchFamily="2" charset="2"/>
+              </a:rPr>
+              <a:t>Over-engineering is always a bad idea. Your code must be as simple as possible and as complex as necessary  it is easy to loos control of what your code does. </a:t>
+            </a:r>
             <a:endParaRPr lang="en-CH"/>
           </a:p>
         </p:txBody>
@@ -22947,7 +22907,7 @@
     </p:spTree>
     <p:extLst>
       <p:ext uri="{BB962C8B-B14F-4D97-AF65-F5344CB8AC3E}">
-        <p14:creationId xmlns:p14="http://schemas.microsoft.com/office/powerpoint/2010/main" val="2514658733"/>
+        <p14:creationId xmlns:p14="http://schemas.microsoft.com/office/powerpoint/2010/main" val="3436984283"/>
       </p:ext>
     </p:extLst>
   </p:cSld>

</xml_diff>

<commit_message>
Added a notebook for hold-out
</commit_message>
<xml_diff>
--- a/DETERMINED2022/Python and scikit-learn/DETERMINED2022-toelt-Introduction Python and Scikit-learn.pptx
+++ b/DETERMINED2022/Python and scikit-learn/DETERMINED2022-toelt-Introduction Python and Scikit-learn.pptx
@@ -5,7 +5,7 @@
     <p:sldMasterId id="2147483663" r:id="rId1"/>
   </p:sldMasterIdLst>
   <p:notesMasterIdLst>
-    <p:notesMasterId r:id="rId48"/>
+    <p:notesMasterId r:id="rId50"/>
   </p:notesMasterIdLst>
   <p:sldIdLst>
     <p:sldId id="256" r:id="rId2"/>
@@ -31,46 +31,48 @@
     <p:sldId id="288" r:id="rId22"/>
     <p:sldId id="289" r:id="rId23"/>
     <p:sldId id="290" r:id="rId24"/>
-    <p:sldId id="311" r:id="rId25"/>
-    <p:sldId id="303" r:id="rId26"/>
-    <p:sldId id="261" r:id="rId27"/>
-    <p:sldId id="292" r:id="rId28"/>
-    <p:sldId id="291" r:id="rId29"/>
-    <p:sldId id="293" r:id="rId30"/>
-    <p:sldId id="294" r:id="rId31"/>
-    <p:sldId id="296" r:id="rId32"/>
-    <p:sldId id="295" r:id="rId33"/>
-    <p:sldId id="297" r:id="rId34"/>
-    <p:sldId id="300" r:id="rId35"/>
-    <p:sldId id="301" r:id="rId36"/>
-    <p:sldId id="302" r:id="rId37"/>
-    <p:sldId id="312" r:id="rId38"/>
-    <p:sldId id="298" r:id="rId39"/>
-    <p:sldId id="299" r:id="rId40"/>
-    <p:sldId id="304" r:id="rId41"/>
-    <p:sldId id="305" r:id="rId42"/>
-    <p:sldId id="306" r:id="rId43"/>
-    <p:sldId id="307" r:id="rId44"/>
-    <p:sldId id="309" r:id="rId45"/>
-    <p:sldId id="263" r:id="rId46"/>
-    <p:sldId id="267" r:id="rId47"/>
+    <p:sldId id="314" r:id="rId25"/>
+    <p:sldId id="311" r:id="rId26"/>
+    <p:sldId id="303" r:id="rId27"/>
+    <p:sldId id="261" r:id="rId28"/>
+    <p:sldId id="292" r:id="rId29"/>
+    <p:sldId id="291" r:id="rId30"/>
+    <p:sldId id="293" r:id="rId31"/>
+    <p:sldId id="294" r:id="rId32"/>
+    <p:sldId id="296" r:id="rId33"/>
+    <p:sldId id="295" r:id="rId34"/>
+    <p:sldId id="297" r:id="rId35"/>
+    <p:sldId id="313" r:id="rId36"/>
+    <p:sldId id="300" r:id="rId37"/>
+    <p:sldId id="301" r:id="rId38"/>
+    <p:sldId id="302" r:id="rId39"/>
+    <p:sldId id="312" r:id="rId40"/>
+    <p:sldId id="298" r:id="rId41"/>
+    <p:sldId id="299" r:id="rId42"/>
+    <p:sldId id="304" r:id="rId43"/>
+    <p:sldId id="305" r:id="rId44"/>
+    <p:sldId id="306" r:id="rId45"/>
+    <p:sldId id="307" r:id="rId46"/>
+    <p:sldId id="309" r:id="rId47"/>
+    <p:sldId id="263" r:id="rId48"/>
+    <p:sldId id="267" r:id="rId49"/>
   </p:sldIdLst>
   <p:sldSz cx="9144000" cy="5143500" type="screen16x9"/>
   <p:notesSz cx="6858000" cy="9144000"/>
   <p:embeddedFontLst>
     <p:embeddedFont>
       <p:font typeface="Calibri" panose="020F0502020204030204" pitchFamily="34" charset="0"/>
-      <p:regular r:id="rId49"/>
-      <p:bold r:id="rId50"/>
-      <p:italic r:id="rId51"/>
-      <p:boldItalic r:id="rId52"/>
+      <p:regular r:id="rId51"/>
+      <p:bold r:id="rId52"/>
+      <p:italic r:id="rId53"/>
+      <p:boldItalic r:id="rId54"/>
     </p:embeddedFont>
     <p:embeddedFont>
       <p:font typeface="Consolas" panose="020B0609020204030204" pitchFamily="49" charset="0"/>
-      <p:regular r:id="rId53"/>
-      <p:bold r:id="rId54"/>
-      <p:italic r:id="rId55"/>
-      <p:boldItalic r:id="rId56"/>
+      <p:regular r:id="rId55"/>
+      <p:bold r:id="rId56"/>
+      <p:italic r:id="rId57"/>
+      <p:boldItalic r:id="rId58"/>
     </p:embeddedFont>
   </p:embeddedFontLst>
   <p:defaultTextStyle>
@@ -960,7 +962,7 @@
               <a:latin typeface="Arial" panose="020B0604020202020204" pitchFamily="34" charset="0"/>
               <a:cs typeface="Arial" panose="020B0604020202020204" pitchFamily="34" charset="0"/>
             </a:rPr>
-            <a:t>Mathematics</a:t>
+            <a:t>Linear Algebra, Calculus</a:t>
           </a:r>
         </a:p>
       </dgm:t>
@@ -1290,7 +1292,7 @@
               <a:latin typeface="Arial" panose="020B0604020202020204" pitchFamily="34" charset="0"/>
               <a:cs typeface="Arial" panose="020B0604020202020204" pitchFamily="34" charset="0"/>
             </a:rPr>
-            <a:t>Mathematics</a:t>
+            <a:t>Linear Algebra, Calculus</a:t>
           </a:r>
         </a:p>
       </dsp:txBody>
@@ -13390,6 +13392,12 @@
           <a:p>
             <a:r>
               <a:rPr lang="en-US" sz="1600"/>
+              <a:t>The studends understands the fundamental concepts of GitHub</a:t>
+            </a:r>
+          </a:p>
+          <a:p>
+            <a:r>
+              <a:rPr lang="en-US" sz="1600"/>
               <a:t>The students understand the main components of a machine learning pipeline</a:t>
             </a:r>
           </a:p>
@@ -16829,6 +16837,68 @@
           <p:cNvPr id="2" name="Title 1">
             <a:extLst>
               <a:ext uri="{FF2B5EF4-FFF2-40B4-BE49-F238E27FC236}">
+                <a16:creationId xmlns:a16="http://schemas.microsoft.com/office/drawing/2014/main" id="{BD6E9689-C9F2-AC66-E26A-745EBE2A2AA4}"/>
+              </a:ext>
+            </a:extLst>
+          </p:cNvPr>
+          <p:cNvSpPr>
+            <a:spLocks noGrp="1"/>
+          </p:cNvSpPr>
+          <p:nvPr>
+            <p:ph type="title"/>
+          </p:nvPr>
+        </p:nvSpPr>
+        <p:spPr/>
+        <p:txBody>
+          <a:bodyPr/>
+          <a:lstStyle/>
+          <a:p>
+            <a:r>
+              <a:rPr lang="en-GB"/>
+              <a:t>P</a:t>
+            </a:r>
+            <a:r>
+              <a:rPr lang="en-CH"/>
+              <a:t>ython Libraries and machine learning pipelines</a:t>
+            </a:r>
+          </a:p>
+        </p:txBody>
+      </p:sp>
+    </p:spTree>
+    <p:extLst>
+      <p:ext uri="{BB962C8B-B14F-4D97-AF65-F5344CB8AC3E}">
+        <p14:creationId xmlns:p14="http://schemas.microsoft.com/office/powerpoint/2010/main" val="2250356595"/>
+      </p:ext>
+    </p:extLst>
+  </p:cSld>
+  <p:clrMapOvr>
+    <a:masterClrMapping/>
+  </p:clrMapOvr>
+</p:sld>
+</file>
+
+<file path=ppt/slides/slide25.xml><?xml version="1.0" encoding="utf-8"?>
+<p:sld xmlns:a="http://schemas.openxmlformats.org/drawingml/2006/main" xmlns:r="http://schemas.openxmlformats.org/officeDocument/2006/relationships" xmlns:p="http://schemas.openxmlformats.org/presentationml/2006/main">
+  <p:cSld>
+    <p:spTree>
+      <p:nvGrpSpPr>
+        <p:cNvPr id="1" name=""/>
+        <p:cNvGrpSpPr/>
+        <p:nvPr/>
+      </p:nvGrpSpPr>
+      <p:grpSpPr>
+        <a:xfrm>
+          <a:off x="0" y="0"/>
+          <a:ext cx="0" cy="0"/>
+          <a:chOff x="0" y="0"/>
+          <a:chExt cx="0" cy="0"/>
+        </a:xfrm>
+      </p:grpSpPr>
+      <p:sp>
+        <p:nvSpPr>
+          <p:cNvPr id="2" name="Title 1">
+            <a:extLst>
+              <a:ext uri="{FF2B5EF4-FFF2-40B4-BE49-F238E27FC236}">
                 <a16:creationId xmlns:a16="http://schemas.microsoft.com/office/drawing/2014/main" id="{5E5D436F-0469-94DE-540A-A86A2A66FA0C}"/>
               </a:ext>
             </a:extLst>
@@ -18576,64 +18646,6 @@
 </p:sld>
 </file>
 
-<file path=ppt/slides/slide25.xml><?xml version="1.0" encoding="utf-8"?>
-<p:sld xmlns:a="http://schemas.openxmlformats.org/drawingml/2006/main" xmlns:r="http://schemas.openxmlformats.org/officeDocument/2006/relationships" xmlns:p="http://schemas.openxmlformats.org/presentationml/2006/main">
-  <p:cSld>
-    <p:spTree>
-      <p:nvGrpSpPr>
-        <p:cNvPr id="1" name=""/>
-        <p:cNvGrpSpPr/>
-        <p:nvPr/>
-      </p:nvGrpSpPr>
-      <p:grpSpPr>
-        <a:xfrm>
-          <a:off x="0" y="0"/>
-          <a:ext cx="0" cy="0"/>
-          <a:chOff x="0" y="0"/>
-          <a:chExt cx="0" cy="0"/>
-        </a:xfrm>
-      </p:grpSpPr>
-      <p:sp>
-        <p:nvSpPr>
-          <p:cNvPr id="2" name="Title 1">
-            <a:extLst>
-              <a:ext uri="{FF2B5EF4-FFF2-40B4-BE49-F238E27FC236}">
-                <a16:creationId xmlns:a16="http://schemas.microsoft.com/office/drawing/2014/main" id="{74902E13-1FDE-7DEF-92E0-AF823ADDF520}"/>
-              </a:ext>
-            </a:extLst>
-          </p:cNvPr>
-          <p:cNvSpPr>
-            <a:spLocks noGrp="1"/>
-          </p:cNvSpPr>
-          <p:nvPr>
-            <p:ph type="title"/>
-          </p:nvPr>
-        </p:nvSpPr>
-        <p:spPr/>
-        <p:txBody>
-          <a:bodyPr/>
-          <a:lstStyle/>
-          <a:p>
-            <a:r>
-              <a:rPr lang="en-CH"/>
-              <a:t>Python</a:t>
-            </a:r>
-          </a:p>
-        </p:txBody>
-      </p:sp>
-    </p:spTree>
-    <p:extLst>
-      <p:ext uri="{BB962C8B-B14F-4D97-AF65-F5344CB8AC3E}">
-        <p14:creationId xmlns:p14="http://schemas.microsoft.com/office/powerpoint/2010/main" val="1752467510"/>
-      </p:ext>
-    </p:extLst>
-  </p:cSld>
-  <p:clrMapOvr>
-    <a:masterClrMapping/>
-  </p:clrMapOvr>
-</p:sld>
-</file>
-
 <file path=ppt/slides/slide26.xml><?xml version="1.0" encoding="utf-8"?>
 <p:sld xmlns:a="http://schemas.openxmlformats.org/drawingml/2006/main" xmlns:r="http://schemas.openxmlformats.org/officeDocument/2006/relationships" xmlns:p="http://schemas.openxmlformats.org/presentationml/2006/main">
   <p:cSld>
@@ -18656,7 +18668,7 @@
           <p:cNvPr id="2" name="Title 1">
             <a:extLst>
               <a:ext uri="{FF2B5EF4-FFF2-40B4-BE49-F238E27FC236}">
-                <a16:creationId xmlns:a16="http://schemas.microsoft.com/office/drawing/2014/main" id="{D41471C5-F3C6-2ACF-EC82-873148651CB5}"/>
+                <a16:creationId xmlns:a16="http://schemas.microsoft.com/office/drawing/2014/main" id="{74902E13-1FDE-7DEF-92E0-AF823ADDF520}"/>
               </a:ext>
             </a:extLst>
           </p:cNvPr>
@@ -18674,109 +18686,7 @@
           <a:p>
             <a:r>
               <a:rPr lang="en-CH"/>
-              <a:t>Algorithms and Data Structures</a:t>
-            </a:r>
-          </a:p>
-        </p:txBody>
-      </p:sp>
-      <p:sp>
-        <p:nvSpPr>
-          <p:cNvPr id="3" name="Content Placeholder 2">
-            <a:extLst>
-              <a:ext uri="{FF2B5EF4-FFF2-40B4-BE49-F238E27FC236}">
-                <a16:creationId xmlns:a16="http://schemas.microsoft.com/office/drawing/2014/main" id="{E1810339-21F8-B70A-2721-83FB0E342271}"/>
-              </a:ext>
-            </a:extLst>
-          </p:cNvPr>
-          <p:cNvSpPr>
-            <a:spLocks noGrp="1"/>
-          </p:cNvSpPr>
-          <p:nvPr>
-            <p:ph idx="1"/>
-          </p:nvPr>
-        </p:nvSpPr>
-        <p:spPr/>
-        <p:txBody>
-          <a:bodyPr>
-            <a:normAutofit/>
-          </a:bodyPr>
-          <a:lstStyle/>
-          <a:p>
-            <a:pPr marL="0" indent="0">
-              <a:buNone/>
-            </a:pPr>
-            <a:r>
-              <a:rPr lang="en-US"/>
-              <a:t>Algorithm</a:t>
-            </a:r>
-          </a:p>
-          <a:p>
-            <a:r>
-              <a:rPr lang="en-US"/>
-              <a:t> A set of rules or steps used to solve a problem</a:t>
-            </a:r>
-          </a:p>
-          <a:p>
-            <a:endParaRPr lang="en-US"/>
-          </a:p>
-          <a:p>
-            <a:pPr marL="0" indent="0">
-              <a:buNone/>
-            </a:pPr>
-            <a:r>
-              <a:rPr lang="en-US"/>
-              <a:t>Data Structure</a:t>
-            </a:r>
-          </a:p>
-          <a:p>
-            <a:r>
-              <a:rPr lang="en-US"/>
-              <a:t> A particular way of organizing data in a computer</a:t>
-            </a:r>
-          </a:p>
-          <a:p>
-            <a:pPr marL="0" indent="0">
-              <a:buNone/>
-            </a:pPr>
-            <a:endParaRPr lang="en-CH"/>
-          </a:p>
-        </p:txBody>
-      </p:sp>
-      <p:sp>
-        <p:nvSpPr>
-          <p:cNvPr id="4" name="TextBox 3">
-            <a:extLst>
-              <a:ext uri="{FF2B5EF4-FFF2-40B4-BE49-F238E27FC236}">
-                <a16:creationId xmlns:a16="http://schemas.microsoft.com/office/drawing/2014/main" id="{650CCA5C-2DFC-F456-E0D6-855974E0A083}"/>
-              </a:ext>
-            </a:extLst>
-          </p:cNvPr>
-          <p:cNvSpPr txBox="1"/>
-          <p:nvPr/>
-        </p:nvSpPr>
-        <p:spPr>
-          <a:xfrm>
-            <a:off x="7162800" y="4866501"/>
-            <a:ext cx="2108200" cy="276999"/>
-          </a:xfrm>
-          <a:prstGeom prst="rect">
-            <a:avLst/>
-          </a:prstGeom>
-          <a:noFill/>
-        </p:spPr>
-        <p:txBody>
-          <a:bodyPr wrap="square" rtlCol="0">
-            <a:spAutoFit/>
-          </a:bodyPr>
-          <a:lstStyle/>
-          <a:p>
-            <a:r>
-              <a:rPr lang="en-CH" sz="1200"/>
-              <a:t>Adapted from </a:t>
-            </a:r>
-            <a:r>
-              <a:rPr lang="en-GB" sz="1200"/>
-              <a:t>www.py4e.com</a:t>
+              <a:t>Python</a:t>
             </a:r>
           </a:p>
         </p:txBody>
@@ -18784,7 +18694,7 @@
     </p:spTree>
     <p:extLst>
       <p:ext uri="{BB962C8B-B14F-4D97-AF65-F5344CB8AC3E}">
-        <p14:creationId xmlns:p14="http://schemas.microsoft.com/office/powerpoint/2010/main" val="2493136331"/>
+        <p14:creationId xmlns:p14="http://schemas.microsoft.com/office/powerpoint/2010/main" val="1752467510"/>
       </p:ext>
     </p:extLst>
   </p:cSld>
@@ -18816,7 +18726,7 @@
           <p:cNvPr id="2" name="Title 1">
             <a:extLst>
               <a:ext uri="{FF2B5EF4-FFF2-40B4-BE49-F238E27FC236}">
-                <a16:creationId xmlns:a16="http://schemas.microsoft.com/office/drawing/2014/main" id="{C6FB2F90-A265-E540-A062-7CE5B3DC11E8}"/>
+                <a16:creationId xmlns:a16="http://schemas.microsoft.com/office/drawing/2014/main" id="{D41471C5-F3C6-2ACF-EC82-873148651CB5}"/>
               </a:ext>
             </a:extLst>
           </p:cNvPr>
@@ -18833,10 +18743,9 @@
           <a:lstStyle/>
           <a:p>
             <a:r>
-              <a:rPr lang="en-GB"/>
-              <a:t>A List is a Kind of Collection</a:t>
-            </a:r>
-            <a:endParaRPr lang="en-CH"/>
+              <a:rPr lang="en-CH"/>
+              <a:t>Algorithms and Data Structures</a:t>
+            </a:r>
           </a:p>
         </p:txBody>
       </p:sp>
@@ -18845,7 +18754,7 @@
           <p:cNvPr id="3" name="Content Placeholder 2">
             <a:extLst>
               <a:ext uri="{FF2B5EF4-FFF2-40B4-BE49-F238E27FC236}">
-                <a16:creationId xmlns:a16="http://schemas.microsoft.com/office/drawing/2014/main" id="{F1A348A2-62B9-1614-366E-40845E4054E0}"/>
+                <a16:creationId xmlns:a16="http://schemas.microsoft.com/office/drawing/2014/main" id="{E1810339-21F8-B70A-2721-83FB0E342271}"/>
               </a:ext>
             </a:extLst>
           </p:cNvPr>
@@ -18858,18 +18767,41 @@
         </p:nvSpPr>
         <p:spPr/>
         <p:txBody>
-          <a:bodyPr/>
+          <a:bodyPr>
+            <a:normAutofit/>
+          </a:bodyPr>
           <a:lstStyle/>
           <a:p>
-            <a:r>
-              <a:rPr lang="en-GB"/>
-              <a:t>A collection allows us to put many values in a single “variable”</a:t>
-            </a:r>
-          </a:p>
-          <a:p>
-            <a:r>
-              <a:rPr lang="en-GB"/>
-              <a:t>A collection is nice because we can carry all many values around in one convenient package.</a:t>
+            <a:pPr marL="0" indent="0">
+              <a:buNone/>
+            </a:pPr>
+            <a:r>
+              <a:rPr lang="en-US"/>
+              <a:t>Algorithm</a:t>
+            </a:r>
+          </a:p>
+          <a:p>
+            <a:r>
+              <a:rPr lang="en-US"/>
+              <a:t> A set of rules or steps used to solve a problem</a:t>
+            </a:r>
+          </a:p>
+          <a:p>
+            <a:endParaRPr lang="en-US"/>
+          </a:p>
+          <a:p>
+            <a:pPr marL="0" indent="0">
+              <a:buNone/>
+            </a:pPr>
+            <a:r>
+              <a:rPr lang="en-US"/>
+              <a:t>Data Structure</a:t>
+            </a:r>
+          </a:p>
+          <a:p>
+            <a:r>
+              <a:rPr lang="en-US"/>
+              <a:t> A particular way of organizing data in a computer</a:t>
             </a:r>
           </a:p>
           <a:p>
@@ -18878,53 +18810,14 @@
             </a:pPr>
             <a:endParaRPr lang="en-CH"/>
           </a:p>
-          <a:p>
-            <a:pPr marL="0" indent="0">
-              <a:buNone/>
-            </a:pPr>
-            <a:r>
-              <a:rPr lang="en-GB">
-                <a:latin typeface="Consolas" panose="020B0609020204030204" pitchFamily="49" charset="0"/>
-                <a:cs typeface="Consolas" panose="020B0609020204030204" pitchFamily="49" charset="0"/>
-              </a:rPr>
-              <a:t>friends = [ 'Joseph', 'Glenn', 'Sally' ]</a:t>
-            </a:r>
-          </a:p>
-          <a:p>
-            <a:pPr marL="0" indent="0">
-              <a:buNone/>
-            </a:pPr>
-            <a:endParaRPr lang="en-GB">
-              <a:latin typeface="Consolas" panose="020B0609020204030204" pitchFamily="49" charset="0"/>
-              <a:cs typeface="Consolas" panose="020B0609020204030204" pitchFamily="49" charset="0"/>
-            </a:endParaRPr>
-          </a:p>
-          <a:p>
-            <a:pPr marL="0" indent="0">
-              <a:buNone/>
-            </a:pPr>
-            <a:r>
-              <a:rPr lang="en-GB">
-                <a:latin typeface="Consolas" panose="020B0609020204030204" pitchFamily="49" charset="0"/>
-                <a:cs typeface="Consolas" panose="020B0609020204030204" pitchFamily="49" charset="0"/>
-              </a:rPr>
-              <a:t>carryon = [ 'socks', 'shirt', 'perfume' ]</a:t>
-            </a:r>
-          </a:p>
-          <a:p>
-            <a:pPr marL="0" indent="0">
-              <a:buNone/>
-            </a:pPr>
-            <a:endParaRPr lang="en-CH"/>
-          </a:p>
         </p:txBody>
       </p:sp>
       <p:sp>
         <p:nvSpPr>
-          <p:cNvPr id="6" name="TextBox 5">
-            <a:extLst>
-              <a:ext uri="{FF2B5EF4-FFF2-40B4-BE49-F238E27FC236}">
-                <a16:creationId xmlns:a16="http://schemas.microsoft.com/office/drawing/2014/main" id="{55D360C3-1C63-2C31-8827-EDA98DD5BA85}"/>
+          <p:cNvPr id="4" name="TextBox 3">
+            <a:extLst>
+              <a:ext uri="{FF2B5EF4-FFF2-40B4-BE49-F238E27FC236}">
+                <a16:creationId xmlns:a16="http://schemas.microsoft.com/office/drawing/2014/main" id="{650CCA5C-2DFC-F456-E0D6-855974E0A083}"/>
               </a:ext>
             </a:extLst>
           </p:cNvPr>
@@ -18961,7 +18854,7 @@
     </p:spTree>
     <p:extLst>
       <p:ext uri="{BB962C8B-B14F-4D97-AF65-F5344CB8AC3E}">
-        <p14:creationId xmlns:p14="http://schemas.microsoft.com/office/powerpoint/2010/main" val="2439279006"/>
+        <p14:creationId xmlns:p14="http://schemas.microsoft.com/office/powerpoint/2010/main" val="2493136331"/>
       </p:ext>
     </p:extLst>
   </p:cSld>
@@ -18993,7 +18886,7 @@
           <p:cNvPr id="2" name="Title 1">
             <a:extLst>
               <a:ext uri="{FF2B5EF4-FFF2-40B4-BE49-F238E27FC236}">
-                <a16:creationId xmlns:a16="http://schemas.microsoft.com/office/drawing/2014/main" id="{7CC1E773-94C8-0790-CBF4-68D75C776839}"/>
+                <a16:creationId xmlns:a16="http://schemas.microsoft.com/office/drawing/2014/main" id="{C6FB2F90-A265-E540-A062-7CE5B3DC11E8}"/>
               </a:ext>
             </a:extLst>
           </p:cNvPr>
@@ -19011,7 +18904,7 @@
           <a:p>
             <a:r>
               <a:rPr lang="en-GB"/>
-              <a:t>What is not a “Collection”?</a:t>
+              <a:t>A List is a Kind of Collection</a:t>
             </a:r>
             <a:endParaRPr lang="en-CH"/>
           </a:p>
@@ -19022,7 +18915,7 @@
           <p:cNvPr id="3" name="Content Placeholder 2">
             <a:extLst>
               <a:ext uri="{FF2B5EF4-FFF2-40B4-BE49-F238E27FC236}">
-                <a16:creationId xmlns:a16="http://schemas.microsoft.com/office/drawing/2014/main" id="{98DB3C6C-231D-07DA-0707-9DCC4DD40F69}"/>
+                <a16:creationId xmlns:a16="http://schemas.microsoft.com/office/drawing/2014/main" id="{F1A348A2-62B9-1614-366E-40845E4054E0}"/>
               </a:ext>
             </a:extLst>
           </p:cNvPr>
@@ -19038,91 +18931,70 @@
           <a:bodyPr/>
           <a:lstStyle/>
           <a:p>
+            <a:r>
+              <a:rPr lang="en-GB"/>
+              <a:t>A collection allows us to put many values in a single “variable”</a:t>
+            </a:r>
+          </a:p>
+          <a:p>
+            <a:r>
+              <a:rPr lang="en-GB"/>
+              <a:t>A collection is nice because we can carry all many values around in one convenient package.</a:t>
+            </a:r>
+          </a:p>
+          <a:p>
             <a:pPr marL="0" indent="0">
               <a:buNone/>
             </a:pPr>
-            <a:r>
-              <a:rPr lang="en-GB"/>
-              <a:t>Most of our variables have one value in them - when we put a new value in the variable, the old value is overwritten</a:t>
-            </a:r>
+            <a:endParaRPr lang="en-CH"/>
           </a:p>
           <a:p>
             <a:pPr marL="0" indent="0">
               <a:buNone/>
             </a:pPr>
-            <a:endParaRPr lang="en-GB"/>
+            <a:r>
+              <a:rPr lang="en-GB">
+                <a:latin typeface="Consolas" panose="020B0609020204030204" pitchFamily="49" charset="0"/>
+                <a:cs typeface="Consolas" panose="020B0609020204030204" pitchFamily="49" charset="0"/>
+              </a:rPr>
+              <a:t>friends = [ 'Joseph', 'Glenn', 'Sally' ]</a:t>
+            </a:r>
           </a:p>
           <a:p>
             <a:pPr marL="0" indent="0">
               <a:buNone/>
             </a:pPr>
+            <a:endParaRPr lang="en-GB">
+              <a:latin typeface="Consolas" panose="020B0609020204030204" pitchFamily="49" charset="0"/>
+              <a:cs typeface="Consolas" panose="020B0609020204030204" pitchFamily="49" charset="0"/>
+            </a:endParaRPr>
+          </a:p>
+          <a:p>
+            <a:pPr marL="0" indent="0">
+              <a:buNone/>
+            </a:pPr>
             <a:r>
               <a:rPr lang="en-GB">
                 <a:latin typeface="Consolas" panose="020B0609020204030204" pitchFamily="49" charset="0"/>
                 <a:cs typeface="Consolas" panose="020B0609020204030204" pitchFamily="49" charset="0"/>
               </a:rPr>
-              <a:t>$ python</a:t>
+              <a:t>carryon = [ 'socks', 'shirt', 'perfume' ]</a:t>
             </a:r>
           </a:p>
           <a:p>
             <a:pPr marL="0" indent="0">
               <a:buNone/>
             </a:pPr>
-            <a:r>
-              <a:rPr lang="en-GB">
-                <a:latin typeface="Consolas" panose="020B0609020204030204" pitchFamily="49" charset="0"/>
-                <a:cs typeface="Consolas" panose="020B0609020204030204" pitchFamily="49" charset="0"/>
-              </a:rPr>
-              <a:t>&gt;&gt;&gt; x = 2</a:t>
-            </a:r>
-          </a:p>
-          <a:p>
-            <a:pPr marL="0" indent="0">
-              <a:buNone/>
-            </a:pPr>
-            <a:r>
-              <a:rPr lang="en-GB">
-                <a:latin typeface="Consolas" panose="020B0609020204030204" pitchFamily="49" charset="0"/>
-                <a:cs typeface="Consolas" panose="020B0609020204030204" pitchFamily="49" charset="0"/>
-              </a:rPr>
-              <a:t>&gt;&gt;&gt; x = 4</a:t>
-            </a:r>
-          </a:p>
-          <a:p>
-            <a:pPr marL="0" indent="0">
-              <a:buNone/>
-            </a:pPr>
-            <a:r>
-              <a:rPr lang="en-GB">
-                <a:latin typeface="Consolas" panose="020B0609020204030204" pitchFamily="49" charset="0"/>
-                <a:cs typeface="Consolas" panose="020B0609020204030204" pitchFamily="49" charset="0"/>
-              </a:rPr>
-              <a:t>&gt;&gt;&gt; print(x)</a:t>
-            </a:r>
-          </a:p>
-          <a:p>
-            <a:pPr marL="0" indent="0">
-              <a:buNone/>
-            </a:pPr>
-            <a:r>
-              <a:rPr lang="en-GB">
-                <a:latin typeface="Consolas" panose="020B0609020204030204" pitchFamily="49" charset="0"/>
-                <a:cs typeface="Consolas" panose="020B0609020204030204" pitchFamily="49" charset="0"/>
-              </a:rPr>
-              <a:t>4</a:t>
-            </a:r>
-          </a:p>
-          <a:p>
             <a:endParaRPr lang="en-CH"/>
           </a:p>
         </p:txBody>
       </p:sp>
       <p:sp>
         <p:nvSpPr>
-          <p:cNvPr id="4" name="TextBox 3">
-            <a:extLst>
-              <a:ext uri="{FF2B5EF4-FFF2-40B4-BE49-F238E27FC236}">
-                <a16:creationId xmlns:a16="http://schemas.microsoft.com/office/drawing/2014/main" id="{EBE59914-ECE3-624C-B86D-DED6243D0821}"/>
+          <p:cNvPr id="6" name="TextBox 5">
+            <a:extLst>
+              <a:ext uri="{FF2B5EF4-FFF2-40B4-BE49-F238E27FC236}">
+                <a16:creationId xmlns:a16="http://schemas.microsoft.com/office/drawing/2014/main" id="{55D360C3-1C63-2C31-8827-EDA98DD5BA85}"/>
               </a:ext>
             </a:extLst>
           </p:cNvPr>
@@ -19159,7 +19031,7 @@
     </p:spTree>
     <p:extLst>
       <p:ext uri="{BB962C8B-B14F-4D97-AF65-F5344CB8AC3E}">
-        <p14:creationId xmlns:p14="http://schemas.microsoft.com/office/powerpoint/2010/main" val="1152027779"/>
+        <p14:creationId xmlns:p14="http://schemas.microsoft.com/office/powerpoint/2010/main" val="2439279006"/>
       </p:ext>
     </p:extLst>
   </p:cSld>
@@ -19191,7 +19063,7 @@
           <p:cNvPr id="2" name="Title 1">
             <a:extLst>
               <a:ext uri="{FF2B5EF4-FFF2-40B4-BE49-F238E27FC236}">
-                <a16:creationId xmlns:a16="http://schemas.microsoft.com/office/drawing/2014/main" id="{F4F08439-6E4C-214B-3DF9-B34C20B3C12C}"/>
+                <a16:creationId xmlns:a16="http://schemas.microsoft.com/office/drawing/2014/main" id="{7CC1E773-94C8-0790-CBF4-68D75C776839}"/>
               </a:ext>
             </a:extLst>
           </p:cNvPr>
@@ -19209,7 +19081,7 @@
           <a:p>
             <a:r>
               <a:rPr lang="en-GB"/>
-              <a:t>List Constants</a:t>
+              <a:t>What is not a “Collection”?</a:t>
             </a:r>
             <a:endParaRPr lang="en-CH"/>
           </a:p>
@@ -19220,7 +19092,7 @@
           <p:cNvPr id="3" name="Content Placeholder 2">
             <a:extLst>
               <a:ext uri="{FF2B5EF4-FFF2-40B4-BE49-F238E27FC236}">
-                <a16:creationId xmlns:a16="http://schemas.microsoft.com/office/drawing/2014/main" id="{C3CE3AD9-AACC-34B7-740A-EC354B25A395}"/>
+                <a16:creationId xmlns:a16="http://schemas.microsoft.com/office/drawing/2014/main" id="{98DB3C6C-231D-07DA-0707-9DCC4DD40F69}"/>
               </a:ext>
             </a:extLst>
           </p:cNvPr>
@@ -19231,441 +19103,96 @@
             <p:ph idx="1"/>
           </p:nvPr>
         </p:nvSpPr>
-        <p:spPr>
-          <a:xfrm>
-            <a:off x="628650" y="1369219"/>
-            <a:ext cx="4229100" cy="3263504"/>
-          </a:xfrm>
-        </p:spPr>
+        <p:spPr/>
         <p:txBody>
           <a:bodyPr/>
           <a:lstStyle/>
           <a:p>
-            <a:r>
-              <a:rPr lang="en-GB"/>
-              <a:t>List constants are surrounded by square brackets and the elements in the list are separated by commas</a:t>
-            </a:r>
-          </a:p>
-          <a:p>
-            <a:r>
-              <a:rPr lang="en-GB"/>
-              <a:t>A list element can be any Python object - even another list</a:t>
-            </a:r>
-          </a:p>
-          <a:p>
-            <a:r>
-              <a:rPr lang="en-GB"/>
-              <a:t>A list can be empty</a:t>
-            </a:r>
-          </a:p>
-          <a:p>
-            <a:endParaRPr lang="en-CH"/>
-          </a:p>
-        </p:txBody>
-      </p:sp>
-      <p:sp>
-        <p:nvSpPr>
-          <p:cNvPr id="5" name="TextBox 4">
-            <a:extLst>
-              <a:ext uri="{FF2B5EF4-FFF2-40B4-BE49-F238E27FC236}">
-                <a16:creationId xmlns:a16="http://schemas.microsoft.com/office/drawing/2014/main" id="{BBE6BE02-0FAB-AFE4-9321-A75F6355D296}"/>
-              </a:ext>
-            </a:extLst>
-          </p:cNvPr>
-          <p:cNvSpPr txBox="1"/>
-          <p:nvPr/>
-        </p:nvSpPr>
-        <p:spPr>
-          <a:xfrm>
-            <a:off x="5207000" y="1198940"/>
-            <a:ext cx="3771900" cy="3139321"/>
-          </a:xfrm>
-          <a:prstGeom prst="rect">
-            <a:avLst/>
-          </a:prstGeom>
-          <a:noFill/>
-        </p:spPr>
-        <p:txBody>
-          <a:bodyPr wrap="square">
-            <a:spAutoFit/>
-          </a:bodyPr>
-          <a:lstStyle/>
-          <a:p>
-            <a:pPr marL="0" marR="0" lvl="0" indent="0" algn="l" rtl="0">
-              <a:lnSpc>
-                <a:spcPct val="100000"/>
-              </a:lnSpc>
-              <a:spcBef>
-                <a:spcPts val="0"/>
-              </a:spcBef>
-              <a:spcAft>
-                <a:spcPts val="0"/>
-              </a:spcAft>
-              <a:buClr>
-                <a:schemeClr val="lt1"/>
-              </a:buClr>
-              <a:buSzPct val="25000"/>
-              <a:buFont typeface="Cabin"/>
+            <a:pPr marL="0" indent="0">
               <a:buNone/>
             </a:pPr>
             <a:r>
-              <a:rPr lang="en-US" sz="1800" i="0" u="none" strike="noStrike" cap="none" dirty="0">
-                <a:latin typeface="Consolas" panose="020B0609020204030204" pitchFamily="49" charset="0"/>
-                <a:ea typeface="Courier"/>
-                <a:cs typeface="Consolas" panose="020B0609020204030204" pitchFamily="49" charset="0"/>
-                <a:sym typeface="Courier New"/>
-              </a:rPr>
-              <a:t>&gt;&gt;&gt; print([1, 24, 76])</a:t>
-            </a:r>
-          </a:p>
-          <a:p>
-            <a:pPr marL="0" marR="0" lvl="0" indent="0" algn="l" rtl="0">
-              <a:lnSpc>
-                <a:spcPct val="100000"/>
-              </a:lnSpc>
-              <a:spcBef>
-                <a:spcPts val="0"/>
-              </a:spcBef>
-              <a:spcAft>
-                <a:spcPts val="0"/>
-              </a:spcAft>
-              <a:buClr>
-                <a:schemeClr val="lt1"/>
-              </a:buClr>
-              <a:buSzPct val="25000"/>
-              <a:buFont typeface="Cabin"/>
+              <a:rPr lang="en-GB"/>
+              <a:t>Most of our variables have one value in them - when we put a new value in the variable, the old value is overwritten</a:t>
+            </a:r>
+          </a:p>
+          <a:p>
+            <a:pPr marL="0" indent="0">
               <a:buNone/>
             </a:pPr>
-            <a:r>
-              <a:rPr lang="en-US" sz="1800" i="0" u="none" strike="noStrike" cap="none" dirty="0">
-                <a:latin typeface="Consolas" panose="020B0609020204030204" pitchFamily="49" charset="0"/>
-                <a:ea typeface="Courier"/>
-                <a:cs typeface="Consolas" panose="020B0609020204030204" pitchFamily="49" charset="0"/>
-                <a:sym typeface="Courier New"/>
-              </a:rPr>
-              <a:t>[1, 24, 76]</a:t>
-            </a:r>
-          </a:p>
-          <a:p>
-            <a:pPr>
-              <a:buClr>
-                <a:schemeClr val="lt1"/>
-              </a:buClr>
-              <a:buSzPct val="25000"/>
-            </a:pPr>
-            <a:r>
-              <a:rPr lang="en-US" sz="1800" i="0" u="none" strike="noStrike" cap="none" dirty="0">
-                <a:latin typeface="Consolas" panose="020B0609020204030204" pitchFamily="49" charset="0"/>
-                <a:ea typeface="Courier"/>
-                <a:cs typeface="Consolas" panose="020B0609020204030204" pitchFamily="49" charset="0"/>
-                <a:sym typeface="Courier New"/>
-              </a:rPr>
-              <a:t>&gt;&gt;&gt; print</a:t>
-            </a:r>
-            <a:r>
-              <a:rPr lang="en-US" sz="1800" dirty="0">
-                <a:latin typeface="Consolas" panose="020B0609020204030204" pitchFamily="49" charset="0"/>
-                <a:ea typeface="Courier"/>
-                <a:cs typeface="Consolas" panose="020B0609020204030204" pitchFamily="49" charset="0"/>
-                <a:sym typeface="Courier New"/>
-              </a:rPr>
-              <a:t>(</a:t>
-            </a:r>
-            <a:r>
-              <a:rPr lang="en-US" sz="1800" i="0" u="none" strike="noStrike" cap="none" dirty="0">
-                <a:latin typeface="Consolas" panose="020B0609020204030204" pitchFamily="49" charset="0"/>
-                <a:ea typeface="Courier"/>
-                <a:cs typeface="Consolas" panose="020B0609020204030204" pitchFamily="49" charset="0"/>
-                <a:sym typeface="Courier New"/>
-              </a:rPr>
-              <a:t>['red', 'yellow', 'blue']</a:t>
-            </a:r>
-            <a:r>
-              <a:rPr lang="en-US" sz="1800" dirty="0">
-                <a:latin typeface="Consolas" panose="020B0609020204030204" pitchFamily="49" charset="0"/>
-                <a:ea typeface="Courier"/>
-                <a:cs typeface="Consolas" panose="020B0609020204030204" pitchFamily="49" charset="0"/>
-                <a:sym typeface="Courier New"/>
-              </a:rPr>
-              <a:t>)</a:t>
-            </a:r>
-            <a:endParaRPr lang="en-US" sz="1800" i="0" u="none" strike="noStrike" cap="none" dirty="0">
-              <a:latin typeface="Consolas" panose="020B0609020204030204" pitchFamily="49" charset="0"/>
-              <a:ea typeface="Courier"/>
-              <a:cs typeface="Consolas" panose="020B0609020204030204" pitchFamily="49" charset="0"/>
-              <a:sym typeface="Courier New"/>
-            </a:endParaRPr>
-          </a:p>
-          <a:p>
-            <a:pPr marL="0" marR="0" lvl="0" indent="0" algn="l" rtl="0">
-              <a:lnSpc>
-                <a:spcPct val="100000"/>
-              </a:lnSpc>
-              <a:spcBef>
-                <a:spcPts val="0"/>
-              </a:spcBef>
-              <a:spcAft>
-                <a:spcPts val="0"/>
-              </a:spcAft>
-              <a:buClr>
-                <a:schemeClr val="lt1"/>
-              </a:buClr>
-              <a:buSzPct val="25000"/>
-              <a:buFont typeface="Cabin"/>
+            <a:endParaRPr lang="en-GB"/>
+          </a:p>
+          <a:p>
+            <a:pPr marL="0" indent="0">
               <a:buNone/>
             </a:pPr>
             <a:r>
-              <a:rPr lang="en-US" sz="1800" i="0" u="none" strike="noStrike" cap="none" dirty="0">
+              <a:rPr lang="en-GB">
                 <a:latin typeface="Consolas" panose="020B0609020204030204" pitchFamily="49" charset="0"/>
-                <a:ea typeface="Courier"/>
                 <a:cs typeface="Consolas" panose="020B0609020204030204" pitchFamily="49" charset="0"/>
-                <a:sym typeface="Courier New"/>
-              </a:rPr>
-              <a:t>['red', 'yellow', 'blue']</a:t>
-            </a:r>
-          </a:p>
-          <a:p>
-            <a:pPr>
-              <a:buClr>
-                <a:schemeClr val="lt1"/>
-              </a:buClr>
-              <a:buSzPct val="25000"/>
-            </a:pPr>
-            <a:r>
-              <a:rPr lang="en-US" sz="1800" i="0" u="none" strike="noStrike" cap="none" dirty="0">
-                <a:latin typeface="Consolas" panose="020B0609020204030204" pitchFamily="49" charset="0"/>
-                <a:ea typeface="Courier"/>
-                <a:cs typeface="Consolas" panose="020B0609020204030204" pitchFamily="49" charset="0"/>
-                <a:sym typeface="Courier New"/>
-              </a:rPr>
-              <a:t>&gt;&gt;&gt; print</a:t>
-            </a:r>
-            <a:r>
-              <a:rPr lang="en-US" sz="1800" dirty="0">
-                <a:latin typeface="Consolas" panose="020B0609020204030204" pitchFamily="49" charset="0"/>
-                <a:ea typeface="Courier"/>
-                <a:cs typeface="Consolas" panose="020B0609020204030204" pitchFamily="49" charset="0"/>
-                <a:sym typeface="Courier New"/>
-              </a:rPr>
-              <a:t>(</a:t>
-            </a:r>
-            <a:r>
-              <a:rPr lang="en-US" sz="1800" i="0" u="none" strike="noStrike" cap="none" dirty="0">
-                <a:latin typeface="Consolas" panose="020B0609020204030204" pitchFamily="49" charset="0"/>
-                <a:ea typeface="Courier"/>
-                <a:cs typeface="Consolas" panose="020B0609020204030204" pitchFamily="49" charset="0"/>
-                <a:sym typeface="Courier New"/>
-              </a:rPr>
-              <a:t>['red', 24, 98.6]</a:t>
-            </a:r>
-            <a:r>
-              <a:rPr lang="en-US" sz="1800" dirty="0">
-                <a:latin typeface="Consolas" panose="020B0609020204030204" pitchFamily="49" charset="0"/>
-                <a:ea typeface="Courier"/>
-                <a:cs typeface="Consolas" panose="020B0609020204030204" pitchFamily="49" charset="0"/>
-                <a:sym typeface="Courier New"/>
-              </a:rPr>
-              <a:t>)</a:t>
-            </a:r>
-            <a:endParaRPr lang="en-US" sz="1800" i="0" u="none" strike="noStrike" cap="none" dirty="0">
-              <a:latin typeface="Consolas" panose="020B0609020204030204" pitchFamily="49" charset="0"/>
-              <a:ea typeface="Courier"/>
-              <a:cs typeface="Consolas" panose="020B0609020204030204" pitchFamily="49" charset="0"/>
-              <a:sym typeface="Courier New"/>
-            </a:endParaRPr>
-          </a:p>
-          <a:p>
-            <a:pPr marL="0" marR="0" lvl="0" indent="0" algn="l" rtl="0">
-              <a:lnSpc>
-                <a:spcPct val="100000"/>
-              </a:lnSpc>
-              <a:spcBef>
-                <a:spcPts val="0"/>
-              </a:spcBef>
-              <a:spcAft>
-                <a:spcPts val="0"/>
-              </a:spcAft>
-              <a:buClr>
-                <a:schemeClr val="lt1"/>
-              </a:buClr>
-              <a:buSzPct val="25000"/>
-              <a:buFont typeface="Cabin"/>
+              </a:rPr>
+              <a:t>$ python</a:t>
+            </a:r>
+          </a:p>
+          <a:p>
+            <a:pPr marL="0" indent="0">
               <a:buNone/>
             </a:pPr>
             <a:r>
-              <a:rPr lang="en-US" sz="1800" i="0" u="none" strike="noStrike" cap="none" dirty="0">
+              <a:rPr lang="en-GB">
                 <a:latin typeface="Consolas" panose="020B0609020204030204" pitchFamily="49" charset="0"/>
-                <a:ea typeface="Courier"/>
                 <a:cs typeface="Consolas" panose="020B0609020204030204" pitchFamily="49" charset="0"/>
-                <a:sym typeface="Courier New"/>
-              </a:rPr>
-              <a:t>['red', 24, 98.6]</a:t>
-            </a:r>
-          </a:p>
-          <a:p>
-            <a:pPr>
-              <a:buClr>
-                <a:schemeClr val="lt1"/>
-              </a:buClr>
-              <a:buSzPct val="25000"/>
-            </a:pPr>
-            <a:r>
-              <a:rPr lang="en-US" sz="1800" i="0" u="none" strike="noStrike" cap="none" dirty="0">
-                <a:latin typeface="Consolas" panose="020B0609020204030204" pitchFamily="49" charset="0"/>
-                <a:ea typeface="Courier"/>
-                <a:cs typeface="Consolas" panose="020B0609020204030204" pitchFamily="49" charset="0"/>
-                <a:sym typeface="Courier New"/>
-              </a:rPr>
-              <a:t>&gt;&gt;&gt; print</a:t>
-            </a:r>
-            <a:r>
-              <a:rPr lang="en-US" sz="1800" dirty="0">
-                <a:latin typeface="Consolas" panose="020B0609020204030204" pitchFamily="49" charset="0"/>
-                <a:ea typeface="Courier"/>
-                <a:cs typeface="Consolas" panose="020B0609020204030204" pitchFamily="49" charset="0"/>
-                <a:sym typeface="Courier New"/>
-              </a:rPr>
-              <a:t>(</a:t>
-            </a:r>
-            <a:r>
-              <a:rPr lang="en-US" sz="1800" i="0" u="none" strike="noStrike" cap="none" dirty="0">
-                <a:latin typeface="Consolas" panose="020B0609020204030204" pitchFamily="49" charset="0"/>
-                <a:ea typeface="Courier"/>
-                <a:cs typeface="Consolas" panose="020B0609020204030204" pitchFamily="49" charset="0"/>
-                <a:sym typeface="Courier New"/>
-              </a:rPr>
-              <a:t>[ 1, [5, 6], 7]</a:t>
-            </a:r>
-            <a:r>
-              <a:rPr lang="en-US" sz="1800" dirty="0">
-                <a:latin typeface="Consolas" panose="020B0609020204030204" pitchFamily="49" charset="0"/>
-                <a:ea typeface="Courier"/>
-                <a:cs typeface="Consolas" panose="020B0609020204030204" pitchFamily="49" charset="0"/>
-                <a:sym typeface="Courier New"/>
-              </a:rPr>
-              <a:t>)</a:t>
-            </a:r>
-            <a:endParaRPr lang="en-US" sz="1800" i="0" u="none" strike="noStrike" cap="none" dirty="0">
-              <a:latin typeface="Consolas" panose="020B0609020204030204" pitchFamily="49" charset="0"/>
-              <a:ea typeface="Courier"/>
-              <a:cs typeface="Consolas" panose="020B0609020204030204" pitchFamily="49" charset="0"/>
-              <a:sym typeface="Courier New"/>
-            </a:endParaRPr>
-          </a:p>
-          <a:p>
-            <a:pPr marL="0" marR="0" lvl="0" indent="0" algn="l" rtl="0">
-              <a:lnSpc>
-                <a:spcPct val="100000"/>
-              </a:lnSpc>
-              <a:spcBef>
-                <a:spcPts val="0"/>
-              </a:spcBef>
-              <a:spcAft>
-                <a:spcPts val="0"/>
-              </a:spcAft>
-              <a:buClr>
-                <a:schemeClr val="lt1"/>
-              </a:buClr>
-              <a:buSzPct val="25000"/>
-              <a:buFont typeface="Cabin"/>
+              </a:rPr>
+              <a:t>&gt;&gt;&gt; x = 2</a:t>
+            </a:r>
+          </a:p>
+          <a:p>
+            <a:pPr marL="0" indent="0">
               <a:buNone/>
             </a:pPr>
             <a:r>
-              <a:rPr lang="en-US" sz="1800" i="0" u="none" strike="noStrike" cap="none" dirty="0">
+              <a:rPr lang="en-GB">
                 <a:latin typeface="Consolas" panose="020B0609020204030204" pitchFamily="49" charset="0"/>
-                <a:ea typeface="Courier"/>
                 <a:cs typeface="Consolas" panose="020B0609020204030204" pitchFamily="49" charset="0"/>
-                <a:sym typeface="Courier New"/>
-              </a:rPr>
-              <a:t>[1, [5, 6], 7]</a:t>
-            </a:r>
-          </a:p>
-          <a:p>
-            <a:pPr>
-              <a:buClr>
-                <a:schemeClr val="lt1"/>
-              </a:buClr>
-              <a:buSzPct val="25000"/>
-            </a:pPr>
-            <a:r>
-              <a:rPr lang="en-US" sz="1800" i="0" u="none" strike="noStrike" cap="none" dirty="0">
-                <a:latin typeface="Consolas" panose="020B0609020204030204" pitchFamily="49" charset="0"/>
-                <a:ea typeface="Courier"/>
-                <a:cs typeface="Consolas" panose="020B0609020204030204" pitchFamily="49" charset="0"/>
-                <a:sym typeface="Courier New"/>
-              </a:rPr>
-              <a:t>&gt;&gt;&gt; print</a:t>
-            </a:r>
-            <a:r>
-              <a:rPr lang="en-US" sz="1800" dirty="0">
-                <a:latin typeface="Consolas" panose="020B0609020204030204" pitchFamily="49" charset="0"/>
-                <a:ea typeface="Courier"/>
-                <a:cs typeface="Consolas" panose="020B0609020204030204" pitchFamily="49" charset="0"/>
-                <a:sym typeface="Courier New"/>
-              </a:rPr>
-              <a:t>(</a:t>
-            </a:r>
-            <a:r>
-              <a:rPr lang="en-US" sz="1800" i="0" u="none" strike="noStrike" cap="none" dirty="0">
-                <a:latin typeface="Consolas" panose="020B0609020204030204" pitchFamily="49" charset="0"/>
-                <a:ea typeface="Courier"/>
-                <a:cs typeface="Consolas" panose="020B0609020204030204" pitchFamily="49" charset="0"/>
-                <a:sym typeface="Courier New"/>
-              </a:rPr>
-              <a:t>[]</a:t>
-            </a:r>
-            <a:r>
-              <a:rPr lang="en-US" sz="1800" dirty="0">
-                <a:latin typeface="Consolas" panose="020B0609020204030204" pitchFamily="49" charset="0"/>
-                <a:ea typeface="Courier"/>
-                <a:cs typeface="Consolas" panose="020B0609020204030204" pitchFamily="49" charset="0"/>
-                <a:sym typeface="Courier New"/>
-              </a:rPr>
-              <a:t>)</a:t>
-            </a:r>
-            <a:endParaRPr lang="en-US" sz="1800" i="0" u="none" strike="noStrike" cap="none" dirty="0">
-              <a:latin typeface="Consolas" panose="020B0609020204030204" pitchFamily="49" charset="0"/>
-              <a:ea typeface="Courier"/>
-              <a:cs typeface="Consolas" panose="020B0609020204030204" pitchFamily="49" charset="0"/>
-              <a:sym typeface="Courier New"/>
-            </a:endParaRPr>
-          </a:p>
-          <a:p>
-            <a:pPr marL="0" marR="0" lvl="0" indent="0" algn="l" rtl="0">
-              <a:lnSpc>
-                <a:spcPct val="100000"/>
-              </a:lnSpc>
-              <a:spcBef>
-                <a:spcPts val="0"/>
-              </a:spcBef>
-              <a:spcAft>
-                <a:spcPts val="0"/>
-              </a:spcAft>
-              <a:buClr>
-                <a:schemeClr val="lt1"/>
-              </a:buClr>
-              <a:buSzPct val="25000"/>
-              <a:buFont typeface="Cabin"/>
+              </a:rPr>
+              <a:t>&gt;&gt;&gt; x = 4</a:t>
+            </a:r>
+          </a:p>
+          <a:p>
+            <a:pPr marL="0" indent="0">
               <a:buNone/>
             </a:pPr>
             <a:r>
-              <a:rPr lang="en-US" sz="1800" i="0" u="none" strike="noStrike" cap="none" dirty="0">
+              <a:rPr lang="en-GB">
                 <a:latin typeface="Consolas" panose="020B0609020204030204" pitchFamily="49" charset="0"/>
-                <a:ea typeface="Courier"/>
                 <a:cs typeface="Consolas" panose="020B0609020204030204" pitchFamily="49" charset="0"/>
-                <a:sym typeface="Courier New"/>
-              </a:rPr>
-              <a:t>[]</a:t>
-            </a:r>
+              </a:rPr>
+              <a:t>&gt;&gt;&gt; print(x)</a:t>
+            </a:r>
+          </a:p>
+          <a:p>
+            <a:pPr marL="0" indent="0">
+              <a:buNone/>
+            </a:pPr>
+            <a:r>
+              <a:rPr lang="en-GB">
+                <a:latin typeface="Consolas" panose="020B0609020204030204" pitchFamily="49" charset="0"/>
+                <a:cs typeface="Consolas" panose="020B0609020204030204" pitchFamily="49" charset="0"/>
+              </a:rPr>
+              <a:t>4</a:t>
+            </a:r>
+          </a:p>
+          <a:p>
+            <a:endParaRPr lang="en-CH"/>
           </a:p>
         </p:txBody>
       </p:sp>
       <p:sp>
         <p:nvSpPr>
-          <p:cNvPr id="6" name="TextBox 5">
-            <a:extLst>
-              <a:ext uri="{FF2B5EF4-FFF2-40B4-BE49-F238E27FC236}">
-                <a16:creationId xmlns:a16="http://schemas.microsoft.com/office/drawing/2014/main" id="{22E50FE4-1FA7-24BB-511F-8DA93F6E029D}"/>
+          <p:cNvPr id="4" name="TextBox 3">
+            <a:extLst>
+              <a:ext uri="{FF2B5EF4-FFF2-40B4-BE49-F238E27FC236}">
+                <a16:creationId xmlns:a16="http://schemas.microsoft.com/office/drawing/2014/main" id="{EBE59914-ECE3-624C-B86D-DED6243D0821}"/>
               </a:ext>
             </a:extLst>
           </p:cNvPr>
@@ -19702,7 +19229,7 @@
     </p:spTree>
     <p:extLst>
       <p:ext uri="{BB962C8B-B14F-4D97-AF65-F5344CB8AC3E}">
-        <p14:creationId xmlns:p14="http://schemas.microsoft.com/office/powerpoint/2010/main" val="2750883330"/>
+        <p14:creationId xmlns:p14="http://schemas.microsoft.com/office/powerpoint/2010/main" val="1152027779"/>
       </p:ext>
     </p:extLst>
   </p:cSld>
@@ -19778,7 +19305,7 @@
             <p:ph idx="1"/>
             <p:extLst>
               <p:ext uri="{D42A27DB-BD31-4B8C-83A1-F6EECF244321}">
-                <p14:modId xmlns:p14="http://schemas.microsoft.com/office/powerpoint/2010/main" val="1237252272"/>
+                <p14:modId xmlns:p14="http://schemas.microsoft.com/office/powerpoint/2010/main" val="2183064897"/>
               </p:ext>
             </p:extLst>
           </p:nvPr>
@@ -19966,7 +19493,7 @@
           <p:cNvPr id="2" name="Title 1">
             <a:extLst>
               <a:ext uri="{FF2B5EF4-FFF2-40B4-BE49-F238E27FC236}">
-                <a16:creationId xmlns:a16="http://schemas.microsoft.com/office/drawing/2014/main" id="{E0FAE9D5-8D95-15A8-C750-ACA27E3ADBB5}"/>
+                <a16:creationId xmlns:a16="http://schemas.microsoft.com/office/drawing/2014/main" id="{F4F08439-6E4C-214B-3DF9-B34C20B3C12C}"/>
               </a:ext>
             </a:extLst>
           </p:cNvPr>
@@ -19984,7 +19511,7 @@
           <a:p>
             <a:r>
               <a:rPr lang="en-GB"/>
-              <a:t>Looking Inside Lists</a:t>
+              <a:t>List Constants</a:t>
             </a:r>
             <a:endParaRPr lang="en-CH"/>
           </a:p>
@@ -19995,7 +19522,7 @@
           <p:cNvPr id="3" name="Content Placeholder 2">
             <a:extLst>
               <a:ext uri="{FF2B5EF4-FFF2-40B4-BE49-F238E27FC236}">
-                <a16:creationId xmlns:a16="http://schemas.microsoft.com/office/drawing/2014/main" id="{630D7DA5-0438-DECF-EB92-A2000B9D80EB}"/>
+                <a16:creationId xmlns:a16="http://schemas.microsoft.com/office/drawing/2014/main" id="{C3CE3AD9-AACC-34B7-740A-EC354B25A395}"/>
               </a:ext>
             </a:extLst>
           </p:cNvPr>
@@ -20009,65 +19536,41 @@
         <p:spPr>
           <a:xfrm>
             <a:off x="628650" y="1369219"/>
-            <a:ext cx="7886700" cy="1894681"/>
+            <a:ext cx="4229100" cy="3263504"/>
           </a:xfrm>
         </p:spPr>
         <p:txBody>
           <a:bodyPr/>
           <a:lstStyle/>
           <a:p>
-            <a:pPr marL="0" indent="0">
-              <a:buNone/>
-            </a:pPr>
             <a:r>
               <a:rPr lang="en-GB"/>
-              <a:t>Just like strings, we can get at any single element in a list using an index specified in square brackets</a:t>
-            </a:r>
-          </a:p>
-          <a:p>
-            <a:pPr marL="0" lvl="0" indent="0">
-              <a:buNone/>
-            </a:pPr>
-            <a:r>
-              <a:rPr lang="en-GB" sz="1800">
-                <a:latin typeface="Consolas" panose="020B0609020204030204" pitchFamily="49" charset="0"/>
-                <a:cs typeface="Consolas" panose="020B0609020204030204" pitchFamily="49" charset="0"/>
-              </a:rPr>
-              <a:t>&gt;&gt;&gt; friends = [ 'Joseph', 'Glenn', 'Sally' ]</a:t>
-            </a:r>
-          </a:p>
-          <a:p>
-            <a:pPr marL="0" lvl="0" indent="0">
-              <a:buNone/>
-            </a:pPr>
-            <a:r>
-              <a:rPr lang="en-GB" sz="1800">
-                <a:latin typeface="Consolas" panose="020B0609020204030204" pitchFamily="49" charset="0"/>
-                <a:cs typeface="Consolas" panose="020B0609020204030204" pitchFamily="49" charset="0"/>
-              </a:rPr>
-              <a:t>&gt;&gt;&gt; print(friends[1])</a:t>
-            </a:r>
-          </a:p>
-          <a:p>
-            <a:pPr marL="0" lvl="0" indent="0">
-              <a:buNone/>
-            </a:pPr>
-            <a:r>
-              <a:rPr lang="en-GB" sz="1800">
-                <a:latin typeface="Consolas" panose="020B0609020204030204" pitchFamily="49" charset="0"/>
-                <a:cs typeface="Consolas" panose="020B0609020204030204" pitchFamily="49" charset="0"/>
-              </a:rPr>
-              <a:t>Glenn</a:t>
-            </a:r>
+              <a:t>List constants are surrounded by square brackets and the elements in the list are separated by commas</a:t>
+            </a:r>
+          </a:p>
+          <a:p>
+            <a:r>
+              <a:rPr lang="en-GB"/>
+              <a:t>A list element can be any Python object - even another list</a:t>
+            </a:r>
+          </a:p>
+          <a:p>
+            <a:r>
+              <a:rPr lang="en-GB"/>
+              <a:t>A list can be empty</a:t>
+            </a:r>
+          </a:p>
+          <a:p>
+            <a:endParaRPr lang="en-CH"/>
           </a:p>
         </p:txBody>
       </p:sp>
       <p:sp>
         <p:nvSpPr>
-          <p:cNvPr id="10" name="Shape 216">
-            <a:extLst>
-              <a:ext uri="{FF2B5EF4-FFF2-40B4-BE49-F238E27FC236}">
-                <a16:creationId xmlns:a16="http://schemas.microsoft.com/office/drawing/2014/main" id="{BD8E032E-D043-FDA2-B66E-8DEEFDFA8EB0}"/>
+          <p:cNvPr id="5" name="TextBox 4">
+            <a:extLst>
+              <a:ext uri="{FF2B5EF4-FFF2-40B4-BE49-F238E27FC236}">
+                <a16:creationId xmlns:a16="http://schemas.microsoft.com/office/drawing/2014/main" id="{BBE6BE02-0FAB-AFE4-9321-A75F6355D296}"/>
               </a:ext>
             </a:extLst>
           </p:cNvPr>
@@ -20076,322 +19579,395 @@
         </p:nvSpPr>
         <p:spPr>
           <a:xfrm>
-            <a:off x="2470150" y="3848101"/>
-            <a:ext cx="736599" cy="736599"/>
+            <a:off x="5207000" y="1198940"/>
+            <a:ext cx="3771900" cy="3139321"/>
           </a:xfrm>
           <a:prstGeom prst="rect">
             <a:avLst/>
           </a:prstGeom>
           <a:noFill/>
-          <a:ln>
-            <a:noFill/>
-          </a:ln>
         </p:spPr>
         <p:txBody>
-          <a:bodyPr lIns="0" tIns="0" rIns="0" bIns="0" anchor="ctr" anchorCtr="0">
-            <a:noAutofit/>
+          <a:bodyPr wrap="square">
+            <a:spAutoFit/>
           </a:bodyPr>
           <a:lstStyle/>
           <a:p>
-            <a:pPr algn="ctr">
+            <a:pPr marL="0" marR="0" lvl="0" indent="0" algn="l" rtl="0">
+              <a:lnSpc>
+                <a:spcPct val="100000"/>
+              </a:lnSpc>
+              <a:spcBef>
+                <a:spcPts val="0"/>
+              </a:spcBef>
+              <a:spcAft>
+                <a:spcPts val="0"/>
+              </a:spcAft>
               <a:buClr>
-                <a:srgbClr val="FFFFFF"/>
+                <a:schemeClr val="lt1"/>
               </a:buClr>
               <a:buSzPct val="25000"/>
               <a:buFont typeface="Cabin"/>
               <a:buNone/>
             </a:pPr>
             <a:r>
-              <a:rPr lang="en-US" sz="4000" kern="0">
-                <a:latin typeface="Arial" charset="0"/>
-                <a:ea typeface="Arial" charset="0"/>
-                <a:cs typeface="Arial" charset="0"/>
-                <a:sym typeface="Cabin"/>
-              </a:rPr>
-              <a:t>0</a:t>
-            </a:r>
-          </a:p>
-        </p:txBody>
-      </p:sp>
-      <p:sp>
-        <p:nvSpPr>
-          <p:cNvPr id="11" name="Shape 217">
-            <a:extLst>
-              <a:ext uri="{FF2B5EF4-FFF2-40B4-BE49-F238E27FC236}">
-                <a16:creationId xmlns:a16="http://schemas.microsoft.com/office/drawing/2014/main" id="{980A9EB5-A172-192D-75EE-4662F4534906}"/>
-              </a:ext>
-            </a:extLst>
-          </p:cNvPr>
-          <p:cNvSpPr txBox="1"/>
-          <p:nvPr/>
-        </p:nvSpPr>
-        <p:spPr>
-          <a:xfrm>
-            <a:off x="1898650" y="3124201"/>
-            <a:ext cx="1879599" cy="736599"/>
-          </a:xfrm>
-          <a:prstGeom prst="rect">
-            <a:avLst/>
-          </a:prstGeom>
-          <a:noFill/>
-          <a:ln w="50800" cap="rnd" cmpd="sng">
-            <a:solidFill>
-              <a:srgbClr val="FF7F00"/>
-            </a:solidFill>
-            <a:prstDash val="solid"/>
-            <a:miter/>
-            <a:headEnd type="none" w="med" len="med"/>
-            <a:tailEnd type="none" w="med" len="med"/>
-          </a:ln>
-        </p:spPr>
-        <p:txBody>
-          <a:bodyPr lIns="0" tIns="0" rIns="0" bIns="0" anchor="ctr" anchorCtr="0">
-            <a:noAutofit/>
-          </a:bodyPr>
-          <a:lstStyle/>
-          <a:p>
-            <a:pPr algn="ctr">
+              <a:rPr lang="en-US" sz="1800" i="0" u="none" strike="noStrike" cap="none" dirty="0">
+                <a:latin typeface="Consolas" panose="020B0609020204030204" pitchFamily="49" charset="0"/>
+                <a:ea typeface="Courier"/>
+                <a:cs typeface="Consolas" panose="020B0609020204030204" pitchFamily="49" charset="0"/>
+                <a:sym typeface="Courier New"/>
+              </a:rPr>
+              <a:t>&gt;&gt;&gt; print([1, 24, 76])</a:t>
+            </a:r>
+          </a:p>
+          <a:p>
+            <a:pPr marL="0" marR="0" lvl="0" indent="0" algn="l" rtl="0">
+              <a:lnSpc>
+                <a:spcPct val="100000"/>
+              </a:lnSpc>
+              <a:spcBef>
+                <a:spcPts val="0"/>
+              </a:spcBef>
+              <a:spcAft>
+                <a:spcPts val="0"/>
+              </a:spcAft>
               <a:buClr>
-                <a:srgbClr val="FFFFFF"/>
+                <a:schemeClr val="lt1"/>
               </a:buClr>
               <a:buSzPct val="25000"/>
               <a:buFont typeface="Cabin"/>
               <a:buNone/>
             </a:pPr>
             <a:r>
-              <a:rPr lang="en-US" sz="4000" kern="0">
-                <a:latin typeface="Arial" charset="0"/>
-                <a:ea typeface="Arial" charset="0"/>
-                <a:cs typeface="Arial" charset="0"/>
-                <a:sym typeface="Cabin"/>
-              </a:rPr>
-              <a:t>Joseph</a:t>
-            </a:r>
-          </a:p>
-        </p:txBody>
-      </p:sp>
-      <p:sp>
-        <p:nvSpPr>
-          <p:cNvPr id="12" name="Shape 219">
-            <a:extLst>
-              <a:ext uri="{FF2B5EF4-FFF2-40B4-BE49-F238E27FC236}">
-                <a16:creationId xmlns:a16="http://schemas.microsoft.com/office/drawing/2014/main" id="{8741831B-FB43-BF4A-36C6-1A911B4A7E98}"/>
-              </a:ext>
-            </a:extLst>
-          </p:cNvPr>
-          <p:cNvSpPr txBox="1"/>
-          <p:nvPr/>
-        </p:nvSpPr>
-        <p:spPr>
-          <a:xfrm>
-            <a:off x="4349750" y="3848101"/>
-            <a:ext cx="736599" cy="736599"/>
-          </a:xfrm>
-          <a:prstGeom prst="rect">
-            <a:avLst/>
-          </a:prstGeom>
-          <a:noFill/>
-          <a:ln>
-            <a:noFill/>
-          </a:ln>
-        </p:spPr>
-        <p:txBody>
-          <a:bodyPr lIns="0" tIns="0" rIns="0" bIns="0" anchor="ctr" anchorCtr="0">
-            <a:noAutofit/>
-          </a:bodyPr>
-          <a:lstStyle/>
-          <a:p>
-            <a:pPr algn="ctr">
+              <a:rPr lang="en-US" sz="1800" i="0" u="none" strike="noStrike" cap="none" dirty="0">
+                <a:latin typeface="Consolas" panose="020B0609020204030204" pitchFamily="49" charset="0"/>
+                <a:ea typeface="Courier"/>
+                <a:cs typeface="Consolas" panose="020B0609020204030204" pitchFamily="49" charset="0"/>
+                <a:sym typeface="Courier New"/>
+              </a:rPr>
+              <a:t>[1, 24, 76]</a:t>
+            </a:r>
+          </a:p>
+          <a:p>
+            <a:pPr>
               <a:buClr>
-                <a:srgbClr val="FFFFFF"/>
+                <a:schemeClr val="lt1"/>
+              </a:buClr>
+              <a:buSzPct val="25000"/>
+            </a:pPr>
+            <a:r>
+              <a:rPr lang="en-US" sz="1800" i="0" u="none" strike="noStrike" cap="none" dirty="0">
+                <a:latin typeface="Consolas" panose="020B0609020204030204" pitchFamily="49" charset="0"/>
+                <a:ea typeface="Courier"/>
+                <a:cs typeface="Consolas" panose="020B0609020204030204" pitchFamily="49" charset="0"/>
+                <a:sym typeface="Courier New"/>
+              </a:rPr>
+              <a:t>&gt;&gt;&gt; print</a:t>
+            </a:r>
+            <a:r>
+              <a:rPr lang="en-US" sz="1800" dirty="0">
+                <a:latin typeface="Consolas" panose="020B0609020204030204" pitchFamily="49" charset="0"/>
+                <a:ea typeface="Courier"/>
+                <a:cs typeface="Consolas" panose="020B0609020204030204" pitchFamily="49" charset="0"/>
+                <a:sym typeface="Courier New"/>
+              </a:rPr>
+              <a:t>(</a:t>
+            </a:r>
+            <a:r>
+              <a:rPr lang="en-US" sz="1800" i="0" u="none" strike="noStrike" cap="none" dirty="0">
+                <a:latin typeface="Consolas" panose="020B0609020204030204" pitchFamily="49" charset="0"/>
+                <a:ea typeface="Courier"/>
+                <a:cs typeface="Consolas" panose="020B0609020204030204" pitchFamily="49" charset="0"/>
+                <a:sym typeface="Courier New"/>
+              </a:rPr>
+              <a:t>['red', 'yellow', 'blue']</a:t>
+            </a:r>
+            <a:r>
+              <a:rPr lang="en-US" sz="1800" dirty="0">
+                <a:latin typeface="Consolas" panose="020B0609020204030204" pitchFamily="49" charset="0"/>
+                <a:ea typeface="Courier"/>
+                <a:cs typeface="Consolas" panose="020B0609020204030204" pitchFamily="49" charset="0"/>
+                <a:sym typeface="Courier New"/>
+              </a:rPr>
+              <a:t>)</a:t>
+            </a:r>
+            <a:endParaRPr lang="en-US" sz="1800" i="0" u="none" strike="noStrike" cap="none" dirty="0">
+              <a:latin typeface="Consolas" panose="020B0609020204030204" pitchFamily="49" charset="0"/>
+              <a:ea typeface="Courier"/>
+              <a:cs typeface="Consolas" panose="020B0609020204030204" pitchFamily="49" charset="0"/>
+              <a:sym typeface="Courier New"/>
+            </a:endParaRPr>
+          </a:p>
+          <a:p>
+            <a:pPr marL="0" marR="0" lvl="0" indent="0" algn="l" rtl="0">
+              <a:lnSpc>
+                <a:spcPct val="100000"/>
+              </a:lnSpc>
+              <a:spcBef>
+                <a:spcPts val="0"/>
+              </a:spcBef>
+              <a:spcAft>
+                <a:spcPts val="0"/>
+              </a:spcAft>
+              <a:buClr>
+                <a:schemeClr val="lt1"/>
               </a:buClr>
               <a:buSzPct val="25000"/>
               <a:buFont typeface="Cabin"/>
               <a:buNone/>
             </a:pPr>
             <a:r>
-              <a:rPr lang="en-US" sz="4000" kern="0">
-                <a:latin typeface="Arial" charset="0"/>
-                <a:ea typeface="Arial" charset="0"/>
-                <a:cs typeface="Arial" charset="0"/>
-                <a:sym typeface="Cabin"/>
-              </a:rPr>
-              <a:t>1</a:t>
-            </a:r>
-          </a:p>
-        </p:txBody>
-      </p:sp>
-      <p:sp>
-        <p:nvSpPr>
-          <p:cNvPr id="13" name="Shape 220">
-            <a:extLst>
-              <a:ext uri="{FF2B5EF4-FFF2-40B4-BE49-F238E27FC236}">
-                <a16:creationId xmlns:a16="http://schemas.microsoft.com/office/drawing/2014/main" id="{B26129BF-CCCB-E451-433D-3A716A081B4B}"/>
-              </a:ext>
-            </a:extLst>
-          </p:cNvPr>
-          <p:cNvSpPr txBox="1"/>
-          <p:nvPr/>
-        </p:nvSpPr>
-        <p:spPr>
-          <a:xfrm>
-            <a:off x="3778250" y="3124201"/>
-            <a:ext cx="1879599" cy="736599"/>
-          </a:xfrm>
-          <a:prstGeom prst="rect">
-            <a:avLst/>
-          </a:prstGeom>
-          <a:noFill/>
-          <a:ln w="50800" cap="rnd" cmpd="sng">
-            <a:solidFill>
-              <a:srgbClr val="FF7F00"/>
-            </a:solidFill>
-            <a:prstDash val="solid"/>
-            <a:miter/>
-            <a:headEnd type="none" w="med" len="med"/>
-            <a:tailEnd type="none" w="med" len="med"/>
-          </a:ln>
-        </p:spPr>
-        <p:txBody>
-          <a:bodyPr lIns="0" tIns="0" rIns="0" bIns="0" anchor="ctr" anchorCtr="0">
-            <a:noAutofit/>
-          </a:bodyPr>
-          <a:lstStyle/>
-          <a:p>
-            <a:pPr algn="ctr">
+              <a:rPr lang="en-US" sz="1800" i="0" u="none" strike="noStrike" cap="none" dirty="0">
+                <a:latin typeface="Consolas" panose="020B0609020204030204" pitchFamily="49" charset="0"/>
+                <a:ea typeface="Courier"/>
+                <a:cs typeface="Consolas" panose="020B0609020204030204" pitchFamily="49" charset="0"/>
+                <a:sym typeface="Courier New"/>
+              </a:rPr>
+              <a:t>['red', 'yellow', 'blue']</a:t>
+            </a:r>
+          </a:p>
+          <a:p>
+            <a:pPr>
               <a:buClr>
-                <a:srgbClr val="FFFFFF"/>
+                <a:schemeClr val="lt1"/>
+              </a:buClr>
+              <a:buSzPct val="25000"/>
+            </a:pPr>
+            <a:r>
+              <a:rPr lang="en-US" sz="1800" i="0" u="none" strike="noStrike" cap="none" dirty="0">
+                <a:latin typeface="Consolas" panose="020B0609020204030204" pitchFamily="49" charset="0"/>
+                <a:ea typeface="Courier"/>
+                <a:cs typeface="Consolas" panose="020B0609020204030204" pitchFamily="49" charset="0"/>
+                <a:sym typeface="Courier New"/>
+              </a:rPr>
+              <a:t>&gt;&gt;&gt; print</a:t>
+            </a:r>
+            <a:r>
+              <a:rPr lang="en-US" sz="1800" dirty="0">
+                <a:latin typeface="Consolas" panose="020B0609020204030204" pitchFamily="49" charset="0"/>
+                <a:ea typeface="Courier"/>
+                <a:cs typeface="Consolas" panose="020B0609020204030204" pitchFamily="49" charset="0"/>
+                <a:sym typeface="Courier New"/>
+              </a:rPr>
+              <a:t>(</a:t>
+            </a:r>
+            <a:r>
+              <a:rPr lang="en-US" sz="1800" i="0" u="none" strike="noStrike" cap="none" dirty="0">
+                <a:latin typeface="Consolas" panose="020B0609020204030204" pitchFamily="49" charset="0"/>
+                <a:ea typeface="Courier"/>
+                <a:cs typeface="Consolas" panose="020B0609020204030204" pitchFamily="49" charset="0"/>
+                <a:sym typeface="Courier New"/>
+              </a:rPr>
+              <a:t>['red', 24, 98.6]</a:t>
+            </a:r>
+            <a:r>
+              <a:rPr lang="en-US" sz="1800" dirty="0">
+                <a:latin typeface="Consolas" panose="020B0609020204030204" pitchFamily="49" charset="0"/>
+                <a:ea typeface="Courier"/>
+                <a:cs typeface="Consolas" panose="020B0609020204030204" pitchFamily="49" charset="0"/>
+                <a:sym typeface="Courier New"/>
+              </a:rPr>
+              <a:t>)</a:t>
+            </a:r>
+            <a:endParaRPr lang="en-US" sz="1800" i="0" u="none" strike="noStrike" cap="none" dirty="0">
+              <a:latin typeface="Consolas" panose="020B0609020204030204" pitchFamily="49" charset="0"/>
+              <a:ea typeface="Courier"/>
+              <a:cs typeface="Consolas" panose="020B0609020204030204" pitchFamily="49" charset="0"/>
+              <a:sym typeface="Courier New"/>
+            </a:endParaRPr>
+          </a:p>
+          <a:p>
+            <a:pPr marL="0" marR="0" lvl="0" indent="0" algn="l" rtl="0">
+              <a:lnSpc>
+                <a:spcPct val="100000"/>
+              </a:lnSpc>
+              <a:spcBef>
+                <a:spcPts val="0"/>
+              </a:spcBef>
+              <a:spcAft>
+                <a:spcPts val="0"/>
+              </a:spcAft>
+              <a:buClr>
+                <a:schemeClr val="lt1"/>
               </a:buClr>
               <a:buSzPct val="25000"/>
               <a:buFont typeface="Cabin"/>
               <a:buNone/>
             </a:pPr>
             <a:r>
-              <a:rPr lang="en-US" sz="4000" kern="0">
-                <a:latin typeface="Arial" charset="0"/>
-                <a:ea typeface="Arial" charset="0"/>
-                <a:cs typeface="Arial" charset="0"/>
-                <a:sym typeface="Cabin"/>
-              </a:rPr>
-              <a:t>Glenn</a:t>
-            </a:r>
-          </a:p>
-        </p:txBody>
-      </p:sp>
-      <p:sp>
-        <p:nvSpPr>
-          <p:cNvPr id="14" name="Shape 221">
-            <a:extLst>
-              <a:ext uri="{FF2B5EF4-FFF2-40B4-BE49-F238E27FC236}">
-                <a16:creationId xmlns:a16="http://schemas.microsoft.com/office/drawing/2014/main" id="{F9581F0B-399F-AC09-15E8-01A4C9D34BA1}"/>
-              </a:ext>
-            </a:extLst>
-          </p:cNvPr>
-          <p:cNvSpPr txBox="1"/>
-          <p:nvPr/>
-        </p:nvSpPr>
-        <p:spPr>
-          <a:xfrm>
-            <a:off x="6229350" y="3848101"/>
-            <a:ext cx="736599" cy="736599"/>
-          </a:xfrm>
-          <a:prstGeom prst="rect">
-            <a:avLst/>
-          </a:prstGeom>
-          <a:noFill/>
-          <a:ln>
-            <a:noFill/>
-          </a:ln>
-        </p:spPr>
-        <p:txBody>
-          <a:bodyPr lIns="0" tIns="0" rIns="0" bIns="0" anchor="ctr" anchorCtr="0">
-            <a:noAutofit/>
-          </a:bodyPr>
-          <a:lstStyle/>
-          <a:p>
-            <a:pPr algn="ctr">
+              <a:rPr lang="en-US" sz="1800" i="0" u="none" strike="noStrike" cap="none" dirty="0">
+                <a:latin typeface="Consolas" panose="020B0609020204030204" pitchFamily="49" charset="0"/>
+                <a:ea typeface="Courier"/>
+                <a:cs typeface="Consolas" panose="020B0609020204030204" pitchFamily="49" charset="0"/>
+                <a:sym typeface="Courier New"/>
+              </a:rPr>
+              <a:t>['red', 24, 98.6]</a:t>
+            </a:r>
+          </a:p>
+          <a:p>
+            <a:pPr>
               <a:buClr>
-                <a:srgbClr val="FFFFFF"/>
+                <a:schemeClr val="lt1"/>
+              </a:buClr>
+              <a:buSzPct val="25000"/>
+            </a:pPr>
+            <a:r>
+              <a:rPr lang="en-US" sz="1800" i="0" u="none" strike="noStrike" cap="none" dirty="0">
+                <a:latin typeface="Consolas" panose="020B0609020204030204" pitchFamily="49" charset="0"/>
+                <a:ea typeface="Courier"/>
+                <a:cs typeface="Consolas" panose="020B0609020204030204" pitchFamily="49" charset="0"/>
+                <a:sym typeface="Courier New"/>
+              </a:rPr>
+              <a:t>&gt;&gt;&gt; print</a:t>
+            </a:r>
+            <a:r>
+              <a:rPr lang="en-US" sz="1800" dirty="0">
+                <a:latin typeface="Consolas" panose="020B0609020204030204" pitchFamily="49" charset="0"/>
+                <a:ea typeface="Courier"/>
+                <a:cs typeface="Consolas" panose="020B0609020204030204" pitchFamily="49" charset="0"/>
+                <a:sym typeface="Courier New"/>
+              </a:rPr>
+              <a:t>(</a:t>
+            </a:r>
+            <a:r>
+              <a:rPr lang="en-US" sz="1800" i="0" u="none" strike="noStrike" cap="none" dirty="0">
+                <a:latin typeface="Consolas" panose="020B0609020204030204" pitchFamily="49" charset="0"/>
+                <a:ea typeface="Courier"/>
+                <a:cs typeface="Consolas" panose="020B0609020204030204" pitchFamily="49" charset="0"/>
+                <a:sym typeface="Courier New"/>
+              </a:rPr>
+              <a:t>[ 1, [5, 6], 7]</a:t>
+            </a:r>
+            <a:r>
+              <a:rPr lang="en-US" sz="1800" dirty="0">
+                <a:latin typeface="Consolas" panose="020B0609020204030204" pitchFamily="49" charset="0"/>
+                <a:ea typeface="Courier"/>
+                <a:cs typeface="Consolas" panose="020B0609020204030204" pitchFamily="49" charset="0"/>
+                <a:sym typeface="Courier New"/>
+              </a:rPr>
+              <a:t>)</a:t>
+            </a:r>
+            <a:endParaRPr lang="en-US" sz="1800" i="0" u="none" strike="noStrike" cap="none" dirty="0">
+              <a:latin typeface="Consolas" panose="020B0609020204030204" pitchFamily="49" charset="0"/>
+              <a:ea typeface="Courier"/>
+              <a:cs typeface="Consolas" panose="020B0609020204030204" pitchFamily="49" charset="0"/>
+              <a:sym typeface="Courier New"/>
+            </a:endParaRPr>
+          </a:p>
+          <a:p>
+            <a:pPr marL="0" marR="0" lvl="0" indent="0" algn="l" rtl="0">
+              <a:lnSpc>
+                <a:spcPct val="100000"/>
+              </a:lnSpc>
+              <a:spcBef>
+                <a:spcPts val="0"/>
+              </a:spcBef>
+              <a:spcAft>
+                <a:spcPts val="0"/>
+              </a:spcAft>
+              <a:buClr>
+                <a:schemeClr val="lt1"/>
               </a:buClr>
               <a:buSzPct val="25000"/>
               <a:buFont typeface="Cabin"/>
               <a:buNone/>
             </a:pPr>
             <a:r>
-              <a:rPr lang="en-US" sz="4000" kern="0">
-                <a:latin typeface="Arial" charset="0"/>
-                <a:ea typeface="Arial" charset="0"/>
-                <a:cs typeface="Arial" charset="0"/>
-                <a:sym typeface="Cabin"/>
-              </a:rPr>
-              <a:t>2</a:t>
-            </a:r>
-          </a:p>
-        </p:txBody>
-      </p:sp>
-      <p:sp>
-        <p:nvSpPr>
-          <p:cNvPr id="15" name="Shape 222">
-            <a:extLst>
-              <a:ext uri="{FF2B5EF4-FFF2-40B4-BE49-F238E27FC236}">
-                <a16:creationId xmlns:a16="http://schemas.microsoft.com/office/drawing/2014/main" id="{C178C529-0429-316F-A68B-02A19A8432E8}"/>
-              </a:ext>
-            </a:extLst>
-          </p:cNvPr>
-          <p:cNvSpPr txBox="1"/>
-          <p:nvPr/>
-        </p:nvSpPr>
-        <p:spPr>
-          <a:xfrm>
-            <a:off x="5657850" y="3124201"/>
-            <a:ext cx="1879599" cy="736599"/>
-          </a:xfrm>
-          <a:prstGeom prst="rect">
-            <a:avLst/>
-          </a:prstGeom>
-          <a:noFill/>
-          <a:ln w="50800" cap="rnd" cmpd="sng">
-            <a:solidFill>
-              <a:srgbClr val="FF7F00"/>
-            </a:solidFill>
-            <a:prstDash val="solid"/>
-            <a:miter/>
-            <a:headEnd type="none" w="med" len="med"/>
-            <a:tailEnd type="none" w="med" len="med"/>
-          </a:ln>
-        </p:spPr>
-        <p:txBody>
-          <a:bodyPr lIns="0" tIns="0" rIns="0" bIns="0" anchor="ctr" anchorCtr="0">
-            <a:noAutofit/>
-          </a:bodyPr>
-          <a:lstStyle/>
-          <a:p>
-            <a:pPr algn="ctr">
+              <a:rPr lang="en-US" sz="1800" i="0" u="none" strike="noStrike" cap="none" dirty="0">
+                <a:latin typeface="Consolas" panose="020B0609020204030204" pitchFamily="49" charset="0"/>
+                <a:ea typeface="Courier"/>
+                <a:cs typeface="Consolas" panose="020B0609020204030204" pitchFamily="49" charset="0"/>
+                <a:sym typeface="Courier New"/>
+              </a:rPr>
+              <a:t>[1, [5, 6], 7]</a:t>
+            </a:r>
+          </a:p>
+          <a:p>
+            <a:pPr>
               <a:buClr>
-                <a:srgbClr val="FFFFFF"/>
+                <a:schemeClr val="lt1"/>
+              </a:buClr>
+              <a:buSzPct val="25000"/>
+            </a:pPr>
+            <a:r>
+              <a:rPr lang="en-US" sz="1800" i="0" u="none" strike="noStrike" cap="none" dirty="0">
+                <a:latin typeface="Consolas" panose="020B0609020204030204" pitchFamily="49" charset="0"/>
+                <a:ea typeface="Courier"/>
+                <a:cs typeface="Consolas" panose="020B0609020204030204" pitchFamily="49" charset="0"/>
+                <a:sym typeface="Courier New"/>
+              </a:rPr>
+              <a:t>&gt;&gt;&gt; print</a:t>
+            </a:r>
+            <a:r>
+              <a:rPr lang="en-US" sz="1800" dirty="0">
+                <a:latin typeface="Consolas" panose="020B0609020204030204" pitchFamily="49" charset="0"/>
+                <a:ea typeface="Courier"/>
+                <a:cs typeface="Consolas" panose="020B0609020204030204" pitchFamily="49" charset="0"/>
+                <a:sym typeface="Courier New"/>
+              </a:rPr>
+              <a:t>(</a:t>
+            </a:r>
+            <a:r>
+              <a:rPr lang="en-US" sz="1800" i="0" u="none" strike="noStrike" cap="none" dirty="0">
+                <a:latin typeface="Consolas" panose="020B0609020204030204" pitchFamily="49" charset="0"/>
+                <a:ea typeface="Courier"/>
+                <a:cs typeface="Consolas" panose="020B0609020204030204" pitchFamily="49" charset="0"/>
+                <a:sym typeface="Courier New"/>
+              </a:rPr>
+              <a:t>[]</a:t>
+            </a:r>
+            <a:r>
+              <a:rPr lang="en-US" sz="1800" dirty="0">
+                <a:latin typeface="Consolas" panose="020B0609020204030204" pitchFamily="49" charset="0"/>
+                <a:ea typeface="Courier"/>
+                <a:cs typeface="Consolas" panose="020B0609020204030204" pitchFamily="49" charset="0"/>
+                <a:sym typeface="Courier New"/>
+              </a:rPr>
+              <a:t>)</a:t>
+            </a:r>
+            <a:endParaRPr lang="en-US" sz="1800" i="0" u="none" strike="noStrike" cap="none" dirty="0">
+              <a:latin typeface="Consolas" panose="020B0609020204030204" pitchFamily="49" charset="0"/>
+              <a:ea typeface="Courier"/>
+              <a:cs typeface="Consolas" panose="020B0609020204030204" pitchFamily="49" charset="0"/>
+              <a:sym typeface="Courier New"/>
+            </a:endParaRPr>
+          </a:p>
+          <a:p>
+            <a:pPr marL="0" marR="0" lvl="0" indent="0" algn="l" rtl="0">
+              <a:lnSpc>
+                <a:spcPct val="100000"/>
+              </a:lnSpc>
+              <a:spcBef>
+                <a:spcPts val="0"/>
+              </a:spcBef>
+              <a:spcAft>
+                <a:spcPts val="0"/>
+              </a:spcAft>
+              <a:buClr>
+                <a:schemeClr val="lt1"/>
               </a:buClr>
               <a:buSzPct val="25000"/>
               <a:buFont typeface="Cabin"/>
               <a:buNone/>
             </a:pPr>
             <a:r>
-              <a:rPr lang="en-US" sz="4000" kern="0">
-                <a:latin typeface="Arial" charset="0"/>
-                <a:ea typeface="Arial" charset="0"/>
-                <a:cs typeface="Arial" charset="0"/>
-                <a:sym typeface="Cabin"/>
-              </a:rPr>
-              <a:t>Sally</a:t>
+              <a:rPr lang="en-US" sz="1800" i="0" u="none" strike="noStrike" cap="none" dirty="0">
+                <a:latin typeface="Consolas" panose="020B0609020204030204" pitchFamily="49" charset="0"/>
+                <a:ea typeface="Courier"/>
+                <a:cs typeface="Consolas" panose="020B0609020204030204" pitchFamily="49" charset="0"/>
+                <a:sym typeface="Courier New"/>
+              </a:rPr>
+              <a:t>[]</a:t>
             </a:r>
           </a:p>
         </p:txBody>
       </p:sp>
       <p:sp>
         <p:nvSpPr>
-          <p:cNvPr id="16" name="TextBox 15">
-            <a:extLst>
-              <a:ext uri="{FF2B5EF4-FFF2-40B4-BE49-F238E27FC236}">
-                <a16:creationId xmlns:a16="http://schemas.microsoft.com/office/drawing/2014/main" id="{CDCE6389-40A8-4710-F825-5D71CF18A116}"/>
+          <p:cNvPr id="6" name="TextBox 5">
+            <a:extLst>
+              <a:ext uri="{FF2B5EF4-FFF2-40B4-BE49-F238E27FC236}">
+                <a16:creationId xmlns:a16="http://schemas.microsoft.com/office/drawing/2014/main" id="{22E50FE4-1FA7-24BB-511F-8DA93F6E029D}"/>
               </a:ext>
             </a:extLst>
           </p:cNvPr>
@@ -20428,7 +20004,7 @@
     </p:spTree>
     <p:extLst>
       <p:ext uri="{BB962C8B-B14F-4D97-AF65-F5344CB8AC3E}">
-        <p14:creationId xmlns:p14="http://schemas.microsoft.com/office/powerpoint/2010/main" val="3315954267"/>
+        <p14:creationId xmlns:p14="http://schemas.microsoft.com/office/powerpoint/2010/main" val="2750883330"/>
       </p:ext>
     </p:extLst>
   </p:cSld>
@@ -20460,7 +20036,7 @@
           <p:cNvPr id="2" name="Title 1">
             <a:extLst>
               <a:ext uri="{FF2B5EF4-FFF2-40B4-BE49-F238E27FC236}">
-                <a16:creationId xmlns:a16="http://schemas.microsoft.com/office/drawing/2014/main" id="{DD4DDA11-7CC8-4E9D-488E-BC11CF031738}"/>
+                <a16:creationId xmlns:a16="http://schemas.microsoft.com/office/drawing/2014/main" id="{E0FAE9D5-8D95-15A8-C750-ACA27E3ADBB5}"/>
               </a:ext>
             </a:extLst>
           </p:cNvPr>
@@ -20477,9 +20053,10 @@
           <a:lstStyle/>
           <a:p>
             <a:r>
-              <a:rPr lang="en-CH"/>
-              <a:t>Lists can be sliced</a:t>
-            </a:r>
+              <a:rPr lang="en-GB"/>
+              <a:t>Looking Inside Lists</a:t>
+            </a:r>
+            <a:endParaRPr lang="en-CH"/>
           </a:p>
         </p:txBody>
       </p:sp>
@@ -20488,7 +20065,7 @@
           <p:cNvPr id="3" name="Content Placeholder 2">
             <a:extLst>
               <a:ext uri="{FF2B5EF4-FFF2-40B4-BE49-F238E27FC236}">
-                <a16:creationId xmlns:a16="http://schemas.microsoft.com/office/drawing/2014/main" id="{259E2623-2A8A-17DB-F8CF-1B87336E29AA}"/>
+                <a16:creationId xmlns:a16="http://schemas.microsoft.com/office/drawing/2014/main" id="{630D7DA5-0438-DECF-EB92-A2000B9D80EB}"/>
               </a:ext>
             </a:extLst>
           </p:cNvPr>
@@ -20499,128 +20076,68 @@
             <p:ph idx="1"/>
           </p:nvPr>
         </p:nvSpPr>
-        <p:spPr/>
+        <p:spPr>
+          <a:xfrm>
+            <a:off x="628650" y="1369219"/>
+            <a:ext cx="7886700" cy="1894681"/>
+          </a:xfrm>
+        </p:spPr>
         <p:txBody>
-          <a:bodyPr>
-            <a:normAutofit lnSpcReduction="10000"/>
-          </a:bodyPr>
+          <a:bodyPr/>
           <a:lstStyle/>
           <a:p>
             <a:pPr marL="0" indent="0">
               <a:buNone/>
             </a:pPr>
             <a:r>
-              <a:rPr lang="en-GB">
+              <a:rPr lang="en-GB"/>
+              <a:t>Just like strings, we can get at any single element in a list using an index specified in square brackets</a:t>
+            </a:r>
+          </a:p>
+          <a:p>
+            <a:pPr marL="0" lvl="0" indent="0">
+              <a:buNone/>
+            </a:pPr>
+            <a:r>
+              <a:rPr lang="en-GB" sz="1800">
                 <a:latin typeface="Consolas" panose="020B0609020204030204" pitchFamily="49" charset="0"/>
                 <a:cs typeface="Consolas" panose="020B0609020204030204" pitchFamily="49" charset="0"/>
               </a:rPr>
-              <a:t>&gt;&gt;&gt; t = [9, 41, 12, 3, 74, 15]</a:t>
-            </a:r>
-          </a:p>
-          <a:p>
-            <a:pPr marL="0" indent="0">
+              <a:t>&gt;&gt;&gt; friends = [ 'Joseph', 'Glenn', 'Sally' ]</a:t>
+            </a:r>
+          </a:p>
+          <a:p>
+            <a:pPr marL="0" lvl="0" indent="0">
               <a:buNone/>
             </a:pPr>
             <a:r>
-              <a:rPr lang="en-GB">
+              <a:rPr lang="en-GB" sz="1800">
                 <a:latin typeface="Consolas" panose="020B0609020204030204" pitchFamily="49" charset="0"/>
                 <a:cs typeface="Consolas" panose="020B0609020204030204" pitchFamily="49" charset="0"/>
               </a:rPr>
-              <a:t>&gt;&gt;&gt; t[1:3]</a:t>
-            </a:r>
-          </a:p>
-          <a:p>
-            <a:pPr marL="0" indent="0">
+              <a:t>&gt;&gt;&gt; print(friends[1])</a:t>
+            </a:r>
+          </a:p>
+          <a:p>
+            <a:pPr marL="0" lvl="0" indent="0">
               <a:buNone/>
             </a:pPr>
             <a:r>
-              <a:rPr lang="en-GB">
+              <a:rPr lang="en-GB" sz="1800">
                 <a:latin typeface="Consolas" panose="020B0609020204030204" pitchFamily="49" charset="0"/>
                 <a:cs typeface="Consolas" panose="020B0609020204030204" pitchFamily="49" charset="0"/>
               </a:rPr>
-              <a:t>[41,12]</a:t>
-            </a:r>
-          </a:p>
-          <a:p>
-            <a:pPr marL="0" indent="0">
-              <a:buNone/>
-            </a:pPr>
-            <a:r>
-              <a:rPr lang="en-GB">
-                <a:latin typeface="Consolas" panose="020B0609020204030204" pitchFamily="49" charset="0"/>
-                <a:cs typeface="Consolas" panose="020B0609020204030204" pitchFamily="49" charset="0"/>
-              </a:rPr>
-              <a:t>&gt;&gt;&gt; t[:4]</a:t>
-            </a:r>
-          </a:p>
-          <a:p>
-            <a:pPr marL="0" indent="0">
-              <a:buNone/>
-            </a:pPr>
-            <a:r>
-              <a:rPr lang="en-GB">
-                <a:latin typeface="Consolas" panose="020B0609020204030204" pitchFamily="49" charset="0"/>
-                <a:cs typeface="Consolas" panose="020B0609020204030204" pitchFamily="49" charset="0"/>
-              </a:rPr>
-              <a:t>[9, 41, 12, 3]</a:t>
-            </a:r>
-          </a:p>
-          <a:p>
-            <a:pPr marL="0" indent="0">
-              <a:buNone/>
-            </a:pPr>
-            <a:r>
-              <a:rPr lang="en-GB">
-                <a:latin typeface="Consolas" panose="020B0609020204030204" pitchFamily="49" charset="0"/>
-                <a:cs typeface="Consolas" panose="020B0609020204030204" pitchFamily="49" charset="0"/>
-              </a:rPr>
-              <a:t>&gt;&gt;&gt; t[3:]</a:t>
-            </a:r>
-          </a:p>
-          <a:p>
-            <a:pPr marL="0" indent="0">
-              <a:buNone/>
-            </a:pPr>
-            <a:r>
-              <a:rPr lang="en-GB">
-                <a:latin typeface="Consolas" panose="020B0609020204030204" pitchFamily="49" charset="0"/>
-                <a:cs typeface="Consolas" panose="020B0609020204030204" pitchFamily="49" charset="0"/>
-              </a:rPr>
-              <a:t>[3, 74, 15]</a:t>
-            </a:r>
-          </a:p>
-          <a:p>
-            <a:pPr marL="0" indent="0">
-              <a:buNone/>
-            </a:pPr>
-            <a:r>
-              <a:rPr lang="en-GB">
-                <a:latin typeface="Consolas" panose="020B0609020204030204" pitchFamily="49" charset="0"/>
-                <a:cs typeface="Consolas" panose="020B0609020204030204" pitchFamily="49" charset="0"/>
-              </a:rPr>
-              <a:t>&gt;&gt;&gt; t[:]</a:t>
-            </a:r>
-          </a:p>
-          <a:p>
-            <a:pPr marL="0" indent="0">
-              <a:buNone/>
-            </a:pPr>
-            <a:r>
-              <a:rPr lang="en-GB">
-                <a:latin typeface="Consolas" panose="020B0609020204030204" pitchFamily="49" charset="0"/>
-                <a:cs typeface="Consolas" panose="020B0609020204030204" pitchFamily="49" charset="0"/>
-              </a:rPr>
-              <a:t>[9, 41, 12, 3, 74, 15]</a:t>
+              <a:t>Glenn</a:t>
             </a:r>
           </a:p>
         </p:txBody>
       </p:sp>
       <p:sp>
         <p:nvSpPr>
-          <p:cNvPr id="7" name="Shape 265">
-            <a:extLst>
-              <a:ext uri="{FF2B5EF4-FFF2-40B4-BE49-F238E27FC236}">
-                <a16:creationId xmlns:a16="http://schemas.microsoft.com/office/drawing/2014/main" id="{893BE3C1-3245-9A44-16E1-8E8A366D51B1}"/>
+          <p:cNvPr id="10" name="Shape 216">
+            <a:extLst>
+              <a:ext uri="{FF2B5EF4-FFF2-40B4-BE49-F238E27FC236}">
+                <a16:creationId xmlns:a16="http://schemas.microsoft.com/office/drawing/2014/main" id="{BD8E032E-D043-FDA2-B66E-8DEEFDFA8EB0}"/>
               </a:ext>
             </a:extLst>
           </p:cNvPr>
@@ -20629,8 +20146,8 @@
         </p:nvSpPr>
         <p:spPr>
           <a:xfrm>
-            <a:off x="5852425" y="1785525"/>
-            <a:ext cx="2777225" cy="2197200"/>
+            <a:off x="2470150" y="3848101"/>
+            <a:ext cx="736599" cy="736599"/>
           </a:xfrm>
           <a:prstGeom prst="rect">
             <a:avLst/>
@@ -20646,32 +20163,305 @@
           </a:bodyPr>
           <a:lstStyle/>
           <a:p>
-            <a:pPr>
+            <a:pPr algn="ctr">
               <a:buClr>
-                <a:srgbClr val="00FF00"/>
+                <a:srgbClr val="FFFFFF"/>
               </a:buClr>
               <a:buSzPct val="25000"/>
               <a:buFont typeface="Cabin"/>
               <a:buNone/>
             </a:pPr>
             <a:r>
-              <a:rPr lang="en-US" sz="2000" kern="0">
+              <a:rPr lang="en-US" sz="4000" kern="0">
                 <a:latin typeface="Arial" charset="0"/>
                 <a:ea typeface="Arial" charset="0"/>
                 <a:cs typeface="Arial" charset="0"/>
                 <a:sym typeface="Cabin"/>
               </a:rPr>
-              <a:t>Remember:  Just like in strings, the second number is “up to but not including”</a:t>
+              <a:t>0</a:t>
             </a:r>
           </a:p>
         </p:txBody>
       </p:sp>
       <p:sp>
         <p:nvSpPr>
-          <p:cNvPr id="8" name="TextBox 7">
-            <a:extLst>
-              <a:ext uri="{FF2B5EF4-FFF2-40B4-BE49-F238E27FC236}">
-                <a16:creationId xmlns:a16="http://schemas.microsoft.com/office/drawing/2014/main" id="{9F15D308-FD42-9A64-30C4-0C03B32F5EF5}"/>
+          <p:cNvPr id="11" name="Shape 217">
+            <a:extLst>
+              <a:ext uri="{FF2B5EF4-FFF2-40B4-BE49-F238E27FC236}">
+                <a16:creationId xmlns:a16="http://schemas.microsoft.com/office/drawing/2014/main" id="{980A9EB5-A172-192D-75EE-4662F4534906}"/>
+              </a:ext>
+            </a:extLst>
+          </p:cNvPr>
+          <p:cNvSpPr txBox="1"/>
+          <p:nvPr/>
+        </p:nvSpPr>
+        <p:spPr>
+          <a:xfrm>
+            <a:off x="1898650" y="3124201"/>
+            <a:ext cx="1879599" cy="736599"/>
+          </a:xfrm>
+          <a:prstGeom prst="rect">
+            <a:avLst/>
+          </a:prstGeom>
+          <a:noFill/>
+          <a:ln w="50800" cap="rnd" cmpd="sng">
+            <a:solidFill>
+              <a:srgbClr val="FF7F00"/>
+            </a:solidFill>
+            <a:prstDash val="solid"/>
+            <a:miter/>
+            <a:headEnd type="none" w="med" len="med"/>
+            <a:tailEnd type="none" w="med" len="med"/>
+          </a:ln>
+        </p:spPr>
+        <p:txBody>
+          <a:bodyPr lIns="0" tIns="0" rIns="0" bIns="0" anchor="ctr" anchorCtr="0">
+            <a:noAutofit/>
+          </a:bodyPr>
+          <a:lstStyle/>
+          <a:p>
+            <a:pPr algn="ctr">
+              <a:buClr>
+                <a:srgbClr val="FFFFFF"/>
+              </a:buClr>
+              <a:buSzPct val="25000"/>
+              <a:buFont typeface="Cabin"/>
+              <a:buNone/>
+            </a:pPr>
+            <a:r>
+              <a:rPr lang="en-US" sz="4000" kern="0">
+                <a:latin typeface="Arial" charset="0"/>
+                <a:ea typeface="Arial" charset="0"/>
+                <a:cs typeface="Arial" charset="0"/>
+                <a:sym typeface="Cabin"/>
+              </a:rPr>
+              <a:t>Joseph</a:t>
+            </a:r>
+          </a:p>
+        </p:txBody>
+      </p:sp>
+      <p:sp>
+        <p:nvSpPr>
+          <p:cNvPr id="12" name="Shape 219">
+            <a:extLst>
+              <a:ext uri="{FF2B5EF4-FFF2-40B4-BE49-F238E27FC236}">
+                <a16:creationId xmlns:a16="http://schemas.microsoft.com/office/drawing/2014/main" id="{8741831B-FB43-BF4A-36C6-1A911B4A7E98}"/>
+              </a:ext>
+            </a:extLst>
+          </p:cNvPr>
+          <p:cNvSpPr txBox="1"/>
+          <p:nvPr/>
+        </p:nvSpPr>
+        <p:spPr>
+          <a:xfrm>
+            <a:off x="4349750" y="3848101"/>
+            <a:ext cx="736599" cy="736599"/>
+          </a:xfrm>
+          <a:prstGeom prst="rect">
+            <a:avLst/>
+          </a:prstGeom>
+          <a:noFill/>
+          <a:ln>
+            <a:noFill/>
+          </a:ln>
+        </p:spPr>
+        <p:txBody>
+          <a:bodyPr lIns="0" tIns="0" rIns="0" bIns="0" anchor="ctr" anchorCtr="0">
+            <a:noAutofit/>
+          </a:bodyPr>
+          <a:lstStyle/>
+          <a:p>
+            <a:pPr algn="ctr">
+              <a:buClr>
+                <a:srgbClr val="FFFFFF"/>
+              </a:buClr>
+              <a:buSzPct val="25000"/>
+              <a:buFont typeface="Cabin"/>
+              <a:buNone/>
+            </a:pPr>
+            <a:r>
+              <a:rPr lang="en-US" sz="4000" kern="0">
+                <a:latin typeface="Arial" charset="0"/>
+                <a:ea typeface="Arial" charset="0"/>
+                <a:cs typeface="Arial" charset="0"/>
+                <a:sym typeface="Cabin"/>
+              </a:rPr>
+              <a:t>1</a:t>
+            </a:r>
+          </a:p>
+        </p:txBody>
+      </p:sp>
+      <p:sp>
+        <p:nvSpPr>
+          <p:cNvPr id="13" name="Shape 220">
+            <a:extLst>
+              <a:ext uri="{FF2B5EF4-FFF2-40B4-BE49-F238E27FC236}">
+                <a16:creationId xmlns:a16="http://schemas.microsoft.com/office/drawing/2014/main" id="{B26129BF-CCCB-E451-433D-3A716A081B4B}"/>
+              </a:ext>
+            </a:extLst>
+          </p:cNvPr>
+          <p:cNvSpPr txBox="1"/>
+          <p:nvPr/>
+        </p:nvSpPr>
+        <p:spPr>
+          <a:xfrm>
+            <a:off x="3778250" y="3124201"/>
+            <a:ext cx="1879599" cy="736599"/>
+          </a:xfrm>
+          <a:prstGeom prst="rect">
+            <a:avLst/>
+          </a:prstGeom>
+          <a:noFill/>
+          <a:ln w="50800" cap="rnd" cmpd="sng">
+            <a:solidFill>
+              <a:srgbClr val="FF7F00"/>
+            </a:solidFill>
+            <a:prstDash val="solid"/>
+            <a:miter/>
+            <a:headEnd type="none" w="med" len="med"/>
+            <a:tailEnd type="none" w="med" len="med"/>
+          </a:ln>
+        </p:spPr>
+        <p:txBody>
+          <a:bodyPr lIns="0" tIns="0" rIns="0" bIns="0" anchor="ctr" anchorCtr="0">
+            <a:noAutofit/>
+          </a:bodyPr>
+          <a:lstStyle/>
+          <a:p>
+            <a:pPr algn="ctr">
+              <a:buClr>
+                <a:srgbClr val="FFFFFF"/>
+              </a:buClr>
+              <a:buSzPct val="25000"/>
+              <a:buFont typeface="Cabin"/>
+              <a:buNone/>
+            </a:pPr>
+            <a:r>
+              <a:rPr lang="en-US" sz="4000" kern="0">
+                <a:latin typeface="Arial" charset="0"/>
+                <a:ea typeface="Arial" charset="0"/>
+                <a:cs typeface="Arial" charset="0"/>
+                <a:sym typeface="Cabin"/>
+              </a:rPr>
+              <a:t>Glenn</a:t>
+            </a:r>
+          </a:p>
+        </p:txBody>
+      </p:sp>
+      <p:sp>
+        <p:nvSpPr>
+          <p:cNvPr id="14" name="Shape 221">
+            <a:extLst>
+              <a:ext uri="{FF2B5EF4-FFF2-40B4-BE49-F238E27FC236}">
+                <a16:creationId xmlns:a16="http://schemas.microsoft.com/office/drawing/2014/main" id="{F9581F0B-399F-AC09-15E8-01A4C9D34BA1}"/>
+              </a:ext>
+            </a:extLst>
+          </p:cNvPr>
+          <p:cNvSpPr txBox="1"/>
+          <p:nvPr/>
+        </p:nvSpPr>
+        <p:spPr>
+          <a:xfrm>
+            <a:off x="6229350" y="3848101"/>
+            <a:ext cx="736599" cy="736599"/>
+          </a:xfrm>
+          <a:prstGeom prst="rect">
+            <a:avLst/>
+          </a:prstGeom>
+          <a:noFill/>
+          <a:ln>
+            <a:noFill/>
+          </a:ln>
+        </p:spPr>
+        <p:txBody>
+          <a:bodyPr lIns="0" tIns="0" rIns="0" bIns="0" anchor="ctr" anchorCtr="0">
+            <a:noAutofit/>
+          </a:bodyPr>
+          <a:lstStyle/>
+          <a:p>
+            <a:pPr algn="ctr">
+              <a:buClr>
+                <a:srgbClr val="FFFFFF"/>
+              </a:buClr>
+              <a:buSzPct val="25000"/>
+              <a:buFont typeface="Cabin"/>
+              <a:buNone/>
+            </a:pPr>
+            <a:r>
+              <a:rPr lang="en-US" sz="4000" kern="0">
+                <a:latin typeface="Arial" charset="0"/>
+                <a:ea typeface="Arial" charset="0"/>
+                <a:cs typeface="Arial" charset="0"/>
+                <a:sym typeface="Cabin"/>
+              </a:rPr>
+              <a:t>2</a:t>
+            </a:r>
+          </a:p>
+        </p:txBody>
+      </p:sp>
+      <p:sp>
+        <p:nvSpPr>
+          <p:cNvPr id="15" name="Shape 222">
+            <a:extLst>
+              <a:ext uri="{FF2B5EF4-FFF2-40B4-BE49-F238E27FC236}">
+                <a16:creationId xmlns:a16="http://schemas.microsoft.com/office/drawing/2014/main" id="{C178C529-0429-316F-A68B-02A19A8432E8}"/>
+              </a:ext>
+            </a:extLst>
+          </p:cNvPr>
+          <p:cNvSpPr txBox="1"/>
+          <p:nvPr/>
+        </p:nvSpPr>
+        <p:spPr>
+          <a:xfrm>
+            <a:off x="5657850" y="3124201"/>
+            <a:ext cx="1879599" cy="736599"/>
+          </a:xfrm>
+          <a:prstGeom prst="rect">
+            <a:avLst/>
+          </a:prstGeom>
+          <a:noFill/>
+          <a:ln w="50800" cap="rnd" cmpd="sng">
+            <a:solidFill>
+              <a:srgbClr val="FF7F00"/>
+            </a:solidFill>
+            <a:prstDash val="solid"/>
+            <a:miter/>
+            <a:headEnd type="none" w="med" len="med"/>
+            <a:tailEnd type="none" w="med" len="med"/>
+          </a:ln>
+        </p:spPr>
+        <p:txBody>
+          <a:bodyPr lIns="0" tIns="0" rIns="0" bIns="0" anchor="ctr" anchorCtr="0">
+            <a:noAutofit/>
+          </a:bodyPr>
+          <a:lstStyle/>
+          <a:p>
+            <a:pPr algn="ctr">
+              <a:buClr>
+                <a:srgbClr val="FFFFFF"/>
+              </a:buClr>
+              <a:buSzPct val="25000"/>
+              <a:buFont typeface="Cabin"/>
+              <a:buNone/>
+            </a:pPr>
+            <a:r>
+              <a:rPr lang="en-US" sz="4000" kern="0">
+                <a:latin typeface="Arial" charset="0"/>
+                <a:ea typeface="Arial" charset="0"/>
+                <a:cs typeface="Arial" charset="0"/>
+                <a:sym typeface="Cabin"/>
+              </a:rPr>
+              <a:t>Sally</a:t>
+            </a:r>
+          </a:p>
+        </p:txBody>
+      </p:sp>
+      <p:sp>
+        <p:nvSpPr>
+          <p:cNvPr id="16" name="TextBox 15">
+            <a:extLst>
+              <a:ext uri="{FF2B5EF4-FFF2-40B4-BE49-F238E27FC236}">
+                <a16:creationId xmlns:a16="http://schemas.microsoft.com/office/drawing/2014/main" id="{CDCE6389-40A8-4710-F825-5D71CF18A116}"/>
               </a:ext>
             </a:extLst>
           </p:cNvPr>
@@ -20708,7 +20498,7 @@
     </p:spTree>
     <p:extLst>
       <p:ext uri="{BB962C8B-B14F-4D97-AF65-F5344CB8AC3E}">
-        <p14:creationId xmlns:p14="http://schemas.microsoft.com/office/powerpoint/2010/main" val="3791426424"/>
+        <p14:creationId xmlns:p14="http://schemas.microsoft.com/office/powerpoint/2010/main" val="3315954267"/>
       </p:ext>
     </p:extLst>
   </p:cSld>
@@ -20740,6 +20530,286 @@
           <p:cNvPr id="2" name="Title 1">
             <a:extLst>
               <a:ext uri="{FF2B5EF4-FFF2-40B4-BE49-F238E27FC236}">
+                <a16:creationId xmlns:a16="http://schemas.microsoft.com/office/drawing/2014/main" id="{DD4DDA11-7CC8-4E9D-488E-BC11CF031738}"/>
+              </a:ext>
+            </a:extLst>
+          </p:cNvPr>
+          <p:cNvSpPr>
+            <a:spLocks noGrp="1"/>
+          </p:cNvSpPr>
+          <p:nvPr>
+            <p:ph type="title"/>
+          </p:nvPr>
+        </p:nvSpPr>
+        <p:spPr/>
+        <p:txBody>
+          <a:bodyPr/>
+          <a:lstStyle/>
+          <a:p>
+            <a:r>
+              <a:rPr lang="en-CH"/>
+              <a:t>Lists can be sliced</a:t>
+            </a:r>
+          </a:p>
+        </p:txBody>
+      </p:sp>
+      <p:sp>
+        <p:nvSpPr>
+          <p:cNvPr id="3" name="Content Placeholder 2">
+            <a:extLst>
+              <a:ext uri="{FF2B5EF4-FFF2-40B4-BE49-F238E27FC236}">
+                <a16:creationId xmlns:a16="http://schemas.microsoft.com/office/drawing/2014/main" id="{259E2623-2A8A-17DB-F8CF-1B87336E29AA}"/>
+              </a:ext>
+            </a:extLst>
+          </p:cNvPr>
+          <p:cNvSpPr>
+            <a:spLocks noGrp="1"/>
+          </p:cNvSpPr>
+          <p:nvPr>
+            <p:ph idx="1"/>
+          </p:nvPr>
+        </p:nvSpPr>
+        <p:spPr/>
+        <p:txBody>
+          <a:bodyPr>
+            <a:normAutofit lnSpcReduction="10000"/>
+          </a:bodyPr>
+          <a:lstStyle/>
+          <a:p>
+            <a:pPr marL="0" indent="0">
+              <a:buNone/>
+            </a:pPr>
+            <a:r>
+              <a:rPr lang="en-GB">
+                <a:latin typeface="Consolas" panose="020B0609020204030204" pitchFamily="49" charset="0"/>
+                <a:cs typeface="Consolas" panose="020B0609020204030204" pitchFamily="49" charset="0"/>
+              </a:rPr>
+              <a:t>&gt;&gt;&gt; t = [9, 41, 12, 3, 74, 15]</a:t>
+            </a:r>
+          </a:p>
+          <a:p>
+            <a:pPr marL="0" indent="0">
+              <a:buNone/>
+            </a:pPr>
+            <a:r>
+              <a:rPr lang="en-GB">
+                <a:latin typeface="Consolas" panose="020B0609020204030204" pitchFamily="49" charset="0"/>
+                <a:cs typeface="Consolas" panose="020B0609020204030204" pitchFamily="49" charset="0"/>
+              </a:rPr>
+              <a:t>&gt;&gt;&gt; t[1:3]</a:t>
+            </a:r>
+          </a:p>
+          <a:p>
+            <a:pPr marL="0" indent="0">
+              <a:buNone/>
+            </a:pPr>
+            <a:r>
+              <a:rPr lang="en-GB">
+                <a:latin typeface="Consolas" panose="020B0609020204030204" pitchFamily="49" charset="0"/>
+                <a:cs typeface="Consolas" panose="020B0609020204030204" pitchFamily="49" charset="0"/>
+              </a:rPr>
+              <a:t>[41,12]</a:t>
+            </a:r>
+          </a:p>
+          <a:p>
+            <a:pPr marL="0" indent="0">
+              <a:buNone/>
+            </a:pPr>
+            <a:r>
+              <a:rPr lang="en-GB">
+                <a:latin typeface="Consolas" panose="020B0609020204030204" pitchFamily="49" charset="0"/>
+                <a:cs typeface="Consolas" panose="020B0609020204030204" pitchFamily="49" charset="0"/>
+              </a:rPr>
+              <a:t>&gt;&gt;&gt; t[:4]</a:t>
+            </a:r>
+          </a:p>
+          <a:p>
+            <a:pPr marL="0" indent="0">
+              <a:buNone/>
+            </a:pPr>
+            <a:r>
+              <a:rPr lang="en-GB">
+                <a:latin typeface="Consolas" panose="020B0609020204030204" pitchFamily="49" charset="0"/>
+                <a:cs typeface="Consolas" panose="020B0609020204030204" pitchFamily="49" charset="0"/>
+              </a:rPr>
+              <a:t>[9, 41, 12, 3]</a:t>
+            </a:r>
+          </a:p>
+          <a:p>
+            <a:pPr marL="0" indent="0">
+              <a:buNone/>
+            </a:pPr>
+            <a:r>
+              <a:rPr lang="en-GB">
+                <a:latin typeface="Consolas" panose="020B0609020204030204" pitchFamily="49" charset="0"/>
+                <a:cs typeface="Consolas" panose="020B0609020204030204" pitchFamily="49" charset="0"/>
+              </a:rPr>
+              <a:t>&gt;&gt;&gt; t[3:]</a:t>
+            </a:r>
+          </a:p>
+          <a:p>
+            <a:pPr marL="0" indent="0">
+              <a:buNone/>
+            </a:pPr>
+            <a:r>
+              <a:rPr lang="en-GB">
+                <a:latin typeface="Consolas" panose="020B0609020204030204" pitchFamily="49" charset="0"/>
+                <a:cs typeface="Consolas" panose="020B0609020204030204" pitchFamily="49" charset="0"/>
+              </a:rPr>
+              <a:t>[3, 74, 15]</a:t>
+            </a:r>
+          </a:p>
+          <a:p>
+            <a:pPr marL="0" indent="0">
+              <a:buNone/>
+            </a:pPr>
+            <a:r>
+              <a:rPr lang="en-GB">
+                <a:latin typeface="Consolas" panose="020B0609020204030204" pitchFamily="49" charset="0"/>
+                <a:cs typeface="Consolas" panose="020B0609020204030204" pitchFamily="49" charset="0"/>
+              </a:rPr>
+              <a:t>&gt;&gt;&gt; t[:]</a:t>
+            </a:r>
+          </a:p>
+          <a:p>
+            <a:pPr marL="0" indent="0">
+              <a:buNone/>
+            </a:pPr>
+            <a:r>
+              <a:rPr lang="en-GB">
+                <a:latin typeface="Consolas" panose="020B0609020204030204" pitchFamily="49" charset="0"/>
+                <a:cs typeface="Consolas" panose="020B0609020204030204" pitchFamily="49" charset="0"/>
+              </a:rPr>
+              <a:t>[9, 41, 12, 3, 74, 15]</a:t>
+            </a:r>
+          </a:p>
+        </p:txBody>
+      </p:sp>
+      <p:sp>
+        <p:nvSpPr>
+          <p:cNvPr id="7" name="Shape 265">
+            <a:extLst>
+              <a:ext uri="{FF2B5EF4-FFF2-40B4-BE49-F238E27FC236}">
+                <a16:creationId xmlns:a16="http://schemas.microsoft.com/office/drawing/2014/main" id="{893BE3C1-3245-9A44-16E1-8E8A366D51B1}"/>
+              </a:ext>
+            </a:extLst>
+          </p:cNvPr>
+          <p:cNvSpPr txBox="1"/>
+          <p:nvPr/>
+        </p:nvSpPr>
+        <p:spPr>
+          <a:xfrm>
+            <a:off x="5852425" y="1785525"/>
+            <a:ext cx="2777225" cy="2197200"/>
+          </a:xfrm>
+          <a:prstGeom prst="rect">
+            <a:avLst/>
+          </a:prstGeom>
+          <a:noFill/>
+          <a:ln>
+            <a:noFill/>
+          </a:ln>
+        </p:spPr>
+        <p:txBody>
+          <a:bodyPr lIns="0" tIns="0" rIns="0" bIns="0" anchor="ctr" anchorCtr="0">
+            <a:noAutofit/>
+          </a:bodyPr>
+          <a:lstStyle/>
+          <a:p>
+            <a:pPr>
+              <a:buClr>
+                <a:srgbClr val="00FF00"/>
+              </a:buClr>
+              <a:buSzPct val="25000"/>
+              <a:buFont typeface="Cabin"/>
+              <a:buNone/>
+            </a:pPr>
+            <a:r>
+              <a:rPr lang="en-US" sz="2000" kern="0">
+                <a:latin typeface="Arial" charset="0"/>
+                <a:ea typeface="Arial" charset="0"/>
+                <a:cs typeface="Arial" charset="0"/>
+                <a:sym typeface="Cabin"/>
+              </a:rPr>
+              <a:t>Remember:  Just like in strings, the second number is “up to but not including”</a:t>
+            </a:r>
+          </a:p>
+        </p:txBody>
+      </p:sp>
+      <p:sp>
+        <p:nvSpPr>
+          <p:cNvPr id="8" name="TextBox 7">
+            <a:extLst>
+              <a:ext uri="{FF2B5EF4-FFF2-40B4-BE49-F238E27FC236}">
+                <a16:creationId xmlns:a16="http://schemas.microsoft.com/office/drawing/2014/main" id="{9F15D308-FD42-9A64-30C4-0C03B32F5EF5}"/>
+              </a:ext>
+            </a:extLst>
+          </p:cNvPr>
+          <p:cNvSpPr txBox="1"/>
+          <p:nvPr/>
+        </p:nvSpPr>
+        <p:spPr>
+          <a:xfrm>
+            <a:off x="7162800" y="4866501"/>
+            <a:ext cx="2108200" cy="276999"/>
+          </a:xfrm>
+          <a:prstGeom prst="rect">
+            <a:avLst/>
+          </a:prstGeom>
+          <a:noFill/>
+        </p:spPr>
+        <p:txBody>
+          <a:bodyPr wrap="square" rtlCol="0">
+            <a:spAutoFit/>
+          </a:bodyPr>
+          <a:lstStyle/>
+          <a:p>
+            <a:r>
+              <a:rPr lang="en-CH" sz="1200"/>
+              <a:t>Adapted from </a:t>
+            </a:r>
+            <a:r>
+              <a:rPr lang="en-GB" sz="1200"/>
+              <a:t>www.py4e.com</a:t>
+            </a:r>
+          </a:p>
+        </p:txBody>
+      </p:sp>
+    </p:spTree>
+    <p:extLst>
+      <p:ext uri="{BB962C8B-B14F-4D97-AF65-F5344CB8AC3E}">
+        <p14:creationId xmlns:p14="http://schemas.microsoft.com/office/powerpoint/2010/main" val="3791426424"/>
+      </p:ext>
+    </p:extLst>
+  </p:cSld>
+  <p:clrMapOvr>
+    <a:masterClrMapping/>
+  </p:clrMapOvr>
+</p:sld>
+</file>
+
+<file path=ppt/slides/slide33.xml><?xml version="1.0" encoding="utf-8"?>
+<p:sld xmlns:a="http://schemas.openxmlformats.org/drawingml/2006/main" xmlns:r="http://schemas.openxmlformats.org/officeDocument/2006/relationships" xmlns:p="http://schemas.openxmlformats.org/presentationml/2006/main">
+  <p:cSld>
+    <p:spTree>
+      <p:nvGrpSpPr>
+        <p:cNvPr id="1" name=""/>
+        <p:cNvGrpSpPr/>
+        <p:nvPr/>
+      </p:nvGrpSpPr>
+      <p:grpSpPr>
+        <a:xfrm>
+          <a:off x="0" y="0"/>
+          <a:ext cx="0" cy="0"/>
+          <a:chOff x="0" y="0"/>
+          <a:chExt cx="0" cy="0"/>
+        </a:xfrm>
+      </p:grpSpPr>
+      <p:sp>
+        <p:nvSpPr>
+          <p:cNvPr id="2" name="Title 1">
+            <a:extLst>
+              <a:ext uri="{FF2B5EF4-FFF2-40B4-BE49-F238E27FC236}">
                 <a16:creationId xmlns:a16="http://schemas.microsoft.com/office/drawing/2014/main" id="{8768BC3F-5D5A-95D9-872B-FB44887D1B7C}"/>
               </a:ext>
             </a:extLst>
@@ -20888,7 +20958,7 @@
 </p:sld>
 </file>
 
-<file path=ppt/slides/slide33.xml><?xml version="1.0" encoding="utf-8"?>
+<file path=ppt/slides/slide34.xml><?xml version="1.0" encoding="utf-8"?>
 <p:sld xmlns:a="http://schemas.openxmlformats.org/drawingml/2006/main" xmlns:r="http://schemas.openxmlformats.org/officeDocument/2006/relationships" xmlns:p="http://schemas.openxmlformats.org/presentationml/2006/main">
   <p:cSld>
     <p:spTree>
@@ -21158,7 +21228,167 @@
 </p:sld>
 </file>
 
-<file path=ppt/slides/slide34.xml><?xml version="1.0" encoding="utf-8"?>
+<file path=ppt/slides/slide35.xml><?xml version="1.0" encoding="utf-8"?>
+<p:sld xmlns:a="http://schemas.openxmlformats.org/drawingml/2006/main" xmlns:r="http://schemas.openxmlformats.org/officeDocument/2006/relationships" xmlns:p="http://schemas.openxmlformats.org/presentationml/2006/main">
+  <p:cSld>
+    <p:spTree>
+      <p:nvGrpSpPr>
+        <p:cNvPr id="1" name=""/>
+        <p:cNvGrpSpPr/>
+        <p:nvPr/>
+      </p:nvGrpSpPr>
+      <p:grpSpPr>
+        <a:xfrm>
+          <a:off x="0" y="0"/>
+          <a:ext cx="0" cy="0"/>
+          <a:chOff x="0" y="0"/>
+          <a:chExt cx="0" cy="0"/>
+        </a:xfrm>
+      </p:grpSpPr>
+      <p:sp>
+        <p:nvSpPr>
+          <p:cNvPr id="2" name="Title 1">
+            <a:extLst>
+              <a:ext uri="{FF2B5EF4-FFF2-40B4-BE49-F238E27FC236}">
+                <a16:creationId xmlns:a16="http://schemas.microsoft.com/office/drawing/2014/main" id="{28BB1898-D4C0-DDC0-ED0F-A6E22986C95A}"/>
+              </a:ext>
+            </a:extLst>
+          </p:cNvPr>
+          <p:cNvSpPr>
+            <a:spLocks noGrp="1"/>
+          </p:cNvSpPr>
+          <p:nvPr>
+            <p:ph type="title"/>
+          </p:nvPr>
+        </p:nvSpPr>
+        <p:spPr/>
+        <p:txBody>
+          <a:bodyPr/>
+          <a:lstStyle/>
+          <a:p>
+            <a:r>
+              <a:rPr lang="en-CH"/>
+              <a:t>Problems with plain Python and lists</a:t>
+            </a:r>
+          </a:p>
+        </p:txBody>
+      </p:sp>
+      <p:sp>
+        <p:nvSpPr>
+          <p:cNvPr id="3" name="Content Placeholder 2">
+            <a:extLst>
+              <a:ext uri="{FF2B5EF4-FFF2-40B4-BE49-F238E27FC236}">
+                <a16:creationId xmlns:a16="http://schemas.microsoft.com/office/drawing/2014/main" id="{AD7C655E-B13C-B3FE-F61D-B2CFEC85DB00}"/>
+              </a:ext>
+            </a:extLst>
+          </p:cNvPr>
+          <p:cNvSpPr>
+            <a:spLocks noGrp="1"/>
+          </p:cNvSpPr>
+          <p:nvPr>
+            <p:ph idx="1"/>
+          </p:nvPr>
+        </p:nvSpPr>
+        <p:spPr/>
+        <p:txBody>
+          <a:bodyPr/>
+          <a:lstStyle/>
+          <a:p>
+            <a:r>
+              <a:rPr lang="en-GB"/>
+              <a:t>L</a:t>
+            </a:r>
+            <a:r>
+              <a:rPr lang="en-CH"/>
+              <a:t>ists does not behave like mathematical objects…</a:t>
+            </a:r>
+          </a:p>
+          <a:p>
+            <a:pPr marL="0" indent="0">
+              <a:buNone/>
+            </a:pPr>
+            <a:endParaRPr lang="en-CH"/>
+          </a:p>
+          <a:p>
+            <a:pPr marL="0" indent="0">
+              <a:buNone/>
+            </a:pPr>
+            <a:r>
+              <a:rPr lang="en-CH"/>
+              <a:t>Example:</a:t>
+            </a:r>
+          </a:p>
+          <a:p>
+            <a:pPr marL="0" indent="0">
+              <a:buNone/>
+            </a:pPr>
+            <a:r>
+              <a:rPr lang="en-GB">
+                <a:latin typeface="Consolas" panose="020B0609020204030204" pitchFamily="49" charset="0"/>
+                <a:cs typeface="Consolas" panose="020B0609020204030204" pitchFamily="49" charset="0"/>
+              </a:rPr>
+              <a:t>a = [1, 2, 3, 4]</a:t>
+            </a:r>
+          </a:p>
+          <a:p>
+            <a:pPr marL="0" indent="0">
+              <a:buNone/>
+            </a:pPr>
+            <a:r>
+              <a:rPr lang="en-GB">
+                <a:latin typeface="Consolas" panose="020B0609020204030204" pitchFamily="49" charset="0"/>
+                <a:cs typeface="Consolas" panose="020B0609020204030204" pitchFamily="49" charset="0"/>
+              </a:rPr>
+              <a:t>b = [5, 6, 7, 8]</a:t>
+            </a:r>
+          </a:p>
+          <a:p>
+            <a:pPr marL="0" indent="0">
+              <a:buNone/>
+            </a:pPr>
+            <a:r>
+              <a:rPr lang="en-GB">
+                <a:latin typeface="Consolas" panose="020B0609020204030204" pitchFamily="49" charset="0"/>
+                <a:cs typeface="Consolas" panose="020B0609020204030204" pitchFamily="49" charset="0"/>
+              </a:rPr>
+              <a:t>a+b</a:t>
+            </a:r>
+          </a:p>
+          <a:p>
+            <a:pPr marL="0" indent="0">
+              <a:buNone/>
+            </a:pPr>
+            <a:r>
+              <a:rPr lang="en-GB">
+                <a:latin typeface="Consolas" panose="020B0609020204030204" pitchFamily="49" charset="0"/>
+                <a:cs typeface="Consolas" panose="020B0609020204030204" pitchFamily="49" charset="0"/>
+              </a:rPr>
+              <a:t>&gt;&gt;&gt; </a:t>
+            </a:r>
+            <a:r>
+              <a:rPr lang="en-CH">
+                <a:latin typeface="Consolas" panose="020B0609020204030204" pitchFamily="49" charset="0"/>
+                <a:cs typeface="Consolas" panose="020B0609020204030204" pitchFamily="49" charset="0"/>
+              </a:rPr>
+              <a:t>[1, 2, 3, 4, 5, 6, 7, 8]</a:t>
+            </a:r>
+          </a:p>
+        </p:txBody>
+      </p:sp>
+    </p:spTree>
+    <p:extLst>
+      <p:ext uri="{BB962C8B-B14F-4D97-AF65-F5344CB8AC3E}">
+        <p14:creationId xmlns:p14="http://schemas.microsoft.com/office/powerpoint/2010/main" val="2899366820"/>
+      </p:ext>
+    </p:extLst>
+  </p:cSld>
+  <p:clrMapOvr>
+    <a:masterClrMapping/>
+  </p:clrMapOvr>
+</p:sld>
+</file>
+
+<file path=ppt/slides/slide36.xml><?xml version="1.0" encoding="utf-8"?>
 <p:sld xmlns:a="http://schemas.openxmlformats.org/drawingml/2006/main" xmlns:r="http://schemas.openxmlformats.org/officeDocument/2006/relationships" xmlns:p="http://schemas.openxmlformats.org/presentationml/2006/main">
   <p:cSld>
     <p:spTree>
@@ -21229,347 +21459,6 @@
 </p:sld>
 </file>
 
-<file path=ppt/slides/slide35.xml><?xml version="1.0" encoding="utf-8"?>
-<p:sld xmlns:a="http://schemas.openxmlformats.org/drawingml/2006/main" xmlns:r="http://schemas.openxmlformats.org/officeDocument/2006/relationships" xmlns:p="http://schemas.openxmlformats.org/presentationml/2006/main">
-  <p:cSld>
-    <p:spTree>
-      <p:nvGrpSpPr>
-        <p:cNvPr id="1" name=""/>
-        <p:cNvGrpSpPr/>
-        <p:nvPr/>
-      </p:nvGrpSpPr>
-      <p:grpSpPr>
-        <a:xfrm>
-          <a:off x="0" y="0"/>
-          <a:ext cx="0" cy="0"/>
-          <a:chOff x="0" y="0"/>
-          <a:chExt cx="0" cy="0"/>
-        </a:xfrm>
-      </p:grpSpPr>
-      <p:sp>
-        <p:nvSpPr>
-          <p:cNvPr id="2" name="Title 1">
-            <a:extLst>
-              <a:ext uri="{FF2B5EF4-FFF2-40B4-BE49-F238E27FC236}">
-                <a16:creationId xmlns:a16="http://schemas.microsoft.com/office/drawing/2014/main" id="{B1C9E3AB-CA02-437C-CFF8-D2AE428DD8D7}"/>
-              </a:ext>
-            </a:extLst>
-          </p:cNvPr>
-          <p:cNvSpPr>
-            <a:spLocks noGrp="1"/>
-          </p:cNvSpPr>
-          <p:nvPr>
-            <p:ph type="title"/>
-          </p:nvPr>
-        </p:nvSpPr>
-        <p:spPr/>
-        <p:txBody>
-          <a:bodyPr/>
-          <a:lstStyle/>
-          <a:p>
-            <a:r>
-              <a:rPr lang="en-CH"/>
-              <a:t>What is numpy (and scipy)</a:t>
-            </a:r>
-          </a:p>
-        </p:txBody>
-      </p:sp>
-      <p:sp>
-        <p:nvSpPr>
-          <p:cNvPr id="3" name="Content Placeholder 2">
-            <a:extLst>
-              <a:ext uri="{FF2B5EF4-FFF2-40B4-BE49-F238E27FC236}">
-                <a16:creationId xmlns:a16="http://schemas.microsoft.com/office/drawing/2014/main" id="{19588855-A23E-1C52-E91E-9F3C6A2D0D3D}"/>
-              </a:ext>
-            </a:extLst>
-          </p:cNvPr>
-          <p:cNvSpPr>
-            <a:spLocks noGrp="1"/>
-          </p:cNvSpPr>
-          <p:nvPr>
-            <p:ph idx="1"/>
-          </p:nvPr>
-        </p:nvSpPr>
-        <p:spPr>
-          <a:xfrm>
-            <a:off x="628650" y="1268016"/>
-            <a:ext cx="7886700" cy="3601639"/>
-          </a:xfrm>
-        </p:spPr>
-        <p:txBody>
-          <a:bodyPr>
-            <a:normAutofit lnSpcReduction="10000"/>
-          </a:bodyPr>
-          <a:lstStyle/>
-          <a:p>
-            <a:r>
-              <a:rPr lang="en-GB" sz="2000" b="1"/>
-              <a:t>NumPy</a:t>
-            </a:r>
-            <a:r>
-              <a:rPr lang="en-GB" sz="2000"/>
-              <a:t> is a module for Python. The name is an acronym for "Numeric Python" or "Numerical Python” (mostly written in C)</a:t>
-            </a:r>
-          </a:p>
-          <a:p>
-            <a:r>
-              <a:rPr lang="en-GB" sz="2000" b="1"/>
-              <a:t>NumPy</a:t>
-            </a:r>
-            <a:r>
-              <a:rPr lang="en-GB" sz="2000"/>
-              <a:t> enriches the programming language Python with powerful data structures, implementing multi-dimensional arrays and matrices.</a:t>
-            </a:r>
-          </a:p>
-          <a:p>
-            <a:r>
-              <a:rPr lang="en-GB" sz="2000"/>
-              <a:t>The implementation is even aiming at huge matrices and arrays, better know under the heading of "big data”</a:t>
-            </a:r>
-          </a:p>
-          <a:p>
-            <a:r>
-              <a:rPr lang="en-GB" sz="2000" b="1"/>
-              <a:t>SciPy</a:t>
-            </a:r>
-            <a:r>
-              <a:rPr lang="en-GB" sz="2000"/>
-              <a:t> (Scientific Python) needs Numpy, as it is based on the data structures of Numpy and furthermore its basic creation and manipulation functions. It extends the capabilities of NumPy with further useful functions for minimization, regression, Fourier-transformation and many others.</a:t>
-            </a:r>
-          </a:p>
-          <a:p>
-            <a:endParaRPr lang="en-CH" sz="2000"/>
-          </a:p>
-        </p:txBody>
-      </p:sp>
-      <p:sp>
-        <p:nvSpPr>
-          <p:cNvPr id="4" name="TextBox 3">
-            <a:extLst>
-              <a:ext uri="{FF2B5EF4-FFF2-40B4-BE49-F238E27FC236}">
-                <a16:creationId xmlns:a16="http://schemas.microsoft.com/office/drawing/2014/main" id="{7DFACA7E-1139-6728-3192-9E08D7AD8CA7}"/>
-              </a:ext>
-            </a:extLst>
-          </p:cNvPr>
-          <p:cNvSpPr txBox="1"/>
-          <p:nvPr/>
-        </p:nvSpPr>
-        <p:spPr>
-          <a:xfrm>
-            <a:off x="43703" y="4866501"/>
-            <a:ext cx="8471647" cy="276999"/>
-          </a:xfrm>
-          <a:prstGeom prst="rect">
-            <a:avLst/>
-          </a:prstGeom>
-          <a:noFill/>
-        </p:spPr>
-        <p:txBody>
-          <a:bodyPr wrap="square" rtlCol="0">
-            <a:spAutoFit/>
-          </a:bodyPr>
-          <a:lstStyle/>
-          <a:p>
-            <a:r>
-              <a:rPr lang="en-CH" sz="1200"/>
-              <a:t>Source: </a:t>
-            </a:r>
-            <a:r>
-              <a:rPr lang="en-GB" sz="1200"/>
-              <a:t>https://python-course.eu/numerical-programming/introduction-to-numpy.php</a:t>
-            </a:r>
-            <a:endParaRPr lang="en-CH" sz="1200"/>
-          </a:p>
-        </p:txBody>
-      </p:sp>
-    </p:spTree>
-    <p:extLst>
-      <p:ext uri="{BB962C8B-B14F-4D97-AF65-F5344CB8AC3E}">
-        <p14:creationId xmlns:p14="http://schemas.microsoft.com/office/powerpoint/2010/main" val="1165536882"/>
-      </p:ext>
-    </p:extLst>
-  </p:cSld>
-  <p:clrMapOvr>
-    <a:masterClrMapping/>
-  </p:clrMapOvr>
-</p:sld>
-</file>
-
-<file path=ppt/slides/slide36.xml><?xml version="1.0" encoding="utf-8"?>
-<p:sld xmlns:a="http://schemas.openxmlformats.org/drawingml/2006/main" xmlns:r="http://schemas.openxmlformats.org/officeDocument/2006/relationships" xmlns:p="http://schemas.openxmlformats.org/presentationml/2006/main">
-  <p:cSld>
-    <p:spTree>
-      <p:nvGrpSpPr>
-        <p:cNvPr id="1" name=""/>
-        <p:cNvGrpSpPr/>
-        <p:nvPr/>
-      </p:nvGrpSpPr>
-      <p:grpSpPr>
-        <a:xfrm>
-          <a:off x="0" y="0"/>
-          <a:ext cx="0" cy="0"/>
-          <a:chOff x="0" y="0"/>
-          <a:chExt cx="0" cy="0"/>
-        </a:xfrm>
-      </p:grpSpPr>
-      <p:sp>
-        <p:nvSpPr>
-          <p:cNvPr id="2" name="Title 1">
-            <a:extLst>
-              <a:ext uri="{FF2B5EF4-FFF2-40B4-BE49-F238E27FC236}">
-                <a16:creationId xmlns:a16="http://schemas.microsoft.com/office/drawing/2014/main" id="{EB60A15C-E06B-AE26-088C-94D0AACF841E}"/>
-              </a:ext>
-            </a:extLst>
-          </p:cNvPr>
-          <p:cNvSpPr>
-            <a:spLocks noGrp="1"/>
-          </p:cNvSpPr>
-          <p:nvPr>
-            <p:ph type="title"/>
-          </p:nvPr>
-        </p:nvSpPr>
-        <p:spPr/>
-        <p:txBody>
-          <a:bodyPr/>
-          <a:lstStyle/>
-          <a:p>
-            <a:r>
-              <a:rPr lang="en-GB"/>
-              <a:t>N</a:t>
-            </a:r>
-            <a:r>
-              <a:rPr lang="en-CH"/>
-              <a:t>umpy vs. code python</a:t>
-            </a:r>
-          </a:p>
-        </p:txBody>
-      </p:sp>
-      <p:sp>
-        <p:nvSpPr>
-          <p:cNvPr id="3" name="Content Placeholder 2">
-            <a:extLst>
-              <a:ext uri="{FF2B5EF4-FFF2-40B4-BE49-F238E27FC236}">
-                <a16:creationId xmlns:a16="http://schemas.microsoft.com/office/drawing/2014/main" id="{ED19F422-0176-04A1-8051-0E58DD13CE27}"/>
-              </a:ext>
-            </a:extLst>
-          </p:cNvPr>
-          <p:cNvSpPr>
-            <a:spLocks noGrp="1"/>
-          </p:cNvSpPr>
-          <p:nvPr>
-            <p:ph idx="1"/>
-          </p:nvPr>
-        </p:nvSpPr>
-        <p:spPr/>
-        <p:txBody>
-          <a:bodyPr/>
-          <a:lstStyle/>
-          <a:p>
-            <a:pPr marL="0" indent="0">
-              <a:buNone/>
-            </a:pPr>
-            <a:r>
-              <a:rPr lang="en-GB"/>
-              <a:t>The advantages of Core Python:</a:t>
-            </a:r>
-          </a:p>
-          <a:p>
-            <a:r>
-              <a:rPr lang="en-GB"/>
-              <a:t>high-level number objects: integers, floating point</a:t>
-            </a:r>
-          </a:p>
-          <a:p>
-            <a:r>
-              <a:rPr lang="en-GB"/>
-              <a:t>containers: lists with cheap insertion and append methods, dictionaries with fast lookup</a:t>
-            </a:r>
-          </a:p>
-          <a:p>
-            <a:pPr marL="0" indent="0">
-              <a:buNone/>
-            </a:pPr>
-            <a:r>
-              <a:rPr lang="en-GB"/>
-              <a:t>Advantages of using Numpy with Python:</a:t>
-            </a:r>
-          </a:p>
-          <a:p>
-            <a:r>
-              <a:rPr lang="en-GB"/>
-              <a:t>array oriented computing</a:t>
-            </a:r>
-          </a:p>
-          <a:p>
-            <a:r>
-              <a:rPr lang="en-GB"/>
-              <a:t>efficiently implemented multi-dimensional arrays</a:t>
-            </a:r>
-          </a:p>
-          <a:p>
-            <a:r>
-              <a:rPr lang="en-GB"/>
-              <a:t>designed for scientific computation</a:t>
-            </a:r>
-          </a:p>
-          <a:p>
-            <a:endParaRPr lang="en-CH"/>
-          </a:p>
-        </p:txBody>
-      </p:sp>
-      <p:sp>
-        <p:nvSpPr>
-          <p:cNvPr id="4" name="TextBox 3">
-            <a:extLst>
-              <a:ext uri="{FF2B5EF4-FFF2-40B4-BE49-F238E27FC236}">
-                <a16:creationId xmlns:a16="http://schemas.microsoft.com/office/drawing/2014/main" id="{52899488-7D5A-CD80-29C6-B7DF1C9F867E}"/>
-              </a:ext>
-            </a:extLst>
-          </p:cNvPr>
-          <p:cNvSpPr txBox="1"/>
-          <p:nvPr/>
-        </p:nvSpPr>
-        <p:spPr>
-          <a:xfrm>
-            <a:off x="43703" y="4866501"/>
-            <a:ext cx="8471647" cy="276999"/>
-          </a:xfrm>
-          <a:prstGeom prst="rect">
-            <a:avLst/>
-          </a:prstGeom>
-          <a:noFill/>
-        </p:spPr>
-        <p:txBody>
-          <a:bodyPr wrap="square" rtlCol="0">
-            <a:spAutoFit/>
-          </a:bodyPr>
-          <a:lstStyle/>
-          <a:p>
-            <a:r>
-              <a:rPr lang="en-CH" sz="1200"/>
-              <a:t>Source: </a:t>
-            </a:r>
-            <a:r>
-              <a:rPr lang="en-GB" sz="1200"/>
-              <a:t>https://python-course.eu/numerical-programming/introduction-to-numpy.php</a:t>
-            </a:r>
-            <a:endParaRPr lang="en-CH" sz="1200"/>
-          </a:p>
-        </p:txBody>
-      </p:sp>
-    </p:spTree>
-    <p:extLst>
-      <p:ext uri="{BB962C8B-B14F-4D97-AF65-F5344CB8AC3E}">
-        <p14:creationId xmlns:p14="http://schemas.microsoft.com/office/powerpoint/2010/main" val="33953978"/>
-      </p:ext>
-    </p:extLst>
-  </p:cSld>
-  <p:clrMapOvr>
-    <a:masterClrMapping/>
-  </p:clrMapOvr>
-</p:sld>
-</file>
-
 <file path=ppt/slides/slide37.xml><?xml version="1.0" encoding="utf-8"?>
 <p:sld xmlns:a="http://schemas.openxmlformats.org/drawingml/2006/main" xmlns:r="http://schemas.openxmlformats.org/officeDocument/2006/relationships" xmlns:p="http://schemas.openxmlformats.org/presentationml/2006/main">
   <p:cSld>
@@ -21592,6 +21481,347 @@
           <p:cNvPr id="2" name="Title 1">
             <a:extLst>
               <a:ext uri="{FF2B5EF4-FFF2-40B4-BE49-F238E27FC236}">
+                <a16:creationId xmlns:a16="http://schemas.microsoft.com/office/drawing/2014/main" id="{B1C9E3AB-CA02-437C-CFF8-D2AE428DD8D7}"/>
+              </a:ext>
+            </a:extLst>
+          </p:cNvPr>
+          <p:cNvSpPr>
+            <a:spLocks noGrp="1"/>
+          </p:cNvSpPr>
+          <p:nvPr>
+            <p:ph type="title"/>
+          </p:nvPr>
+        </p:nvSpPr>
+        <p:spPr/>
+        <p:txBody>
+          <a:bodyPr/>
+          <a:lstStyle/>
+          <a:p>
+            <a:r>
+              <a:rPr lang="en-CH"/>
+              <a:t>What is numpy (and scipy)</a:t>
+            </a:r>
+          </a:p>
+        </p:txBody>
+      </p:sp>
+      <p:sp>
+        <p:nvSpPr>
+          <p:cNvPr id="3" name="Content Placeholder 2">
+            <a:extLst>
+              <a:ext uri="{FF2B5EF4-FFF2-40B4-BE49-F238E27FC236}">
+                <a16:creationId xmlns:a16="http://schemas.microsoft.com/office/drawing/2014/main" id="{19588855-A23E-1C52-E91E-9F3C6A2D0D3D}"/>
+              </a:ext>
+            </a:extLst>
+          </p:cNvPr>
+          <p:cNvSpPr>
+            <a:spLocks noGrp="1"/>
+          </p:cNvSpPr>
+          <p:nvPr>
+            <p:ph idx="1"/>
+          </p:nvPr>
+        </p:nvSpPr>
+        <p:spPr>
+          <a:xfrm>
+            <a:off x="628650" y="1268016"/>
+            <a:ext cx="7886700" cy="3601639"/>
+          </a:xfrm>
+        </p:spPr>
+        <p:txBody>
+          <a:bodyPr>
+            <a:normAutofit lnSpcReduction="10000"/>
+          </a:bodyPr>
+          <a:lstStyle/>
+          <a:p>
+            <a:r>
+              <a:rPr lang="en-GB" sz="2000" b="1"/>
+              <a:t>NumPy</a:t>
+            </a:r>
+            <a:r>
+              <a:rPr lang="en-GB" sz="2000"/>
+              <a:t> is a module for Python. The name is an acronym for "Numeric Python" or "Numerical Python” (mostly written in C)</a:t>
+            </a:r>
+          </a:p>
+          <a:p>
+            <a:r>
+              <a:rPr lang="en-GB" sz="2000" b="1"/>
+              <a:t>NumPy</a:t>
+            </a:r>
+            <a:r>
+              <a:rPr lang="en-GB" sz="2000"/>
+              <a:t> enriches the programming language Python with powerful data structures, implementing multi-dimensional arrays and matrices.</a:t>
+            </a:r>
+          </a:p>
+          <a:p>
+            <a:r>
+              <a:rPr lang="en-GB" sz="2000"/>
+              <a:t>The implementation is even aiming at huge matrices and arrays, better know under the heading of "big data”</a:t>
+            </a:r>
+          </a:p>
+          <a:p>
+            <a:r>
+              <a:rPr lang="en-GB" sz="2000" b="1"/>
+              <a:t>SciPy</a:t>
+            </a:r>
+            <a:r>
+              <a:rPr lang="en-GB" sz="2000"/>
+              <a:t> (Scientific Python) needs Numpy, as it is based on the data structures of Numpy and furthermore its basic creation and manipulation functions. It extends the capabilities of NumPy with further useful functions for minimization, regression, Fourier-transformation and many others.</a:t>
+            </a:r>
+          </a:p>
+          <a:p>
+            <a:endParaRPr lang="en-CH" sz="2000"/>
+          </a:p>
+        </p:txBody>
+      </p:sp>
+      <p:sp>
+        <p:nvSpPr>
+          <p:cNvPr id="4" name="TextBox 3">
+            <a:extLst>
+              <a:ext uri="{FF2B5EF4-FFF2-40B4-BE49-F238E27FC236}">
+                <a16:creationId xmlns:a16="http://schemas.microsoft.com/office/drawing/2014/main" id="{7DFACA7E-1139-6728-3192-9E08D7AD8CA7}"/>
+              </a:ext>
+            </a:extLst>
+          </p:cNvPr>
+          <p:cNvSpPr txBox="1"/>
+          <p:nvPr/>
+        </p:nvSpPr>
+        <p:spPr>
+          <a:xfrm>
+            <a:off x="43703" y="4866501"/>
+            <a:ext cx="8471647" cy="276999"/>
+          </a:xfrm>
+          <a:prstGeom prst="rect">
+            <a:avLst/>
+          </a:prstGeom>
+          <a:noFill/>
+        </p:spPr>
+        <p:txBody>
+          <a:bodyPr wrap="square" rtlCol="0">
+            <a:spAutoFit/>
+          </a:bodyPr>
+          <a:lstStyle/>
+          <a:p>
+            <a:r>
+              <a:rPr lang="en-CH" sz="1200"/>
+              <a:t>Source: </a:t>
+            </a:r>
+            <a:r>
+              <a:rPr lang="en-GB" sz="1200"/>
+              <a:t>https://python-course.eu/numerical-programming/introduction-to-numpy.php</a:t>
+            </a:r>
+            <a:endParaRPr lang="en-CH" sz="1200"/>
+          </a:p>
+        </p:txBody>
+      </p:sp>
+    </p:spTree>
+    <p:extLst>
+      <p:ext uri="{BB962C8B-B14F-4D97-AF65-F5344CB8AC3E}">
+        <p14:creationId xmlns:p14="http://schemas.microsoft.com/office/powerpoint/2010/main" val="1165536882"/>
+      </p:ext>
+    </p:extLst>
+  </p:cSld>
+  <p:clrMapOvr>
+    <a:masterClrMapping/>
+  </p:clrMapOvr>
+</p:sld>
+</file>
+
+<file path=ppt/slides/slide38.xml><?xml version="1.0" encoding="utf-8"?>
+<p:sld xmlns:a="http://schemas.openxmlformats.org/drawingml/2006/main" xmlns:r="http://schemas.openxmlformats.org/officeDocument/2006/relationships" xmlns:p="http://schemas.openxmlformats.org/presentationml/2006/main">
+  <p:cSld>
+    <p:spTree>
+      <p:nvGrpSpPr>
+        <p:cNvPr id="1" name=""/>
+        <p:cNvGrpSpPr/>
+        <p:nvPr/>
+      </p:nvGrpSpPr>
+      <p:grpSpPr>
+        <a:xfrm>
+          <a:off x="0" y="0"/>
+          <a:ext cx="0" cy="0"/>
+          <a:chOff x="0" y="0"/>
+          <a:chExt cx="0" cy="0"/>
+        </a:xfrm>
+      </p:grpSpPr>
+      <p:sp>
+        <p:nvSpPr>
+          <p:cNvPr id="2" name="Title 1">
+            <a:extLst>
+              <a:ext uri="{FF2B5EF4-FFF2-40B4-BE49-F238E27FC236}">
+                <a16:creationId xmlns:a16="http://schemas.microsoft.com/office/drawing/2014/main" id="{EB60A15C-E06B-AE26-088C-94D0AACF841E}"/>
+              </a:ext>
+            </a:extLst>
+          </p:cNvPr>
+          <p:cNvSpPr>
+            <a:spLocks noGrp="1"/>
+          </p:cNvSpPr>
+          <p:nvPr>
+            <p:ph type="title"/>
+          </p:nvPr>
+        </p:nvSpPr>
+        <p:spPr/>
+        <p:txBody>
+          <a:bodyPr/>
+          <a:lstStyle/>
+          <a:p>
+            <a:r>
+              <a:rPr lang="en-GB"/>
+              <a:t>N</a:t>
+            </a:r>
+            <a:r>
+              <a:rPr lang="en-CH"/>
+              <a:t>umpy vs. code python</a:t>
+            </a:r>
+          </a:p>
+        </p:txBody>
+      </p:sp>
+      <p:sp>
+        <p:nvSpPr>
+          <p:cNvPr id="3" name="Content Placeholder 2">
+            <a:extLst>
+              <a:ext uri="{FF2B5EF4-FFF2-40B4-BE49-F238E27FC236}">
+                <a16:creationId xmlns:a16="http://schemas.microsoft.com/office/drawing/2014/main" id="{ED19F422-0176-04A1-8051-0E58DD13CE27}"/>
+              </a:ext>
+            </a:extLst>
+          </p:cNvPr>
+          <p:cNvSpPr>
+            <a:spLocks noGrp="1"/>
+          </p:cNvSpPr>
+          <p:nvPr>
+            <p:ph idx="1"/>
+          </p:nvPr>
+        </p:nvSpPr>
+        <p:spPr/>
+        <p:txBody>
+          <a:bodyPr/>
+          <a:lstStyle/>
+          <a:p>
+            <a:pPr marL="0" indent="0">
+              <a:buNone/>
+            </a:pPr>
+            <a:r>
+              <a:rPr lang="en-GB"/>
+              <a:t>The advantages of Core Python:</a:t>
+            </a:r>
+          </a:p>
+          <a:p>
+            <a:r>
+              <a:rPr lang="en-GB"/>
+              <a:t>high-level number objects: integers, floating point</a:t>
+            </a:r>
+          </a:p>
+          <a:p>
+            <a:r>
+              <a:rPr lang="en-GB"/>
+              <a:t>containers: lists with cheap insertion and append methods, dictionaries with fast lookup</a:t>
+            </a:r>
+          </a:p>
+          <a:p>
+            <a:pPr marL="0" indent="0">
+              <a:buNone/>
+            </a:pPr>
+            <a:r>
+              <a:rPr lang="en-GB"/>
+              <a:t>Advantages of using Numpy with Python:</a:t>
+            </a:r>
+          </a:p>
+          <a:p>
+            <a:r>
+              <a:rPr lang="en-GB"/>
+              <a:t>array oriented computing</a:t>
+            </a:r>
+          </a:p>
+          <a:p>
+            <a:r>
+              <a:rPr lang="en-GB"/>
+              <a:t>efficiently implemented multi-dimensional arrays</a:t>
+            </a:r>
+          </a:p>
+          <a:p>
+            <a:r>
+              <a:rPr lang="en-GB"/>
+              <a:t>designed for scientific computation</a:t>
+            </a:r>
+          </a:p>
+          <a:p>
+            <a:endParaRPr lang="en-CH"/>
+          </a:p>
+        </p:txBody>
+      </p:sp>
+      <p:sp>
+        <p:nvSpPr>
+          <p:cNvPr id="4" name="TextBox 3">
+            <a:extLst>
+              <a:ext uri="{FF2B5EF4-FFF2-40B4-BE49-F238E27FC236}">
+                <a16:creationId xmlns:a16="http://schemas.microsoft.com/office/drawing/2014/main" id="{52899488-7D5A-CD80-29C6-B7DF1C9F867E}"/>
+              </a:ext>
+            </a:extLst>
+          </p:cNvPr>
+          <p:cNvSpPr txBox="1"/>
+          <p:nvPr/>
+        </p:nvSpPr>
+        <p:spPr>
+          <a:xfrm>
+            <a:off x="43703" y="4866501"/>
+            <a:ext cx="8471647" cy="276999"/>
+          </a:xfrm>
+          <a:prstGeom prst="rect">
+            <a:avLst/>
+          </a:prstGeom>
+          <a:noFill/>
+        </p:spPr>
+        <p:txBody>
+          <a:bodyPr wrap="square" rtlCol="0">
+            <a:spAutoFit/>
+          </a:bodyPr>
+          <a:lstStyle/>
+          <a:p>
+            <a:r>
+              <a:rPr lang="en-CH" sz="1200"/>
+              <a:t>Source: </a:t>
+            </a:r>
+            <a:r>
+              <a:rPr lang="en-GB" sz="1200"/>
+              <a:t>https://python-course.eu/numerical-programming/introduction-to-numpy.php</a:t>
+            </a:r>
+            <a:endParaRPr lang="en-CH" sz="1200"/>
+          </a:p>
+        </p:txBody>
+      </p:sp>
+    </p:spTree>
+    <p:extLst>
+      <p:ext uri="{BB962C8B-B14F-4D97-AF65-F5344CB8AC3E}">
+        <p14:creationId xmlns:p14="http://schemas.microsoft.com/office/powerpoint/2010/main" val="33953978"/>
+      </p:ext>
+    </p:extLst>
+  </p:cSld>
+  <p:clrMapOvr>
+    <a:masterClrMapping/>
+  </p:clrMapOvr>
+</p:sld>
+</file>
+
+<file path=ppt/slides/slide39.xml><?xml version="1.0" encoding="utf-8"?>
+<p:sld xmlns:a="http://schemas.openxmlformats.org/drawingml/2006/main" xmlns:r="http://schemas.openxmlformats.org/officeDocument/2006/relationships" xmlns:p="http://schemas.openxmlformats.org/presentationml/2006/main">
+  <p:cSld>
+    <p:spTree>
+      <p:nvGrpSpPr>
+        <p:cNvPr id="1" name=""/>
+        <p:cNvGrpSpPr/>
+        <p:nvPr/>
+      </p:nvGrpSpPr>
+      <p:grpSpPr>
+        <a:xfrm>
+          <a:off x="0" y="0"/>
+          <a:ext cx="0" cy="0"/>
+          <a:chOff x="0" y="0"/>
+          <a:chExt cx="0" cy="0"/>
+        </a:xfrm>
+      </p:grpSpPr>
+      <p:sp>
+        <p:nvSpPr>
+          <p:cNvPr id="2" name="Title 1">
+            <a:extLst>
+              <a:ext uri="{FF2B5EF4-FFF2-40B4-BE49-F238E27FC236}">
                 <a16:creationId xmlns:a16="http://schemas.microsoft.com/office/drawing/2014/main" id="{5244984A-3B80-977B-21D5-79204628047B}"/>
               </a:ext>
             </a:extLst>
@@ -21628,7 +21858,351 @@
 </p:sld>
 </file>
 
-<file path=ppt/slides/slide38.xml><?xml version="1.0" encoding="utf-8"?>
+<file path=ppt/slides/slide4.xml><?xml version="1.0" encoding="utf-8"?>
+<p:sld xmlns:a="http://schemas.openxmlformats.org/drawingml/2006/main" xmlns:r="http://schemas.openxmlformats.org/officeDocument/2006/relationships" xmlns:p="http://schemas.openxmlformats.org/presentationml/2006/main">
+  <p:cSld>
+    <p:spTree>
+      <p:nvGrpSpPr>
+        <p:cNvPr id="1" name=""/>
+        <p:cNvGrpSpPr/>
+        <p:nvPr/>
+      </p:nvGrpSpPr>
+      <p:grpSpPr>
+        <a:xfrm>
+          <a:off x="0" y="0"/>
+          <a:ext cx="0" cy="0"/>
+          <a:chOff x="0" y="0"/>
+          <a:chExt cx="0" cy="0"/>
+        </a:xfrm>
+      </p:grpSpPr>
+      <p:sp>
+        <p:nvSpPr>
+          <p:cNvPr id="2" name="Title 1">
+            <a:extLst>
+              <a:ext uri="{FF2B5EF4-FFF2-40B4-BE49-F238E27FC236}">
+                <a16:creationId xmlns:a16="http://schemas.microsoft.com/office/drawing/2014/main" id="{8C5A40C9-E01D-BEFC-1D9B-DA8A27C238F1}"/>
+              </a:ext>
+            </a:extLst>
+          </p:cNvPr>
+          <p:cNvSpPr>
+            <a:spLocks noGrp="1"/>
+          </p:cNvSpPr>
+          <p:nvPr>
+            <p:ph type="title"/>
+          </p:nvPr>
+        </p:nvSpPr>
+        <p:spPr>
+          <a:xfrm>
+            <a:off x="628650" y="202822"/>
+            <a:ext cx="7886700" cy="994172"/>
+          </a:xfrm>
+        </p:spPr>
+        <p:txBody>
+          <a:bodyPr>
+            <a:normAutofit fontScale="90000"/>
+          </a:bodyPr>
+          <a:lstStyle/>
+          <a:p>
+            <a:r>
+              <a:rPr lang="en-CH"/>
+              <a:t>Reproducibility and Replicability (two opposite definitions)</a:t>
+            </a:r>
+          </a:p>
+        </p:txBody>
+      </p:sp>
+      <p:sp>
+        <p:nvSpPr>
+          <p:cNvPr id="3" name="Content Placeholder 2">
+            <a:extLst>
+              <a:ext uri="{FF2B5EF4-FFF2-40B4-BE49-F238E27FC236}">
+                <a16:creationId xmlns:a16="http://schemas.microsoft.com/office/drawing/2014/main" id="{68D3CDD2-F5AD-E43A-CB56-D2496532D05D}"/>
+              </a:ext>
+            </a:extLst>
+          </p:cNvPr>
+          <p:cNvSpPr>
+            <a:spLocks noGrp="1"/>
+          </p:cNvSpPr>
+          <p:nvPr>
+            <p:ph idx="1"/>
+          </p:nvPr>
+        </p:nvSpPr>
+        <p:spPr>
+          <a:xfrm>
+            <a:off x="628650" y="1369219"/>
+            <a:ext cx="7886700" cy="3380334"/>
+          </a:xfrm>
+        </p:spPr>
+        <p:txBody>
+          <a:bodyPr>
+            <a:normAutofit/>
+          </a:bodyPr>
+          <a:lstStyle/>
+          <a:p>
+            <a:pPr marL="0" indent="0">
+              <a:buNone/>
+            </a:pPr>
+            <a:r>
+              <a:rPr lang="en-GB"/>
+              <a:t>“</a:t>
+            </a:r>
+            <a:r>
+              <a:rPr lang="en-GB" b="1" u="sng"/>
+              <a:t>Reproducibility</a:t>
+            </a:r>
+            <a:r>
+              <a:rPr lang="en-GB"/>
+              <a:t>” refers to instances in which the original researcher's data and computer codes are used to regenerate the results, while “</a:t>
+            </a:r>
+            <a:r>
+              <a:rPr lang="en-GB" b="1" u="sng"/>
+              <a:t>replicability</a:t>
+            </a:r>
+            <a:r>
+              <a:rPr lang="en-GB"/>
+              <a:t>” refers to instances in which a researcher collects new data to arrive at the same scientific findings as a previous study.</a:t>
+            </a:r>
+          </a:p>
+          <a:p>
+            <a:pPr marL="0" indent="0">
+              <a:buNone/>
+            </a:pPr>
+            <a:endParaRPr lang="en-GB"/>
+          </a:p>
+          <a:p>
+            <a:pPr marL="0" indent="0">
+              <a:buNone/>
+            </a:pPr>
+            <a:r>
+              <a:rPr lang="en-GB"/>
+              <a:t>“</a:t>
+            </a:r>
+            <a:r>
+              <a:rPr lang="en-GB" b="1" u="sng"/>
+              <a:t>Reproducibility</a:t>
+            </a:r>
+            <a:r>
+              <a:rPr lang="en-GB"/>
+              <a:t>” refers to independent researchers arriving at the same results using their own data and methods, while “</a:t>
+            </a:r>
+            <a:r>
+              <a:rPr lang="en-GB" b="1" u="sng"/>
+              <a:t>replicability</a:t>
+            </a:r>
+            <a:r>
+              <a:rPr lang="en-GB"/>
+              <a:t>” refers to a different team arriving at the same results using the original author's artifacts.</a:t>
+            </a:r>
+          </a:p>
+        </p:txBody>
+      </p:sp>
+      <p:sp>
+        <p:nvSpPr>
+          <p:cNvPr id="5" name="TextBox 4">
+            <a:extLst>
+              <a:ext uri="{FF2B5EF4-FFF2-40B4-BE49-F238E27FC236}">
+                <a16:creationId xmlns:a16="http://schemas.microsoft.com/office/drawing/2014/main" id="{2E509B11-116E-5BD6-E871-852E55315C0B}"/>
+              </a:ext>
+            </a:extLst>
+          </p:cNvPr>
+          <p:cNvSpPr txBox="1"/>
+          <p:nvPr/>
+        </p:nvSpPr>
+        <p:spPr>
+          <a:xfrm>
+            <a:off x="317376" y="4802178"/>
+            <a:ext cx="8509247" cy="276999"/>
+          </a:xfrm>
+          <a:prstGeom prst="rect">
+            <a:avLst/>
+          </a:prstGeom>
+          <a:noFill/>
+        </p:spPr>
+        <p:txBody>
+          <a:bodyPr wrap="square">
+            <a:spAutoFit/>
+          </a:bodyPr>
+          <a:lstStyle/>
+          <a:p>
+            <a:r>
+              <a:rPr lang="en-GB" sz="1200">
+                <a:latin typeface="Arial" panose="020B0604020202020204" pitchFamily="34" charset="0"/>
+                <a:cs typeface="Arial" panose="020B0604020202020204" pitchFamily="34" charset="0"/>
+              </a:rPr>
+              <a:t>National Academies of Sciences, Engineering, and Medicine. "Reproducibility and replicability in science." (2019).</a:t>
+            </a:r>
+            <a:endParaRPr lang="en-CH" sz="1200">
+              <a:latin typeface="Arial" panose="020B0604020202020204" pitchFamily="34" charset="0"/>
+              <a:cs typeface="Arial" panose="020B0604020202020204" pitchFamily="34" charset="0"/>
+            </a:endParaRPr>
+          </a:p>
+        </p:txBody>
+      </p:sp>
+    </p:spTree>
+    <p:extLst>
+      <p:ext uri="{BB962C8B-B14F-4D97-AF65-F5344CB8AC3E}">
+        <p14:creationId xmlns:p14="http://schemas.microsoft.com/office/powerpoint/2010/main" val="2606564281"/>
+      </p:ext>
+    </p:extLst>
+  </p:cSld>
+  <p:clrMapOvr>
+    <a:masterClrMapping/>
+  </p:clrMapOvr>
+  <p:timing>
+    <p:tnLst>
+      <p:par>
+        <p:cTn id="1" dur="indefinite" restart="never" nodeType="tmRoot">
+          <p:childTnLst>
+            <p:seq concurrent="1" nextAc="seek">
+              <p:cTn id="2" dur="indefinite" nodeType="mainSeq">
+                <p:childTnLst>
+                  <p:par>
+                    <p:cTn id="3" fill="hold">
+                      <p:stCondLst>
+                        <p:cond delay="indefinite"/>
+                      </p:stCondLst>
+                      <p:childTnLst>
+                        <p:par>
+                          <p:cTn id="4" fill="hold">
+                            <p:stCondLst>
+                              <p:cond delay="0"/>
+                            </p:stCondLst>
+                            <p:childTnLst>
+                              <p:par>
+                                <p:cTn id="5" presetID="10" presetClass="entr" presetSubtype="0" fill="hold" nodeType="clickEffect">
+                                  <p:stCondLst>
+                                    <p:cond delay="0"/>
+                                  </p:stCondLst>
+                                  <p:childTnLst>
+                                    <p:set>
+                                      <p:cBhvr>
+                                        <p:cTn id="6" dur="1" fill="hold">
+                                          <p:stCondLst>
+                                            <p:cond delay="0"/>
+                                          </p:stCondLst>
+                                        </p:cTn>
+                                        <p:tgtEl>
+                                          <p:spTgt spid="3">
+                                            <p:txEl>
+                                              <p:pRg st="0" end="0"/>
+                                            </p:txEl>
+                                          </p:spTgt>
+                                        </p:tgtEl>
+                                        <p:attrNameLst>
+                                          <p:attrName>style.visibility</p:attrName>
+                                        </p:attrNameLst>
+                                      </p:cBhvr>
+                                      <p:to>
+                                        <p:strVal val="visible"/>
+                                      </p:to>
+                                    </p:set>
+                                    <p:animEffect transition="in" filter="fade">
+                                      <p:cBhvr>
+                                        <p:cTn id="7" dur="500"/>
+                                        <p:tgtEl>
+                                          <p:spTgt spid="3">
+                                            <p:txEl>
+                                              <p:pRg st="0" end="0"/>
+                                            </p:txEl>
+                                          </p:spTgt>
+                                        </p:tgtEl>
+                                      </p:cBhvr>
+                                    </p:animEffect>
+                                  </p:childTnLst>
+                                </p:cTn>
+                              </p:par>
+                            </p:childTnLst>
+                          </p:cTn>
+                        </p:par>
+                      </p:childTnLst>
+                    </p:cTn>
+                  </p:par>
+                  <p:par>
+                    <p:cTn id="8" fill="hold">
+                      <p:stCondLst>
+                        <p:cond delay="indefinite"/>
+                      </p:stCondLst>
+                      <p:childTnLst>
+                        <p:par>
+                          <p:cTn id="9" fill="hold">
+                            <p:stCondLst>
+                              <p:cond delay="0"/>
+                            </p:stCondLst>
+                            <p:childTnLst>
+                              <p:par>
+                                <p:cTn id="10" presetID="10" presetClass="entr" presetSubtype="0" fill="hold" nodeType="clickEffect">
+                                  <p:stCondLst>
+                                    <p:cond delay="0"/>
+                                  </p:stCondLst>
+                                  <p:childTnLst>
+                                    <p:set>
+                                      <p:cBhvr>
+                                        <p:cTn id="11" dur="1" fill="hold">
+                                          <p:stCondLst>
+                                            <p:cond delay="0"/>
+                                          </p:stCondLst>
+                                        </p:cTn>
+                                        <p:tgtEl>
+                                          <p:spTgt spid="3">
+                                            <p:txEl>
+                                              <p:pRg st="2" end="2"/>
+                                            </p:txEl>
+                                          </p:spTgt>
+                                        </p:tgtEl>
+                                        <p:attrNameLst>
+                                          <p:attrName>style.visibility</p:attrName>
+                                        </p:attrNameLst>
+                                      </p:cBhvr>
+                                      <p:to>
+                                        <p:strVal val="visible"/>
+                                      </p:to>
+                                    </p:set>
+                                    <p:animEffect transition="in" filter="fade">
+                                      <p:cBhvr>
+                                        <p:cTn id="12" dur="500"/>
+                                        <p:tgtEl>
+                                          <p:spTgt spid="3">
+                                            <p:txEl>
+                                              <p:pRg st="2" end="2"/>
+                                            </p:txEl>
+                                          </p:spTgt>
+                                        </p:tgtEl>
+                                      </p:cBhvr>
+                                    </p:animEffect>
+                                  </p:childTnLst>
+                                </p:cTn>
+                              </p:par>
+                            </p:childTnLst>
+                          </p:cTn>
+                        </p:par>
+                      </p:childTnLst>
+                    </p:cTn>
+                  </p:par>
+                </p:childTnLst>
+              </p:cTn>
+              <p:prevCondLst>
+                <p:cond evt="onPrev" delay="0">
+                  <p:tgtEl>
+                    <p:sldTgt/>
+                  </p:tgtEl>
+                </p:cond>
+              </p:prevCondLst>
+              <p:nextCondLst>
+                <p:cond evt="onNext" delay="0">
+                  <p:tgtEl>
+                    <p:sldTgt/>
+                  </p:tgtEl>
+                </p:cond>
+              </p:nextCondLst>
+            </p:seq>
+          </p:childTnLst>
+        </p:cTn>
+      </p:par>
+    </p:tnLst>
+  </p:timing>
+</p:sld>
+</file>
+
+<file path=ppt/slides/slide40.xml><?xml version="1.0" encoding="utf-8"?>
 <p:sld xmlns:a="http://schemas.openxmlformats.org/drawingml/2006/main" xmlns:r="http://schemas.openxmlformats.org/officeDocument/2006/relationships" xmlns:p="http://schemas.openxmlformats.org/presentationml/2006/main">
   <p:cSld>
     <p:spTree>
@@ -21976,7 +22550,7 @@
 </p:sld>
 </file>
 
-<file path=ppt/slides/slide39.xml><?xml version="1.0" encoding="utf-8"?>
+<file path=ppt/slides/slide41.xml><?xml version="1.0" encoding="utf-8"?>
 <p:sld xmlns:a="http://schemas.openxmlformats.org/drawingml/2006/main" xmlns:r="http://schemas.openxmlformats.org/officeDocument/2006/relationships" xmlns:p="http://schemas.openxmlformats.org/presentationml/2006/main">
   <p:cSld>
     <p:spTree>
@@ -22066,199 +22640,7 @@
 </p:sld>
 </file>
 
-<file path=ppt/slides/slide4.xml><?xml version="1.0" encoding="utf-8"?>
-<p:sld xmlns:a="http://schemas.openxmlformats.org/drawingml/2006/main" xmlns:r="http://schemas.openxmlformats.org/officeDocument/2006/relationships" xmlns:p="http://schemas.openxmlformats.org/presentationml/2006/main">
-  <p:cSld>
-    <p:spTree>
-      <p:nvGrpSpPr>
-        <p:cNvPr id="1" name=""/>
-        <p:cNvGrpSpPr/>
-        <p:nvPr/>
-      </p:nvGrpSpPr>
-      <p:grpSpPr>
-        <a:xfrm>
-          <a:off x="0" y="0"/>
-          <a:ext cx="0" cy="0"/>
-          <a:chOff x="0" y="0"/>
-          <a:chExt cx="0" cy="0"/>
-        </a:xfrm>
-      </p:grpSpPr>
-      <p:sp>
-        <p:nvSpPr>
-          <p:cNvPr id="2" name="Title 1">
-            <a:extLst>
-              <a:ext uri="{FF2B5EF4-FFF2-40B4-BE49-F238E27FC236}">
-                <a16:creationId xmlns:a16="http://schemas.microsoft.com/office/drawing/2014/main" id="{8C5A40C9-E01D-BEFC-1D9B-DA8A27C238F1}"/>
-              </a:ext>
-            </a:extLst>
-          </p:cNvPr>
-          <p:cNvSpPr>
-            <a:spLocks noGrp="1"/>
-          </p:cNvSpPr>
-          <p:nvPr>
-            <p:ph type="title"/>
-          </p:nvPr>
-        </p:nvSpPr>
-        <p:spPr>
-          <a:xfrm>
-            <a:off x="628650" y="202822"/>
-            <a:ext cx="7886700" cy="994172"/>
-          </a:xfrm>
-        </p:spPr>
-        <p:txBody>
-          <a:bodyPr>
-            <a:normAutofit fontScale="90000"/>
-          </a:bodyPr>
-          <a:lstStyle/>
-          <a:p>
-            <a:r>
-              <a:rPr lang="en-CH"/>
-              <a:t>Reproducibility and Replicability (two opposite definitions)</a:t>
-            </a:r>
-          </a:p>
-        </p:txBody>
-      </p:sp>
-      <p:sp>
-        <p:nvSpPr>
-          <p:cNvPr id="3" name="Content Placeholder 2">
-            <a:extLst>
-              <a:ext uri="{FF2B5EF4-FFF2-40B4-BE49-F238E27FC236}">
-                <a16:creationId xmlns:a16="http://schemas.microsoft.com/office/drawing/2014/main" id="{68D3CDD2-F5AD-E43A-CB56-D2496532D05D}"/>
-              </a:ext>
-            </a:extLst>
-          </p:cNvPr>
-          <p:cNvSpPr>
-            <a:spLocks noGrp="1"/>
-          </p:cNvSpPr>
-          <p:nvPr>
-            <p:ph idx="1"/>
-          </p:nvPr>
-        </p:nvSpPr>
-        <p:spPr>
-          <a:xfrm>
-            <a:off x="628650" y="1369219"/>
-            <a:ext cx="7886700" cy="3380334"/>
-          </a:xfrm>
-        </p:spPr>
-        <p:txBody>
-          <a:bodyPr>
-            <a:normAutofit/>
-          </a:bodyPr>
-          <a:lstStyle/>
-          <a:p>
-            <a:pPr marL="0" indent="0">
-              <a:buNone/>
-            </a:pPr>
-            <a:r>
-              <a:rPr lang="en-GB"/>
-              <a:t>“</a:t>
-            </a:r>
-            <a:r>
-              <a:rPr lang="en-GB" b="1" u="sng"/>
-              <a:t>Reproducibility</a:t>
-            </a:r>
-            <a:r>
-              <a:rPr lang="en-GB"/>
-              <a:t>” refers to instances in which the original researcher's data and computer codes are used to regenerate the results, while “</a:t>
-            </a:r>
-            <a:r>
-              <a:rPr lang="en-GB" b="1" u="sng"/>
-              <a:t>replicability</a:t>
-            </a:r>
-            <a:r>
-              <a:rPr lang="en-GB"/>
-              <a:t>” refers to instances in which a researcher collects new data to arrive at the same scientific findings as a previous study.</a:t>
-            </a:r>
-          </a:p>
-          <a:p>
-            <a:pPr marL="0" indent="0">
-              <a:buNone/>
-            </a:pPr>
-            <a:endParaRPr lang="en-GB"/>
-          </a:p>
-          <a:p>
-            <a:pPr marL="0" indent="0">
-              <a:buNone/>
-            </a:pPr>
-            <a:r>
-              <a:rPr lang="en-GB"/>
-              <a:t>“</a:t>
-            </a:r>
-            <a:r>
-              <a:rPr lang="en-GB" b="1" u="sng"/>
-              <a:t>Reproducibility</a:t>
-            </a:r>
-            <a:r>
-              <a:rPr lang="en-GB"/>
-              <a:t>” refers to independent researchers arriving at the same results using their own data and methods, while “</a:t>
-            </a:r>
-            <a:r>
-              <a:rPr lang="en-GB" b="1" u="sng"/>
-              <a:t>replicability</a:t>
-            </a:r>
-            <a:r>
-              <a:rPr lang="en-GB"/>
-              <a:t>” refers to a different team arriving at the same results using the original author's artifacts.</a:t>
-            </a:r>
-          </a:p>
-        </p:txBody>
-      </p:sp>
-      <p:sp>
-        <p:nvSpPr>
-          <p:cNvPr id="5" name="TextBox 4">
-            <a:extLst>
-              <a:ext uri="{FF2B5EF4-FFF2-40B4-BE49-F238E27FC236}">
-                <a16:creationId xmlns:a16="http://schemas.microsoft.com/office/drawing/2014/main" id="{2E509B11-116E-5BD6-E871-852E55315C0B}"/>
-              </a:ext>
-            </a:extLst>
-          </p:cNvPr>
-          <p:cNvSpPr txBox="1"/>
-          <p:nvPr/>
-        </p:nvSpPr>
-        <p:spPr>
-          <a:xfrm>
-            <a:off x="317376" y="4802178"/>
-            <a:ext cx="8509247" cy="276999"/>
-          </a:xfrm>
-          <a:prstGeom prst="rect">
-            <a:avLst/>
-          </a:prstGeom>
-          <a:noFill/>
-        </p:spPr>
-        <p:txBody>
-          <a:bodyPr wrap="square">
-            <a:spAutoFit/>
-          </a:bodyPr>
-          <a:lstStyle/>
-          <a:p>
-            <a:r>
-              <a:rPr lang="en-GB" sz="1200">
-                <a:latin typeface="Arial" panose="020B0604020202020204" pitchFamily="34" charset="0"/>
-                <a:cs typeface="Arial" panose="020B0604020202020204" pitchFamily="34" charset="0"/>
-              </a:rPr>
-              <a:t>National Academies of Sciences, Engineering, and Medicine. "Reproducibility and replicability in science." (2019).</a:t>
-            </a:r>
-            <a:endParaRPr lang="en-CH" sz="1200">
-              <a:latin typeface="Arial" panose="020B0604020202020204" pitchFamily="34" charset="0"/>
-              <a:cs typeface="Arial" panose="020B0604020202020204" pitchFamily="34" charset="0"/>
-            </a:endParaRPr>
-          </a:p>
-        </p:txBody>
-      </p:sp>
-    </p:spTree>
-    <p:extLst>
-      <p:ext uri="{BB962C8B-B14F-4D97-AF65-F5344CB8AC3E}">
-        <p14:creationId xmlns:p14="http://schemas.microsoft.com/office/powerpoint/2010/main" val="2606564281"/>
-      </p:ext>
-    </p:extLst>
-  </p:cSld>
-  <p:clrMapOvr>
-    <a:masterClrMapping/>
-  </p:clrMapOvr>
-</p:sld>
-</file>
-
-<file path=ppt/slides/slide40.xml><?xml version="1.0" encoding="utf-8"?>
+<file path=ppt/slides/slide42.xml><?xml version="1.0" encoding="utf-8"?>
 <p:sld xmlns:a="http://schemas.openxmlformats.org/drawingml/2006/main" xmlns:r="http://schemas.openxmlformats.org/officeDocument/2006/relationships" xmlns:p="http://schemas.openxmlformats.org/presentationml/2006/main">
   <p:cSld>
     <p:spTree>
@@ -22395,249 +22777,6 @@
 </p:sld>
 </file>
 
-<file path=ppt/slides/slide41.xml><?xml version="1.0" encoding="utf-8"?>
-<p:sld xmlns:a="http://schemas.openxmlformats.org/drawingml/2006/main" xmlns:r="http://schemas.openxmlformats.org/officeDocument/2006/relationships" xmlns:p="http://schemas.openxmlformats.org/presentationml/2006/main">
-  <p:cSld>
-    <p:spTree>
-      <p:nvGrpSpPr>
-        <p:cNvPr id="1" name=""/>
-        <p:cNvGrpSpPr/>
-        <p:nvPr/>
-      </p:nvGrpSpPr>
-      <p:grpSpPr>
-        <a:xfrm>
-          <a:off x="0" y="0"/>
-          <a:ext cx="0" cy="0"/>
-          <a:chOff x="0" y="0"/>
-          <a:chExt cx="0" cy="0"/>
-        </a:xfrm>
-      </p:grpSpPr>
-      <p:sp>
-        <p:nvSpPr>
-          <p:cNvPr id="2" name="Title 1">
-            <a:extLst>
-              <a:ext uri="{FF2B5EF4-FFF2-40B4-BE49-F238E27FC236}">
-                <a16:creationId xmlns:a16="http://schemas.microsoft.com/office/drawing/2014/main" id="{7DCAA898-ADE5-786B-3AB0-E918D836E358}"/>
-              </a:ext>
-            </a:extLst>
-          </p:cNvPr>
-          <p:cNvSpPr>
-            <a:spLocks noGrp="1"/>
-          </p:cNvSpPr>
-          <p:nvPr>
-            <p:ph type="title"/>
-          </p:nvPr>
-        </p:nvSpPr>
-        <p:spPr/>
-        <p:txBody>
-          <a:bodyPr/>
-          <a:lstStyle/>
-          <a:p>
-            <a:r>
-              <a:rPr lang="en-CH"/>
-              <a:t>An online resource</a:t>
-            </a:r>
-          </a:p>
-        </p:txBody>
-      </p:sp>
-      <p:sp>
-        <p:nvSpPr>
-          <p:cNvPr id="3" name="Content Placeholder 2">
-            <a:extLst>
-              <a:ext uri="{FF2B5EF4-FFF2-40B4-BE49-F238E27FC236}">
-                <a16:creationId xmlns:a16="http://schemas.microsoft.com/office/drawing/2014/main" id="{5EEE9A1C-8FEE-70D4-3B5C-BF48DE09BBF9}"/>
-              </a:ext>
-            </a:extLst>
-          </p:cNvPr>
-          <p:cNvSpPr>
-            <a:spLocks noGrp="1"/>
-          </p:cNvSpPr>
-          <p:nvPr>
-            <p:ph idx="1"/>
-          </p:nvPr>
-        </p:nvSpPr>
-        <p:spPr>
-          <a:xfrm>
-            <a:off x="628650" y="1698171"/>
-            <a:ext cx="7886700" cy="2934552"/>
-          </a:xfrm>
-        </p:spPr>
-        <p:txBody>
-          <a:bodyPr/>
-          <a:lstStyle/>
-          <a:p>
-            <a:pPr marL="0" indent="0">
-              <a:buNone/>
-            </a:pPr>
-            <a:r>
-              <a:rPr lang="en-CH"/>
-              <a:t>Nice online course</a:t>
-            </a:r>
-          </a:p>
-          <a:p>
-            <a:pPr marL="0" indent="0">
-              <a:buNone/>
-            </a:pPr>
-            <a:endParaRPr lang="en-CH"/>
-          </a:p>
-          <a:p>
-            <a:pPr marL="0" indent="0">
-              <a:buNone/>
-            </a:pPr>
-            <a:r>
-              <a:rPr lang="en-GB">
-                <a:hlinkClick r:id="rId2"/>
-              </a:rPr>
-              <a:t>https://inria.github.io/scikit-learn-mooc/index.html</a:t>
-            </a:r>
-            <a:r>
-              <a:rPr lang="en-GB"/>
-              <a:t> </a:t>
-            </a:r>
-            <a:endParaRPr lang="en-CH"/>
-          </a:p>
-        </p:txBody>
-      </p:sp>
-    </p:spTree>
-    <p:extLst>
-      <p:ext uri="{BB962C8B-B14F-4D97-AF65-F5344CB8AC3E}">
-        <p14:creationId xmlns:p14="http://schemas.microsoft.com/office/powerpoint/2010/main" val="1868986357"/>
-      </p:ext>
-    </p:extLst>
-  </p:cSld>
-  <p:clrMapOvr>
-    <a:masterClrMapping/>
-  </p:clrMapOvr>
-</p:sld>
-</file>
-
-<file path=ppt/slides/slide42.xml><?xml version="1.0" encoding="utf-8"?>
-<p:sld xmlns:a="http://schemas.openxmlformats.org/drawingml/2006/main" xmlns:r="http://schemas.openxmlformats.org/officeDocument/2006/relationships" xmlns:p="http://schemas.openxmlformats.org/presentationml/2006/main">
-  <p:cSld>
-    <p:spTree>
-      <p:nvGrpSpPr>
-        <p:cNvPr id="1" name=""/>
-        <p:cNvGrpSpPr/>
-        <p:nvPr/>
-      </p:nvGrpSpPr>
-      <p:grpSpPr>
-        <a:xfrm>
-          <a:off x="0" y="0"/>
-          <a:ext cx="0" cy="0"/>
-          <a:chOff x="0" y="0"/>
-          <a:chExt cx="0" cy="0"/>
-        </a:xfrm>
-      </p:grpSpPr>
-      <p:sp>
-        <p:nvSpPr>
-          <p:cNvPr id="2" name="Title 1">
-            <a:extLst>
-              <a:ext uri="{FF2B5EF4-FFF2-40B4-BE49-F238E27FC236}">
-                <a16:creationId xmlns:a16="http://schemas.microsoft.com/office/drawing/2014/main" id="{D9CF36FC-C33C-0CB1-3484-D5E35894DE9F}"/>
-              </a:ext>
-            </a:extLst>
-          </p:cNvPr>
-          <p:cNvSpPr>
-            <a:spLocks noGrp="1"/>
-          </p:cNvSpPr>
-          <p:nvPr>
-            <p:ph type="title"/>
-          </p:nvPr>
-        </p:nvSpPr>
-        <p:spPr/>
-        <p:txBody>
-          <a:bodyPr/>
-          <a:lstStyle/>
-          <a:p>
-            <a:r>
-              <a:rPr lang="en-CH"/>
-              <a:t>Advantages of scikit-learn</a:t>
-            </a:r>
-          </a:p>
-        </p:txBody>
-      </p:sp>
-      <p:sp>
-        <p:nvSpPr>
-          <p:cNvPr id="3" name="Content Placeholder 2">
-            <a:extLst>
-              <a:ext uri="{FF2B5EF4-FFF2-40B4-BE49-F238E27FC236}">
-                <a16:creationId xmlns:a16="http://schemas.microsoft.com/office/drawing/2014/main" id="{A05611B5-42FC-B7FB-76DC-23852C0C1669}"/>
-              </a:ext>
-            </a:extLst>
-          </p:cNvPr>
-          <p:cNvSpPr>
-            <a:spLocks noGrp="1"/>
-          </p:cNvSpPr>
-          <p:nvPr>
-            <p:ph idx="1"/>
-          </p:nvPr>
-        </p:nvSpPr>
-        <p:spPr>
-          <a:xfrm>
-            <a:off x="628650" y="1643169"/>
-            <a:ext cx="7886700" cy="2989553"/>
-          </a:xfrm>
-        </p:spPr>
-        <p:txBody>
-          <a:bodyPr/>
-          <a:lstStyle/>
-          <a:p>
-            <a:r>
-              <a:rPr lang="en-CH"/>
-              <a:t>Scikit-learn covers all parts of a machine learning pipeline (except for neural networks)</a:t>
-            </a:r>
-          </a:p>
-          <a:p>
-            <a:r>
-              <a:rPr lang="en-GB"/>
-              <a:t>S</a:t>
-            </a:r>
-            <a:r>
-              <a:rPr lang="en-CH"/>
-              <a:t>cikit-learn can be integrated and work well with other libraries (as TensorFlow)</a:t>
-            </a:r>
-          </a:p>
-          <a:p>
-            <a:r>
-              <a:rPr lang="en-CH"/>
-              <a:t>Scikit-learn has GREAT documentation that can be used in scientific publications </a:t>
-            </a:r>
-            <a:r>
-              <a:rPr lang="en-CH">
-                <a:sym typeface="Wingdings" pitchFamily="2" charset="2"/>
-              </a:rPr>
-              <a:t> Example: </a:t>
-            </a:r>
-            <a:r>
-              <a:rPr lang="en-GB">
-                <a:sym typeface="Wingdings" pitchFamily="2" charset="2"/>
-                <a:hlinkClick r:id="rId2"/>
-              </a:rPr>
-              <a:t>https://scikit-learn.org/stable/modules/linear_model.html#logistic-regression</a:t>
-            </a:r>
-            <a:r>
-              <a:rPr lang="en-GB">
-                <a:sym typeface="Wingdings" pitchFamily="2" charset="2"/>
-              </a:rPr>
-              <a:t> </a:t>
-            </a:r>
-            <a:endParaRPr lang="en-CH"/>
-          </a:p>
-        </p:txBody>
-      </p:sp>
-    </p:spTree>
-    <p:extLst>
-      <p:ext uri="{BB962C8B-B14F-4D97-AF65-F5344CB8AC3E}">
-        <p14:creationId xmlns:p14="http://schemas.microsoft.com/office/powerpoint/2010/main" val="2049890017"/>
-      </p:ext>
-    </p:extLst>
-  </p:cSld>
-  <p:clrMapOvr>
-    <a:masterClrMapping/>
-  </p:clrMapOvr>
-</p:sld>
-</file>
-
 <file path=ppt/slides/slide43.xml><?xml version="1.0" encoding="utf-8"?>
 <p:sld xmlns:a="http://schemas.openxmlformats.org/drawingml/2006/main" xmlns:r="http://schemas.openxmlformats.org/officeDocument/2006/relationships" xmlns:p="http://schemas.openxmlformats.org/presentationml/2006/main">
   <p:cSld>
@@ -22660,7 +22799,7 @@
           <p:cNvPr id="2" name="Title 1">
             <a:extLst>
               <a:ext uri="{FF2B5EF4-FFF2-40B4-BE49-F238E27FC236}">
-                <a16:creationId xmlns:a16="http://schemas.microsoft.com/office/drawing/2014/main" id="{3D5DD1EC-AAA1-5DAA-B455-CA266EBB46C3}"/>
+                <a16:creationId xmlns:a16="http://schemas.microsoft.com/office/drawing/2014/main" id="{7DCAA898-ADE5-786B-3AB0-E918D836E358}"/>
               </a:ext>
             </a:extLst>
           </p:cNvPr>
@@ -22677,20 +22816,74 @@
           <a:lstStyle/>
           <a:p>
             <a:r>
+              <a:rPr lang="en-CH"/>
+              <a:t>An online resource</a:t>
+            </a:r>
+          </a:p>
+        </p:txBody>
+      </p:sp>
+      <p:sp>
+        <p:nvSpPr>
+          <p:cNvPr id="3" name="Content Placeholder 2">
+            <a:extLst>
+              <a:ext uri="{FF2B5EF4-FFF2-40B4-BE49-F238E27FC236}">
+                <a16:creationId xmlns:a16="http://schemas.microsoft.com/office/drawing/2014/main" id="{5EEE9A1C-8FEE-70D4-3B5C-BF48DE09BBF9}"/>
+              </a:ext>
+            </a:extLst>
+          </p:cNvPr>
+          <p:cNvSpPr>
+            <a:spLocks noGrp="1"/>
+          </p:cNvSpPr>
+          <p:nvPr>
+            <p:ph idx="1"/>
+          </p:nvPr>
+        </p:nvSpPr>
+        <p:spPr>
+          <a:xfrm>
+            <a:off x="628650" y="1698171"/>
+            <a:ext cx="7886700" cy="2934552"/>
+          </a:xfrm>
+        </p:spPr>
+        <p:txBody>
+          <a:bodyPr/>
+          <a:lstStyle/>
+          <a:p>
+            <a:pPr marL="0" indent="0">
+              <a:buNone/>
+            </a:pPr>
+            <a:r>
+              <a:rPr lang="en-CH"/>
+              <a:t>Nice online course</a:t>
+            </a:r>
+          </a:p>
+          <a:p>
+            <a:pPr marL="0" indent="0">
+              <a:buNone/>
+            </a:pPr>
+            <a:endParaRPr lang="en-CH"/>
+          </a:p>
+          <a:p>
+            <a:pPr marL="0" indent="0">
+              <a:buNone/>
+            </a:pPr>
+            <a:r>
+              <a:rPr lang="en-GB">
+                <a:hlinkClick r:id="rId2"/>
+              </a:rPr>
+              <a:t>https://inria.github.io/scikit-learn-mooc/index.html</a:t>
+            </a:r>
+            <a:r>
               <a:rPr lang="en-GB"/>
-              <a:t>S</a:t>
-            </a:r>
-            <a:r>
-              <a:rPr lang="en-CH"/>
-              <a:t>cikit-learn hands-on</a:t>
-            </a:r>
+              <a:t> </a:t>
+            </a:r>
+            <a:endParaRPr lang="en-CH"/>
           </a:p>
         </p:txBody>
       </p:sp>
     </p:spTree>
     <p:extLst>
       <p:ext uri="{BB962C8B-B14F-4D97-AF65-F5344CB8AC3E}">
-        <p14:creationId xmlns:p14="http://schemas.microsoft.com/office/powerpoint/2010/main" val="2093818250"/>
+        <p14:creationId xmlns:p14="http://schemas.microsoft.com/office/powerpoint/2010/main" val="1868986357"/>
       </p:ext>
     </p:extLst>
   </p:cSld>
@@ -22722,7 +22915,7 @@
           <p:cNvPr id="2" name="Title 1">
             <a:extLst>
               <a:ext uri="{FF2B5EF4-FFF2-40B4-BE49-F238E27FC236}">
-                <a16:creationId xmlns:a16="http://schemas.microsoft.com/office/drawing/2014/main" id="{DB593303-A13B-6651-B22A-A2CE7BE853DD}"/>
+                <a16:creationId xmlns:a16="http://schemas.microsoft.com/office/drawing/2014/main" id="{D9CF36FC-C33C-0CB1-3484-D5E35894DE9F}"/>
               </a:ext>
             </a:extLst>
           </p:cNvPr>
@@ -22740,7 +22933,7 @@
           <a:p>
             <a:r>
               <a:rPr lang="en-CH"/>
-              <a:t>Some best practices</a:t>
+              <a:t>Advantages of scikit-learn</a:t>
             </a:r>
           </a:p>
         </p:txBody>
@@ -22750,7 +22943,7 @@
           <p:cNvPr id="3" name="Content Placeholder 2">
             <a:extLst>
               <a:ext uri="{FF2B5EF4-FFF2-40B4-BE49-F238E27FC236}">
-                <a16:creationId xmlns:a16="http://schemas.microsoft.com/office/drawing/2014/main" id="{8438C190-DF45-8017-0829-34CA2F5A8D83}"/>
+                <a16:creationId xmlns:a16="http://schemas.microsoft.com/office/drawing/2014/main" id="{A05611B5-42FC-B7FB-76DC-23852C0C1669}"/>
               </a:ext>
             </a:extLst>
           </p:cNvPr>
@@ -22761,44 +22954,63 @@
             <p:ph idx="1"/>
           </p:nvPr>
         </p:nvSpPr>
-        <p:spPr/>
+        <p:spPr>
+          <a:xfrm>
+            <a:off x="628650" y="1643169"/>
+            <a:ext cx="7886700" cy="2989553"/>
+          </a:xfrm>
+        </p:spPr>
         <p:txBody>
           <a:bodyPr/>
           <a:lstStyle/>
           <a:p>
             <a:r>
               <a:rPr lang="en-CH"/>
-              <a:t>Write functions only if you really need to re-use them</a:t>
-            </a:r>
-          </a:p>
-          <a:p>
+              <a:t>Scikit-learn covers all parts of a machine learning pipeline (except for neural networks)</a:t>
+            </a:r>
+          </a:p>
+          <a:p>
+            <a:r>
+              <a:rPr lang="en-GB"/>
+              <a:t>S</a:t>
+            </a:r>
             <a:r>
               <a:rPr lang="en-CH"/>
-              <a:t>Write a piece of code for </a:t>
-            </a:r>
-            <a:r>
-              <a:rPr lang="en-CH" b="1" u="sng"/>
-              <a:t>each</a:t>
-            </a:r>
+              <a:t>cikit-learn can be integrated and work well with other libraries (as TensorFlow)</a:t>
+            </a:r>
+          </a:p>
+          <a:p>
             <a:r>
               <a:rPr lang="en-CH"/>
-              <a:t> experiment you perform. Do not modify existing code and note the results! Each experiments must be reproducible and documented (what happens after 6 months? Will you remember all details? </a:t>
-            </a:r>
-            <a:r>
-              <a:rPr lang="en-GB"/>
-              <a:t>A</a:t>
-            </a:r>
-            <a:r>
-              <a:rPr lang="en-CH"/>
-              <a:t>ll parameters?</a:t>
-            </a:r>
+              <a:t>Scikit-learn has GREAT documentation that can be used in scientific publications </a:t>
+            </a:r>
+            <a:r>
+              <a:rPr lang="en-CH">
+                <a:sym typeface="Wingdings" pitchFamily="2" charset="2"/>
+              </a:rPr>
+              <a:t> Example: </a:t>
+            </a:r>
+            <a:r>
+              <a:rPr lang="en-GB">
+                <a:sym typeface="Wingdings" pitchFamily="2" charset="2"/>
+                <a:hlinkClick r:id="rId2"/>
+              </a:rPr>
+              <a:t>https://scikit-learn.org/stable/modules/linear_model.html#logistic-regression</a:t>
+            </a:r>
+            <a:r>
+              <a:rPr lang="en-GB">
+                <a:sym typeface="Wingdings" pitchFamily="2" charset="2"/>
+              </a:rPr>
+              <a:t> </a:t>
+            </a:r>
+            <a:endParaRPr lang="en-CH"/>
           </a:p>
         </p:txBody>
       </p:sp>
     </p:spTree>
     <p:extLst>
       <p:ext uri="{BB962C8B-B14F-4D97-AF65-F5344CB8AC3E}">
-        <p14:creationId xmlns:p14="http://schemas.microsoft.com/office/powerpoint/2010/main" val="3435977449"/>
+        <p14:creationId xmlns:p14="http://schemas.microsoft.com/office/powerpoint/2010/main" val="2049890017"/>
       </p:ext>
     </p:extLst>
   </p:cSld>
@@ -22830,7 +23042,7 @@
           <p:cNvPr id="2" name="Title 1">
             <a:extLst>
               <a:ext uri="{FF2B5EF4-FFF2-40B4-BE49-F238E27FC236}">
-                <a16:creationId xmlns:a16="http://schemas.microsoft.com/office/drawing/2014/main" id="{082C0C09-969B-2F64-C262-889B52837A97}"/>
+                <a16:creationId xmlns:a16="http://schemas.microsoft.com/office/drawing/2014/main" id="{3D5DD1EC-AAA1-5DAA-B455-CA266EBB46C3}"/>
               </a:ext>
             </a:extLst>
           </p:cNvPr>
@@ -22847,8 +23059,178 @@
           <a:lstStyle/>
           <a:p>
             <a:r>
+              <a:rPr lang="en-GB"/>
+              <a:t>S</a:t>
+            </a:r>
+            <a:r>
               <a:rPr lang="en-CH"/>
-              <a:t>Related topics – remarks I</a:t>
+              <a:t>cikit-learn hands-on</a:t>
+            </a:r>
+          </a:p>
+        </p:txBody>
+      </p:sp>
+    </p:spTree>
+    <p:extLst>
+      <p:ext uri="{BB962C8B-B14F-4D97-AF65-F5344CB8AC3E}">
+        <p14:creationId xmlns:p14="http://schemas.microsoft.com/office/powerpoint/2010/main" val="2093818250"/>
+      </p:ext>
+    </p:extLst>
+  </p:cSld>
+  <p:clrMapOvr>
+    <a:masterClrMapping/>
+  </p:clrMapOvr>
+</p:sld>
+</file>
+
+<file path=ppt/slides/slide46.xml><?xml version="1.0" encoding="utf-8"?>
+<p:sld xmlns:a="http://schemas.openxmlformats.org/drawingml/2006/main" xmlns:r="http://schemas.openxmlformats.org/officeDocument/2006/relationships" xmlns:p="http://schemas.openxmlformats.org/presentationml/2006/main">
+  <p:cSld>
+    <p:spTree>
+      <p:nvGrpSpPr>
+        <p:cNvPr id="1" name=""/>
+        <p:cNvGrpSpPr/>
+        <p:nvPr/>
+      </p:nvGrpSpPr>
+      <p:grpSpPr>
+        <a:xfrm>
+          <a:off x="0" y="0"/>
+          <a:ext cx="0" cy="0"/>
+          <a:chOff x="0" y="0"/>
+          <a:chExt cx="0" cy="0"/>
+        </a:xfrm>
+      </p:grpSpPr>
+      <p:sp>
+        <p:nvSpPr>
+          <p:cNvPr id="2" name="Title 1">
+            <a:extLst>
+              <a:ext uri="{FF2B5EF4-FFF2-40B4-BE49-F238E27FC236}">
+                <a16:creationId xmlns:a16="http://schemas.microsoft.com/office/drawing/2014/main" id="{DB593303-A13B-6651-B22A-A2CE7BE853DD}"/>
+              </a:ext>
+            </a:extLst>
+          </p:cNvPr>
+          <p:cNvSpPr>
+            <a:spLocks noGrp="1"/>
+          </p:cNvSpPr>
+          <p:nvPr>
+            <p:ph type="title"/>
+          </p:nvPr>
+        </p:nvSpPr>
+        <p:spPr/>
+        <p:txBody>
+          <a:bodyPr/>
+          <a:lstStyle/>
+          <a:p>
+            <a:r>
+              <a:rPr lang="en-CH"/>
+              <a:t>Some best practices</a:t>
+            </a:r>
+          </a:p>
+        </p:txBody>
+      </p:sp>
+      <p:sp>
+        <p:nvSpPr>
+          <p:cNvPr id="3" name="Content Placeholder 2">
+            <a:extLst>
+              <a:ext uri="{FF2B5EF4-FFF2-40B4-BE49-F238E27FC236}">
+                <a16:creationId xmlns:a16="http://schemas.microsoft.com/office/drawing/2014/main" id="{8438C190-DF45-8017-0829-34CA2F5A8D83}"/>
+              </a:ext>
+            </a:extLst>
+          </p:cNvPr>
+          <p:cNvSpPr>
+            <a:spLocks noGrp="1"/>
+          </p:cNvSpPr>
+          <p:nvPr>
+            <p:ph idx="1"/>
+          </p:nvPr>
+        </p:nvSpPr>
+        <p:spPr/>
+        <p:txBody>
+          <a:bodyPr/>
+          <a:lstStyle/>
+          <a:p>
+            <a:r>
+              <a:rPr lang="en-CH"/>
+              <a:t>Write functions only if you really need to re-use them</a:t>
+            </a:r>
+          </a:p>
+          <a:p>
+            <a:r>
+              <a:rPr lang="en-CH"/>
+              <a:t>Write a piece of code for </a:t>
+            </a:r>
+            <a:r>
+              <a:rPr lang="en-CH" b="1" u="sng"/>
+              <a:t>each</a:t>
+            </a:r>
+            <a:r>
+              <a:rPr lang="en-CH"/>
+              <a:t> experiment you perform. Do not modify existing code and note the results! Each experiments must be reproducible and documented (what happens after 6 months? Will you remember all details? </a:t>
+            </a:r>
+            <a:r>
+              <a:rPr lang="en-GB"/>
+              <a:t>A</a:t>
+            </a:r>
+            <a:r>
+              <a:rPr lang="en-CH"/>
+              <a:t>ll parameters?)</a:t>
+            </a:r>
+          </a:p>
+        </p:txBody>
+      </p:sp>
+    </p:spTree>
+    <p:extLst>
+      <p:ext uri="{BB962C8B-B14F-4D97-AF65-F5344CB8AC3E}">
+        <p14:creationId xmlns:p14="http://schemas.microsoft.com/office/powerpoint/2010/main" val="3435977449"/>
+      </p:ext>
+    </p:extLst>
+  </p:cSld>
+  <p:clrMapOvr>
+    <a:masterClrMapping/>
+  </p:clrMapOvr>
+</p:sld>
+</file>
+
+<file path=ppt/slides/slide47.xml><?xml version="1.0" encoding="utf-8"?>
+<p:sld xmlns:a="http://schemas.openxmlformats.org/drawingml/2006/main" xmlns:r="http://schemas.openxmlformats.org/officeDocument/2006/relationships" xmlns:p="http://schemas.openxmlformats.org/presentationml/2006/main">
+  <p:cSld>
+    <p:spTree>
+      <p:nvGrpSpPr>
+        <p:cNvPr id="1" name=""/>
+        <p:cNvGrpSpPr/>
+        <p:nvPr/>
+      </p:nvGrpSpPr>
+      <p:grpSpPr>
+        <a:xfrm>
+          <a:off x="0" y="0"/>
+          <a:ext cx="0" cy="0"/>
+          <a:chOff x="0" y="0"/>
+          <a:chExt cx="0" cy="0"/>
+        </a:xfrm>
+      </p:grpSpPr>
+      <p:sp>
+        <p:nvSpPr>
+          <p:cNvPr id="2" name="Title 1">
+            <a:extLst>
+              <a:ext uri="{FF2B5EF4-FFF2-40B4-BE49-F238E27FC236}">
+                <a16:creationId xmlns:a16="http://schemas.microsoft.com/office/drawing/2014/main" id="{082C0C09-969B-2F64-C262-889B52837A97}"/>
+              </a:ext>
+            </a:extLst>
+          </p:cNvPr>
+          <p:cNvSpPr>
+            <a:spLocks noGrp="1"/>
+          </p:cNvSpPr>
+          <p:nvPr>
+            <p:ph type="title"/>
+          </p:nvPr>
+        </p:nvSpPr>
+        <p:spPr/>
+        <p:txBody>
+          <a:bodyPr/>
+          <a:lstStyle/>
+          <a:p>
+            <a:r>
+              <a:rPr lang="en-CH"/>
+              <a:t>Related topics remarks </a:t>
             </a:r>
           </a:p>
         </p:txBody>
@@ -22917,7 +23299,7 @@
 </p:sld>
 </file>
 
-<file path=ppt/slides/slide46.xml><?xml version="1.0" encoding="utf-8"?>
+<file path=ppt/slides/slide48.xml><?xml version="1.0" encoding="utf-8"?>
 <p:sld xmlns:a="http://schemas.openxmlformats.org/drawingml/2006/main" xmlns:r="http://schemas.openxmlformats.org/officeDocument/2006/relationships" xmlns:p="http://schemas.openxmlformats.org/presentationml/2006/main">
   <p:cSld>
     <p:spTree>

</xml_diff>